<commit_message>
Added PDF Writing Code
</commit_message>
<xml_diff>
--- a/AI-Powered Home Trade System.pptx
+++ b/AI-Powered Home Trade System.pptx
@@ -10,8 +10,11 @@
     <p:sldId id="258" r:id="rId4"/>
     <p:sldId id="259" r:id="rId5"/>
     <p:sldId id="260" r:id="rId6"/>
-    <p:sldId id="264" r:id="rId7"/>
-    <p:sldId id="265" r:id="rId8"/>
+    <p:sldId id="266" r:id="rId7"/>
+    <p:sldId id="268" r:id="rId8"/>
+    <p:sldId id="267" r:id="rId9"/>
+    <p:sldId id="264" r:id="rId10"/>
+    <p:sldId id="265" r:id="rId11"/>
   </p:sldIdLst>
   <p:sldSz cx="12192000" cy="6858000"/>
   <p:notesSz cx="6858000" cy="9144000"/>
@@ -265,7 +268,7 @@
           <a:p>
             <a:fld id="{1F9BB8DF-01EA-46CF-B14C-40B1B31348F3}" type="datetimeFigureOut">
               <a:rPr lang="en-US" smtClean="0"/>
-              <a:t>1/27/2021</a:t>
+              <a:t>2/2/2021</a:t>
             </a:fld>
             <a:endParaRPr lang="en-US"/>
           </a:p>
@@ -463,7 +466,7 @@
           <a:p>
             <a:fld id="{1F9BB8DF-01EA-46CF-B14C-40B1B31348F3}" type="datetimeFigureOut">
               <a:rPr lang="en-US" smtClean="0"/>
-              <a:t>1/27/2021</a:t>
+              <a:t>2/2/2021</a:t>
             </a:fld>
             <a:endParaRPr lang="en-US"/>
           </a:p>
@@ -671,7 +674,7 @@
           <a:p>
             <a:fld id="{1F9BB8DF-01EA-46CF-B14C-40B1B31348F3}" type="datetimeFigureOut">
               <a:rPr lang="en-US" smtClean="0"/>
-              <a:t>1/27/2021</a:t>
+              <a:t>2/2/2021</a:t>
             </a:fld>
             <a:endParaRPr lang="en-US"/>
           </a:p>
@@ -869,7 +872,7 @@
           <a:p>
             <a:fld id="{1F9BB8DF-01EA-46CF-B14C-40B1B31348F3}" type="datetimeFigureOut">
               <a:rPr lang="en-US" smtClean="0"/>
-              <a:t>1/27/2021</a:t>
+              <a:t>2/2/2021</a:t>
             </a:fld>
             <a:endParaRPr lang="en-US"/>
           </a:p>
@@ -1144,7 +1147,7 @@
           <a:p>
             <a:fld id="{1F9BB8DF-01EA-46CF-B14C-40B1B31348F3}" type="datetimeFigureOut">
               <a:rPr lang="en-US" smtClean="0"/>
-              <a:t>1/27/2021</a:t>
+              <a:t>2/2/2021</a:t>
             </a:fld>
             <a:endParaRPr lang="en-US"/>
           </a:p>
@@ -1409,7 +1412,7 @@
           <a:p>
             <a:fld id="{1F9BB8DF-01EA-46CF-B14C-40B1B31348F3}" type="datetimeFigureOut">
               <a:rPr lang="en-US" smtClean="0"/>
-              <a:t>1/27/2021</a:t>
+              <a:t>2/2/2021</a:t>
             </a:fld>
             <a:endParaRPr lang="en-US"/>
           </a:p>
@@ -1821,7 +1824,7 @@
           <a:p>
             <a:fld id="{1F9BB8DF-01EA-46CF-B14C-40B1B31348F3}" type="datetimeFigureOut">
               <a:rPr lang="en-US" smtClean="0"/>
-              <a:t>1/27/2021</a:t>
+              <a:t>2/2/2021</a:t>
             </a:fld>
             <a:endParaRPr lang="en-US"/>
           </a:p>
@@ -1962,7 +1965,7 @@
           <a:p>
             <a:fld id="{1F9BB8DF-01EA-46CF-B14C-40B1B31348F3}" type="datetimeFigureOut">
               <a:rPr lang="en-US" smtClean="0"/>
-              <a:t>1/27/2021</a:t>
+              <a:t>2/2/2021</a:t>
             </a:fld>
             <a:endParaRPr lang="en-US"/>
           </a:p>
@@ -2075,7 +2078,7 @@
           <a:p>
             <a:fld id="{1F9BB8DF-01EA-46CF-B14C-40B1B31348F3}" type="datetimeFigureOut">
               <a:rPr lang="en-US" smtClean="0"/>
-              <a:t>1/27/2021</a:t>
+              <a:t>2/2/2021</a:t>
             </a:fld>
             <a:endParaRPr lang="en-US"/>
           </a:p>
@@ -2386,7 +2389,7 @@
           <a:p>
             <a:fld id="{1F9BB8DF-01EA-46CF-B14C-40B1B31348F3}" type="datetimeFigureOut">
               <a:rPr lang="en-US" smtClean="0"/>
-              <a:t>1/27/2021</a:t>
+              <a:t>2/2/2021</a:t>
             </a:fld>
             <a:endParaRPr lang="en-US"/>
           </a:p>
@@ -2674,7 +2677,7 @@
           <a:p>
             <a:fld id="{1F9BB8DF-01EA-46CF-B14C-40B1B31348F3}" type="datetimeFigureOut">
               <a:rPr lang="en-US" smtClean="0"/>
-              <a:t>1/27/2021</a:t>
+              <a:t>2/2/2021</a:t>
             </a:fld>
             <a:endParaRPr lang="en-US"/>
           </a:p>
@@ -2915,7 +2918,7 @@
           <a:p>
             <a:fld id="{1F9BB8DF-01EA-46CF-B14C-40B1B31348F3}" type="datetimeFigureOut">
               <a:rPr lang="en-US" smtClean="0"/>
-              <a:t>1/27/2021</a:t>
+              <a:t>2/2/2021</a:t>
             </a:fld>
             <a:endParaRPr lang="en-US"/>
           </a:p>
@@ -4947,7 +4950,7 @@
 </p:sld>
 </file>
 
-<file path=ppt/slides/slide2.xml><?xml version="1.0" encoding="utf-8"?>
+<file path=ppt/slides/slide10.xml><?xml version="1.0" encoding="utf-8"?>
 <p:sld xmlns:a="http://schemas.openxmlformats.org/drawingml/2006/main" xmlns:r="http://schemas.openxmlformats.org/officeDocument/2006/relationships" xmlns:p="http://schemas.openxmlformats.org/presentationml/2006/main">
   <p:cSld>
     <p:bg>
@@ -5235,7 +5238,7 @@
           <p:cNvPr id="2" name="Title 1">
             <a:extLst>
               <a:ext uri="{FF2B5EF4-FFF2-40B4-BE49-F238E27FC236}">
-                <a16:creationId xmlns:a16="http://schemas.microsoft.com/office/drawing/2014/main" id="{CBBC83E5-5553-4A25-A539-A07EDD4971E2}"/>
+                <a16:creationId xmlns:a16="http://schemas.microsoft.com/office/drawing/2014/main" id="{2AF788E1-ACF9-4129-9800-336AE6BEFBB9}"/>
               </a:ext>
             </a:extLst>
           </p:cNvPr>
@@ -5265,7 +5268,7 @@
                   <a:schemeClr val="bg1"/>
                 </a:solidFill>
               </a:rPr>
-              <a:t>Transaction Assistance Platform</a:t>
+              <a:t>Thank You!</a:t>
             </a:r>
           </a:p>
         </p:txBody>
@@ -6220,7 +6223,7 @@
           <p:cNvPr id="3" name="Content Placeholder 2">
             <a:extLst>
               <a:ext uri="{FF2B5EF4-FFF2-40B4-BE49-F238E27FC236}">
-                <a16:creationId xmlns:a16="http://schemas.microsoft.com/office/drawing/2014/main" id="{E59F465D-22CB-4AEF-8D6F-DCDB8F9DD723}"/>
+                <a16:creationId xmlns:a16="http://schemas.microsoft.com/office/drawing/2014/main" id="{0C4D4AEE-E646-4D4F-8ACE-D9FDAE73E38E}"/>
               </a:ext>
             </a:extLst>
           </p:cNvPr>
@@ -6239,78 +6242,15 @@
         </p:spPr>
         <p:txBody>
           <a:bodyPr>
-            <a:normAutofit lnSpcReduction="10000"/>
+            <a:normAutofit/>
           </a:bodyPr>
           <a:lstStyle/>
           <a:p>
-            <a:pPr marL="514350" indent="-514350">
-              <a:buFont typeface="+mj-lt"/>
-              <a:buAutoNum type="arabicPeriod"/>
-            </a:pPr>
-            <a:r>
-              <a:rPr lang="en-US" dirty="0">
-                <a:solidFill>
-                  <a:schemeClr val="bg1"/>
-                </a:solidFill>
-              </a:rPr>
-              <a:t>Buyer’s guide for making an offer</a:t>
-            </a:r>
-          </a:p>
-          <a:p>
-            <a:pPr marL="514350" indent="-514350">
-              <a:buFont typeface="+mj-lt"/>
-              <a:buAutoNum type="arabicPeriod"/>
-            </a:pPr>
-            <a:r>
-              <a:rPr lang="en-US" dirty="0">
-                <a:solidFill>
-                  <a:schemeClr val="bg1"/>
-                </a:solidFill>
-              </a:rPr>
-              <a:t>Seller’s guide for countering an offer</a:t>
-            </a:r>
-          </a:p>
-          <a:p>
-            <a:pPr marL="514350" indent="-514350">
-              <a:buFont typeface="+mj-lt"/>
-              <a:buAutoNum type="arabicPeriod"/>
-            </a:pPr>
-            <a:r>
-              <a:rPr lang="en-US" dirty="0">
-                <a:solidFill>
-                  <a:schemeClr val="bg1"/>
-                </a:solidFill>
-              </a:rPr>
-              <a:t>Buyer’s guide for countering an offer</a:t>
-            </a:r>
-          </a:p>
-          <a:p>
-            <a:pPr marL="514350" indent="-514350">
-              <a:buFont typeface="+mj-lt"/>
-              <a:buAutoNum type="arabicPeriod"/>
-            </a:pPr>
-            <a:r>
-              <a:rPr lang="en-US" dirty="0">
-                <a:solidFill>
-                  <a:schemeClr val="bg1"/>
-                </a:solidFill>
-              </a:rPr>
-              <a:t>Seller’s guide for making a deal</a:t>
-            </a:r>
-          </a:p>
-          <a:p>
-            <a:pPr marL="514350" indent="-514350">
-              <a:buFont typeface="+mj-lt"/>
-              <a:buAutoNum type="arabicPeriod"/>
-            </a:pPr>
-            <a:r>
-              <a:rPr lang="en-US" dirty="0">
-                <a:solidFill>
-                  <a:schemeClr val="bg1"/>
-                </a:solidFill>
-              </a:rPr>
-              <a:t>Buyer’s guide for house inspection and request to require</a:t>
-            </a:r>
+            <a:endParaRPr lang="en-US" dirty="0">
+              <a:solidFill>
+                <a:schemeClr val="bg1"/>
+              </a:solidFill>
+            </a:endParaRPr>
           </a:p>
         </p:txBody>
       </p:sp>
@@ -6787,7 +6727,7 @@
     </p:spTree>
     <p:extLst>
       <p:ext uri="{BB962C8B-B14F-4D97-AF65-F5344CB8AC3E}">
-        <p14:creationId xmlns:p14="http://schemas.microsoft.com/office/powerpoint/2010/main" val="4271099827"/>
+        <p14:creationId xmlns:p14="http://schemas.microsoft.com/office/powerpoint/2010/main" val="801095369"/>
       </p:ext>
     </p:extLst>
   </p:cSld>
@@ -6797,7 +6737,7 @@
 </p:sld>
 </file>
 
-<file path=ppt/slides/slide3.xml><?xml version="1.0" encoding="utf-8"?>
+<file path=ppt/slides/slide2.xml><?xml version="1.0" encoding="utf-8"?>
 <p:sld xmlns:a="http://schemas.openxmlformats.org/drawingml/2006/main" xmlns:r="http://schemas.openxmlformats.org/officeDocument/2006/relationships" xmlns:p="http://schemas.openxmlformats.org/presentationml/2006/main">
   <p:cSld>
     <p:bg>
@@ -7085,7 +7025,7 @@
           <p:cNvPr id="2" name="Title 1">
             <a:extLst>
               <a:ext uri="{FF2B5EF4-FFF2-40B4-BE49-F238E27FC236}">
-                <a16:creationId xmlns:a16="http://schemas.microsoft.com/office/drawing/2014/main" id="{2AF788E1-ACF9-4129-9800-336AE6BEFBB9}"/>
+                <a16:creationId xmlns:a16="http://schemas.microsoft.com/office/drawing/2014/main" id="{CBBC83E5-5553-4A25-A539-A07EDD4971E2}"/>
               </a:ext>
             </a:extLst>
           </p:cNvPr>
@@ -7115,7 +7055,7 @@
                   <a:schemeClr val="bg1"/>
                 </a:solidFill>
               </a:rPr>
-              <a:t>Week 1</a:t>
+              <a:t>Transaction Assistance Platform</a:t>
             </a:r>
           </a:p>
         </p:txBody>
@@ -8070,7 +8010,7 @@
           <p:cNvPr id="3" name="Content Placeholder 2">
             <a:extLst>
               <a:ext uri="{FF2B5EF4-FFF2-40B4-BE49-F238E27FC236}">
-                <a16:creationId xmlns:a16="http://schemas.microsoft.com/office/drawing/2014/main" id="{0C4D4AEE-E646-4D4F-8ACE-D9FDAE73E38E}"/>
+                <a16:creationId xmlns:a16="http://schemas.microsoft.com/office/drawing/2014/main" id="{E59F465D-22CB-4AEF-8D6F-DCDB8F9DD723}"/>
               </a:ext>
             </a:extLst>
           </p:cNvPr>
@@ -8089,95 +8029,78 @@
         </p:spPr>
         <p:txBody>
           <a:bodyPr>
-            <a:normAutofit fontScale="92500"/>
+            <a:normAutofit lnSpcReduction="10000"/>
           </a:bodyPr>
           <a:lstStyle/>
           <a:p>
+            <a:pPr marL="514350" indent="-514350">
+              <a:buFont typeface="+mj-lt"/>
+              <a:buAutoNum type="arabicPeriod"/>
+            </a:pPr>
             <a:r>
               <a:rPr lang="en-US" dirty="0">
                 <a:solidFill>
                   <a:schemeClr val="bg1"/>
                 </a:solidFill>
               </a:rPr>
-              <a:t>Understanding the problem</a:t>
+              <a:t>Buyer’s guide for making an offer</a:t>
             </a:r>
           </a:p>
           <a:p>
+            <a:pPr marL="514350" indent="-514350">
+              <a:buFont typeface="+mj-lt"/>
+              <a:buAutoNum type="arabicPeriod"/>
+            </a:pPr>
             <a:r>
               <a:rPr lang="en-US" dirty="0">
                 <a:solidFill>
                   <a:schemeClr val="bg1"/>
                 </a:solidFill>
               </a:rPr>
-              <a:t>Learning about Django</a:t>
+              <a:t>Seller’s guide for countering an offer</a:t>
             </a:r>
           </a:p>
           <a:p>
+            <a:pPr marL="514350" indent="-514350">
+              <a:buFont typeface="+mj-lt"/>
+              <a:buAutoNum type="arabicPeriod"/>
+            </a:pPr>
             <a:r>
               <a:rPr lang="en-US" dirty="0">
                 <a:solidFill>
                   <a:schemeClr val="bg1"/>
                 </a:solidFill>
               </a:rPr>
-              <a:t>Preparing skeleton framework</a:t>
+              <a:t>Buyer’s guide for countering an offer</a:t>
             </a:r>
           </a:p>
           <a:p>
+            <a:pPr marL="514350" indent="-514350">
+              <a:buFont typeface="+mj-lt"/>
+              <a:buAutoNum type="arabicPeriod"/>
+            </a:pPr>
             <a:r>
               <a:rPr lang="en-US" dirty="0">
                 <a:solidFill>
                   <a:schemeClr val="bg1"/>
                 </a:solidFill>
               </a:rPr>
-              <a:t>Configuring skeleton framework</a:t>
+              <a:t>Seller’s guide for making a deal</a:t>
             </a:r>
           </a:p>
           <a:p>
+            <a:pPr marL="514350" indent="-514350">
+              <a:buFont typeface="+mj-lt"/>
+              <a:buAutoNum type="arabicPeriod"/>
+            </a:pPr>
             <a:r>
               <a:rPr lang="en-US" dirty="0">
                 <a:solidFill>
                   <a:schemeClr val="bg1"/>
                 </a:solidFill>
               </a:rPr>
-              <a:t>Creating the Buyer’s Offer application</a:t>
+              <a:t>Buyer’s guide for house inspection and request to require</a:t>
             </a:r>
-          </a:p>
-          <a:p>
-            <a:r>
-              <a:rPr lang="en-US" dirty="0">
-                <a:solidFill>
-                  <a:schemeClr val="bg1"/>
-                </a:solidFill>
-              </a:rPr>
-              <a:t>Creating the database and models</a:t>
-            </a:r>
-          </a:p>
-          <a:p>
-            <a:r>
-              <a:rPr lang="en-US" dirty="0">
-                <a:solidFill>
-                  <a:schemeClr val="bg1"/>
-                </a:solidFill>
-              </a:rPr>
-              <a:t>Creating the admin view</a:t>
-            </a:r>
-          </a:p>
-          <a:p>
-            <a:r>
-              <a:rPr lang="en-US" dirty="0">
-                <a:solidFill>
-                  <a:schemeClr val="bg1"/>
-                </a:solidFill>
-              </a:rPr>
-              <a:t>Creating the URLs and the UI</a:t>
-            </a:r>
-          </a:p>
-          <a:p>
-            <a:endParaRPr lang="en-US" dirty="0">
-              <a:solidFill>
-                <a:schemeClr val="bg1"/>
-              </a:solidFill>
-            </a:endParaRPr>
           </a:p>
         </p:txBody>
       </p:sp>
@@ -8654,7 +8577,7 @@
     </p:spTree>
     <p:extLst>
       <p:ext uri="{BB962C8B-B14F-4D97-AF65-F5344CB8AC3E}">
-        <p14:creationId xmlns:p14="http://schemas.microsoft.com/office/powerpoint/2010/main" val="3749003181"/>
+        <p14:creationId xmlns:p14="http://schemas.microsoft.com/office/powerpoint/2010/main" val="4271099827"/>
       </p:ext>
     </p:extLst>
   </p:cSld>
@@ -8664,7 +8587,7 @@
 </p:sld>
 </file>
 
-<file path=ppt/slides/slide4.xml><?xml version="1.0" encoding="utf-8"?>
+<file path=ppt/slides/slide3.xml><?xml version="1.0" encoding="utf-8"?>
 <p:sld xmlns:a="http://schemas.openxmlformats.org/drawingml/2006/main" xmlns:r="http://schemas.openxmlformats.org/officeDocument/2006/relationships" xmlns:p="http://schemas.openxmlformats.org/presentationml/2006/main">
   <p:cSld>
     <p:bg>
@@ -8952,7 +8875,7 @@
           <p:cNvPr id="2" name="Title 1">
             <a:extLst>
               <a:ext uri="{FF2B5EF4-FFF2-40B4-BE49-F238E27FC236}">
-                <a16:creationId xmlns:a16="http://schemas.microsoft.com/office/drawing/2014/main" id="{2D2A6F50-66D4-43FB-935C-2FF4844F32A6}"/>
+                <a16:creationId xmlns:a16="http://schemas.microsoft.com/office/drawing/2014/main" id="{2AF788E1-ACF9-4129-9800-336AE6BEFBB9}"/>
               </a:ext>
             </a:extLst>
           </p:cNvPr>
@@ -8982,7 +8905,7 @@
                   <a:schemeClr val="bg1"/>
                 </a:solidFill>
               </a:rPr>
-              <a:t>Overall Process</a:t>
+              <a:t>Week 1</a:t>
             </a:r>
           </a:p>
         </p:txBody>
@@ -9932,35 +9855,122 @@
           </a:p>
         </p:txBody>
       </p:sp>
-      <p:pic>
-        <p:nvPicPr>
-          <p:cNvPr id="5" name="Content Placeholder 4">
+      <p:sp>
+        <p:nvSpPr>
+          <p:cNvPr id="3" name="Content Placeholder 2">
             <a:extLst>
               <a:ext uri="{FF2B5EF4-FFF2-40B4-BE49-F238E27FC236}">
-                <a16:creationId xmlns:a16="http://schemas.microsoft.com/office/drawing/2014/main" id="{945A3BE8-688B-4507-B834-962D8BEE7CDF}"/>
+                <a16:creationId xmlns:a16="http://schemas.microsoft.com/office/drawing/2014/main" id="{0C4D4AEE-E646-4D4F-8ACE-D9FDAE73E38E}"/>
               </a:ext>
             </a:extLst>
           </p:cNvPr>
-          <p:cNvPicPr>
-            <a:picLocks noGrp="1" noChangeAspect="1"/>
-          </p:cNvPicPr>
+          <p:cNvSpPr>
+            <a:spLocks noGrp="1"/>
+          </p:cNvSpPr>
           <p:nvPr>
             <p:ph idx="1"/>
           </p:nvPr>
-        </p:nvPicPr>
-        <p:blipFill>
-          <a:blip r:embed="rId2"/>
-          <a:stretch>
-            <a:fillRect/>
-          </a:stretch>
-        </p:blipFill>
+        </p:nvSpPr>
         <p:spPr>
           <a:xfrm>
-            <a:off x="6234113" y="1555496"/>
-            <a:ext cx="5218112" cy="3500946"/>
+            <a:off x="6234868" y="1130846"/>
+            <a:ext cx="5217173" cy="4351338"/>
           </a:xfrm>
         </p:spPr>
-      </p:pic>
+        <p:txBody>
+          <a:bodyPr>
+            <a:normAutofit fontScale="92500"/>
+          </a:bodyPr>
+          <a:lstStyle/>
+          <a:p>
+            <a:r>
+              <a:rPr lang="en-US" dirty="0">
+                <a:solidFill>
+                  <a:schemeClr val="bg1"/>
+                </a:solidFill>
+              </a:rPr>
+              <a:t>Understanding the problem</a:t>
+            </a:r>
+          </a:p>
+          <a:p>
+            <a:r>
+              <a:rPr lang="en-US" dirty="0">
+                <a:solidFill>
+                  <a:schemeClr val="bg1"/>
+                </a:solidFill>
+              </a:rPr>
+              <a:t>Learning about Django</a:t>
+            </a:r>
+          </a:p>
+          <a:p>
+            <a:r>
+              <a:rPr lang="en-US" dirty="0">
+                <a:solidFill>
+                  <a:schemeClr val="bg1"/>
+                </a:solidFill>
+              </a:rPr>
+              <a:t>Preparing skeleton framework</a:t>
+            </a:r>
+          </a:p>
+          <a:p>
+            <a:r>
+              <a:rPr lang="en-US" dirty="0">
+                <a:solidFill>
+                  <a:schemeClr val="bg1"/>
+                </a:solidFill>
+              </a:rPr>
+              <a:t>Configuring skeleton framework</a:t>
+            </a:r>
+          </a:p>
+          <a:p>
+            <a:r>
+              <a:rPr lang="en-US" dirty="0">
+                <a:solidFill>
+                  <a:schemeClr val="bg1"/>
+                </a:solidFill>
+              </a:rPr>
+              <a:t>Creating the Buyer’s Offer application</a:t>
+            </a:r>
+          </a:p>
+          <a:p>
+            <a:r>
+              <a:rPr lang="en-US" dirty="0">
+                <a:solidFill>
+                  <a:schemeClr val="bg1"/>
+                </a:solidFill>
+              </a:rPr>
+              <a:t>Creating the database and models</a:t>
+            </a:r>
+          </a:p>
+          <a:p>
+            <a:r>
+              <a:rPr lang="en-US" dirty="0">
+                <a:solidFill>
+                  <a:schemeClr val="bg1"/>
+                </a:solidFill>
+              </a:rPr>
+              <a:t>Creating the admin view</a:t>
+            </a:r>
+          </a:p>
+          <a:p>
+            <a:r>
+              <a:rPr lang="en-US" dirty="0">
+                <a:solidFill>
+                  <a:schemeClr val="bg1"/>
+                </a:solidFill>
+              </a:rPr>
+              <a:t>Creating the URLs and the UI</a:t>
+            </a:r>
+          </a:p>
+          <a:p>
+            <a:endParaRPr lang="en-US" dirty="0">
+              <a:solidFill>
+                <a:schemeClr val="bg1"/>
+              </a:solidFill>
+            </a:endParaRPr>
+          </a:p>
+        </p:txBody>
+      </p:sp>
       <p:grpSp>
         <p:nvGrpSpPr>
           <p:cNvPr id="28" name="Graphic 185">
@@ -10434,7 +10444,7 @@
     </p:spTree>
     <p:extLst>
       <p:ext uri="{BB962C8B-B14F-4D97-AF65-F5344CB8AC3E}">
-        <p14:creationId xmlns:p14="http://schemas.microsoft.com/office/powerpoint/2010/main" val="4259672879"/>
+        <p14:creationId xmlns:p14="http://schemas.microsoft.com/office/powerpoint/2010/main" val="3749003181"/>
       </p:ext>
     </p:extLst>
   </p:cSld>
@@ -10444,7 +10454,7 @@
 </p:sld>
 </file>
 
-<file path=ppt/slides/slide5.xml><?xml version="1.0" encoding="utf-8"?>
+<file path=ppt/slides/slide4.xml><?xml version="1.0" encoding="utf-8"?>
 <p:sld xmlns:a="http://schemas.openxmlformats.org/drawingml/2006/main" xmlns:r="http://schemas.openxmlformats.org/officeDocument/2006/relationships" xmlns:p="http://schemas.openxmlformats.org/presentationml/2006/main">
   <p:cSld>
     <p:bg>
@@ -10757,18 +10767,13 @@
           <a:p>
             <a:pPr algn="ctr"/>
             <a:r>
-              <a:rPr lang="en-US">
+              <a:rPr lang="en-US" dirty="0">
                 <a:solidFill>
                   <a:schemeClr val="bg1"/>
                 </a:solidFill>
               </a:rPr>
-              <a:t>Database Schema</a:t>
+              <a:t>Overall Process</a:t>
             </a:r>
-            <a:endParaRPr lang="en-US" dirty="0">
-              <a:solidFill>
-                <a:schemeClr val="bg1"/>
-              </a:solidFill>
-            </a:endParaRPr>
           </a:p>
         </p:txBody>
       </p:sp>
@@ -11717,6 +11722,35 @@
           </a:p>
         </p:txBody>
       </p:sp>
+      <p:pic>
+        <p:nvPicPr>
+          <p:cNvPr id="5" name="Content Placeholder 4">
+            <a:extLst>
+              <a:ext uri="{FF2B5EF4-FFF2-40B4-BE49-F238E27FC236}">
+                <a16:creationId xmlns:a16="http://schemas.microsoft.com/office/drawing/2014/main" id="{945A3BE8-688B-4507-B834-962D8BEE7CDF}"/>
+              </a:ext>
+            </a:extLst>
+          </p:cNvPr>
+          <p:cNvPicPr>
+            <a:picLocks noGrp="1" noChangeAspect="1"/>
+          </p:cNvPicPr>
+          <p:nvPr>
+            <p:ph idx="1"/>
+          </p:nvPr>
+        </p:nvPicPr>
+        <p:blipFill>
+          <a:blip r:embed="rId2"/>
+          <a:stretch>
+            <a:fillRect/>
+          </a:stretch>
+        </p:blipFill>
+        <p:spPr>
+          <a:xfrm>
+            <a:off x="6234113" y="1555496"/>
+            <a:ext cx="5218112" cy="3500946"/>
+          </a:xfrm>
+        </p:spPr>
+      </p:pic>
       <p:grpSp>
         <p:nvGrpSpPr>
           <p:cNvPr id="28" name="Graphic 185">
@@ -12187,45 +12221,10 @@
           </p:txBody>
         </p:sp>
       </p:grpSp>
-      <p:pic>
-        <p:nvPicPr>
-          <p:cNvPr id="15" name="Content Placeholder 14" descr="Diagram&#10;&#10;Description automatically generated">
-            <a:extLst>
-              <a:ext uri="{FF2B5EF4-FFF2-40B4-BE49-F238E27FC236}">
-                <a16:creationId xmlns:a16="http://schemas.microsoft.com/office/drawing/2014/main" id="{7FAFE1F4-039C-4BF1-8682-D23218555080}"/>
-              </a:ext>
-            </a:extLst>
-          </p:cNvPr>
-          <p:cNvPicPr>
-            <a:picLocks noGrp="1" noChangeAspect="1"/>
-          </p:cNvPicPr>
-          <p:nvPr>
-            <p:ph idx="1"/>
-          </p:nvPr>
-        </p:nvPicPr>
-        <p:blipFill>
-          <a:blip r:embed="rId2">
-            <a:extLst>
-              <a:ext uri="{28A0092B-C50C-407E-A947-70E740481C1C}">
-                <a14:useLocalDpi xmlns:a14="http://schemas.microsoft.com/office/drawing/2010/main" val="0"/>
-              </a:ext>
-            </a:extLst>
-          </a:blip>
-          <a:stretch>
-            <a:fillRect/>
-          </a:stretch>
-        </p:blipFill>
-        <p:spPr>
-          <a:xfrm>
-            <a:off x="6557195" y="1231412"/>
-            <a:ext cx="3674672" cy="4351338"/>
-          </a:xfrm>
-        </p:spPr>
-      </p:pic>
     </p:spTree>
     <p:extLst>
       <p:ext uri="{BB962C8B-B14F-4D97-AF65-F5344CB8AC3E}">
-        <p14:creationId xmlns:p14="http://schemas.microsoft.com/office/powerpoint/2010/main" val="3905641035"/>
+        <p14:creationId xmlns:p14="http://schemas.microsoft.com/office/powerpoint/2010/main" val="4259672879"/>
       </p:ext>
     </p:extLst>
   </p:cSld>
@@ -12235,7 +12234,7 @@
 </p:sld>
 </file>
 
-<file path=ppt/slides/slide6.xml><?xml version="1.0" encoding="utf-8"?>
+<file path=ppt/slides/slide5.xml><?xml version="1.0" encoding="utf-8"?>
 <p:sld xmlns:a="http://schemas.openxmlformats.org/drawingml/2006/main" xmlns:r="http://schemas.openxmlformats.org/officeDocument/2006/relationships" xmlns:p="http://schemas.openxmlformats.org/presentationml/2006/main">
   <p:cSld>
     <p:bg>
@@ -12548,13 +12547,18 @@
           <a:p>
             <a:pPr algn="ctr"/>
             <a:r>
-              <a:rPr lang="en-US" dirty="0">
+              <a:rPr lang="en-US">
                 <a:solidFill>
                   <a:schemeClr val="bg1"/>
                 </a:solidFill>
               </a:rPr>
-              <a:t>Demo</a:t>
+              <a:t>Database Schema</a:t>
             </a:r>
+            <a:endParaRPr lang="en-US" dirty="0">
+              <a:solidFill>
+                <a:schemeClr val="bg1"/>
+              </a:solidFill>
+            </a:endParaRPr>
           </a:p>
         </p:txBody>
       </p:sp>
@@ -13973,35 +13977,45 @@
           </p:txBody>
         </p:sp>
       </p:grpSp>
-      <p:sp>
-        <p:nvSpPr>
-          <p:cNvPr id="4" name="Content Placeholder 3">
+      <p:pic>
+        <p:nvPicPr>
+          <p:cNvPr id="15" name="Content Placeholder 14" descr="Diagram&#10;&#10;Description automatically generated">
             <a:extLst>
               <a:ext uri="{FF2B5EF4-FFF2-40B4-BE49-F238E27FC236}">
-                <a16:creationId xmlns:a16="http://schemas.microsoft.com/office/drawing/2014/main" id="{240E3A52-EBD4-415C-9ED0-C1FF167A7EEE}"/>
+                <a16:creationId xmlns:a16="http://schemas.microsoft.com/office/drawing/2014/main" id="{7FAFE1F4-039C-4BF1-8682-D23218555080}"/>
               </a:ext>
             </a:extLst>
           </p:cNvPr>
-          <p:cNvSpPr>
-            <a:spLocks noGrp="1"/>
-          </p:cNvSpPr>
+          <p:cNvPicPr>
+            <a:picLocks noGrp="1" noChangeAspect="1"/>
+          </p:cNvPicPr>
           <p:nvPr>
             <p:ph idx="1"/>
           </p:nvPr>
-        </p:nvSpPr>
-        <p:spPr/>
-        <p:txBody>
-          <a:bodyPr/>
-          <a:lstStyle/>
-          <a:p>
-            <a:endParaRPr lang="en-US"/>
-          </a:p>
-        </p:txBody>
-      </p:sp>
+        </p:nvPicPr>
+        <p:blipFill>
+          <a:blip r:embed="rId2">
+            <a:extLst>
+              <a:ext uri="{28A0092B-C50C-407E-A947-70E740481C1C}">
+                <a14:useLocalDpi xmlns:a14="http://schemas.microsoft.com/office/drawing/2010/main" val="0"/>
+              </a:ext>
+            </a:extLst>
+          </a:blip>
+          <a:stretch>
+            <a:fillRect/>
+          </a:stretch>
+        </p:blipFill>
+        <p:spPr>
+          <a:xfrm>
+            <a:off x="6557195" y="1231412"/>
+            <a:ext cx="3674672" cy="4351338"/>
+          </a:xfrm>
+        </p:spPr>
+      </p:pic>
     </p:spTree>
     <p:extLst>
       <p:ext uri="{BB962C8B-B14F-4D97-AF65-F5344CB8AC3E}">
-        <p14:creationId xmlns:p14="http://schemas.microsoft.com/office/powerpoint/2010/main" val="591433566"/>
+        <p14:creationId xmlns:p14="http://schemas.microsoft.com/office/powerpoint/2010/main" val="3905641035"/>
       </p:ext>
     </p:extLst>
   </p:cSld>
@@ -14011,7 +14025,7 @@
 </p:sld>
 </file>
 
-<file path=ppt/slides/slide7.xml><?xml version="1.0" encoding="utf-8"?>
+<file path=ppt/slides/slide6.xml><?xml version="1.0" encoding="utf-8"?>
 <p:sld xmlns:a="http://schemas.openxmlformats.org/drawingml/2006/main" xmlns:r="http://schemas.openxmlformats.org/officeDocument/2006/relationships" xmlns:p="http://schemas.openxmlformats.org/presentationml/2006/main">
   <p:cSld>
     <p:bg>
@@ -14329,7 +14343,7 @@
                   <a:schemeClr val="bg1"/>
                 </a:solidFill>
               </a:rPr>
-              <a:t>Thank You!</a:t>
+              <a:t>Week 2</a:t>
             </a:r>
           </a:p>
         </p:txBody>
@@ -15303,15 +15317,88 @@
         </p:spPr>
         <p:txBody>
           <a:bodyPr>
-            <a:normAutofit/>
+            <a:normAutofit fontScale="92500" lnSpcReduction="10000"/>
           </a:bodyPr>
           <a:lstStyle/>
           <a:p>
-            <a:endParaRPr lang="en-US" dirty="0">
-              <a:solidFill>
-                <a:schemeClr val="bg1"/>
-              </a:solidFill>
-            </a:endParaRPr>
+            <a:r>
+              <a:rPr lang="en-US">
+                <a:solidFill>
+                  <a:schemeClr val="bg1"/>
+                </a:solidFill>
+              </a:rPr>
+              <a:t>Understanding the PDFs</a:t>
+            </a:r>
+          </a:p>
+          <a:p>
+            <a:r>
+              <a:rPr lang="en-US" dirty="0">
+                <a:solidFill>
+                  <a:schemeClr val="bg1"/>
+                </a:solidFill>
+              </a:rPr>
+              <a:t>Exploring the possible options</a:t>
+            </a:r>
+          </a:p>
+          <a:p>
+            <a:r>
+              <a:rPr lang="en-US" dirty="0">
+                <a:solidFill>
+                  <a:schemeClr val="bg1"/>
+                </a:solidFill>
+              </a:rPr>
+              <a:t>Limitations with the first and second methods</a:t>
+            </a:r>
+          </a:p>
+          <a:p>
+            <a:r>
+              <a:rPr lang="en-US" dirty="0">
+                <a:solidFill>
+                  <a:schemeClr val="bg1"/>
+                </a:solidFill>
+              </a:rPr>
+              <a:t>Third method</a:t>
+            </a:r>
+          </a:p>
+          <a:p>
+            <a:r>
+              <a:rPr lang="en-US" dirty="0">
+                <a:solidFill>
+                  <a:schemeClr val="bg1"/>
+                </a:solidFill>
+              </a:rPr>
+              <a:t>Creating Helper function</a:t>
+            </a:r>
+          </a:p>
+          <a:p>
+            <a:r>
+              <a:rPr lang="en-US" dirty="0">
+                <a:solidFill>
+                  <a:schemeClr val="bg1"/>
+                </a:solidFill>
+              </a:rPr>
+              <a:t>Issues</a:t>
+            </a:r>
+          </a:p>
+          <a:p>
+            <a:r>
+              <a:rPr lang="en-US" dirty="0">
+                <a:solidFill>
+                  <a:schemeClr val="bg1"/>
+                </a:solidFill>
+              </a:rPr>
+              <a:t>Testing the PDF writing code</a:t>
+            </a:r>
+          </a:p>
+          <a:p>
+            <a:r>
+              <a:rPr lang="en-US" dirty="0">
+                <a:solidFill>
+                  <a:schemeClr val="bg1"/>
+                </a:solidFill>
+              </a:rPr>
+              <a:t>Updating the database, admin and UI</a:t>
+            </a:r>
           </a:p>
         </p:txBody>
       </p:sp>
@@ -15788,7 +15875,3680 @@
     </p:spTree>
     <p:extLst>
       <p:ext uri="{BB962C8B-B14F-4D97-AF65-F5344CB8AC3E}">
-        <p14:creationId xmlns:p14="http://schemas.microsoft.com/office/powerpoint/2010/main" val="801095369"/>
+        <p14:creationId xmlns:p14="http://schemas.microsoft.com/office/powerpoint/2010/main" val="297971758"/>
+      </p:ext>
+    </p:extLst>
+  </p:cSld>
+  <p:clrMapOvr>
+    <a:masterClrMapping/>
+  </p:clrMapOvr>
+</p:sld>
+</file>
+
+<file path=ppt/slides/slide7.xml><?xml version="1.0" encoding="utf-8"?>
+<p:sld xmlns:a="http://schemas.openxmlformats.org/drawingml/2006/main" xmlns:r="http://schemas.openxmlformats.org/officeDocument/2006/relationships" xmlns:p="http://schemas.openxmlformats.org/presentationml/2006/main">
+  <p:cSld>
+    <p:bg>
+      <p:bgPr>
+        <a:solidFill>
+          <a:schemeClr val="bg1"/>
+        </a:solidFill>
+        <a:effectLst/>
+      </p:bgPr>
+    </p:bg>
+    <p:spTree>
+      <p:nvGrpSpPr>
+        <p:cNvPr id="1" name=""/>
+        <p:cNvGrpSpPr/>
+        <p:nvPr/>
+      </p:nvGrpSpPr>
+      <p:grpSpPr>
+        <a:xfrm>
+          <a:off x="0" y="0"/>
+          <a:ext cx="0" cy="0"/>
+          <a:chOff x="0" y="0"/>
+          <a:chExt cx="0" cy="0"/>
+        </a:xfrm>
+      </p:grpSpPr>
+      <p:sp>
+        <p:nvSpPr>
+          <p:cNvPr id="8" name="Rectangle 7">
+            <a:extLst>
+              <a:ext uri="{FF2B5EF4-FFF2-40B4-BE49-F238E27FC236}">
+                <a16:creationId xmlns:a16="http://schemas.microsoft.com/office/drawing/2014/main" id="{5A0118C5-4F8D-4CF4-BADD-53FEACC6C42A}"/>
+              </a:ext>
+              <a:ext uri="{C183D7F6-B498-43B3-948B-1728B52AA6E4}">
+                <adec:decorative xmlns:adec="http://schemas.microsoft.com/office/drawing/2017/decorative" val="1"/>
+              </a:ext>
+            </a:extLst>
+          </p:cNvPr>
+          <p:cNvSpPr>
+            <a:spLocks noGrp="1" noRot="1" noChangeAspect="1" noMove="1" noResize="1" noEditPoints="1" noAdjustHandles="1" noChangeArrowheads="1" noChangeShapeType="1" noTextEdit="1"/>
+          </p:cNvSpPr>
+          <p:nvPr>
+            <p:extLst>
+              <p:ext uri="{386F3935-93C4-4BCD-93E2-E3B085C9AB24}">
+                <p16:designElem xmlns:p16="http://schemas.microsoft.com/office/powerpoint/2015/main" val="1"/>
+              </p:ext>
+            </p:extLst>
+          </p:nvPr>
+        </p:nvSpPr>
+        <p:spPr>
+          <a:xfrm>
+            <a:off x="0" y="0"/>
+            <a:ext cx="12192000" cy="6858000"/>
+          </a:xfrm>
+          <a:prstGeom prst="rect">
+            <a:avLst/>
+          </a:prstGeom>
+          <a:solidFill>
+            <a:schemeClr val="tx1"/>
+          </a:solidFill>
+          <a:ln>
+            <a:noFill/>
+          </a:ln>
+        </p:spPr>
+        <p:style>
+          <a:lnRef idx="2">
+            <a:schemeClr val="accent1">
+              <a:shade val="50000"/>
+            </a:schemeClr>
+          </a:lnRef>
+          <a:fillRef idx="1">
+            <a:schemeClr val="accent1"/>
+          </a:fillRef>
+          <a:effectRef idx="0">
+            <a:schemeClr val="accent1"/>
+          </a:effectRef>
+          <a:fontRef idx="minor">
+            <a:schemeClr val="lt1"/>
+          </a:fontRef>
+        </p:style>
+        <p:txBody>
+          <a:bodyPr rtlCol="0" anchor="ctr"/>
+          <a:lstStyle/>
+          <a:p>
+            <a:pPr algn="ctr"/>
+            <a:endParaRPr lang="en-US" dirty="0"/>
+          </a:p>
+        </p:txBody>
+      </p:sp>
+      <p:sp>
+        <p:nvSpPr>
+          <p:cNvPr id="10" name="Oval 9">
+            <a:extLst>
+              <a:ext uri="{FF2B5EF4-FFF2-40B4-BE49-F238E27FC236}">
+                <a16:creationId xmlns:a16="http://schemas.microsoft.com/office/drawing/2014/main" id="{4E0A5C5C-2A95-428E-9F6A-0D29EBD57C9F}"/>
+              </a:ext>
+              <a:ext uri="{C183D7F6-B498-43B3-948B-1728B52AA6E4}">
+                <adec:decorative xmlns:adec="http://schemas.microsoft.com/office/drawing/2017/decorative" val="1"/>
+              </a:ext>
+            </a:extLst>
+          </p:cNvPr>
+          <p:cNvSpPr>
+            <a:spLocks noGrp="1" noRot="1" noChangeAspect="1" noMove="1" noResize="1" noEditPoints="1" noAdjustHandles="1" noChangeArrowheads="1" noChangeShapeType="1" noTextEdit="1"/>
+          </p:cNvSpPr>
+          <p:nvPr>
+            <p:extLst>
+              <p:ext uri="{386F3935-93C4-4BCD-93E2-E3B085C9AB24}">
+                <p16:designElem xmlns:p16="http://schemas.microsoft.com/office/powerpoint/2015/main" val="1"/>
+              </p:ext>
+            </p:extLst>
+          </p:nvPr>
+        </p:nvSpPr>
+        <p:spPr>
+          <a:xfrm>
+            <a:off x="888395" y="1040837"/>
+            <a:ext cx="4754948" cy="4754948"/>
+          </a:xfrm>
+          <a:prstGeom prst="ellipse">
+            <a:avLst/>
+          </a:prstGeom>
+          <a:solidFill>
+            <a:srgbClr val="FFFFFF"/>
+          </a:solidFill>
+          <a:ln w="28575">
+            <a:noFill/>
+          </a:ln>
+        </p:spPr>
+        <p:style>
+          <a:lnRef idx="2">
+            <a:schemeClr val="accent1">
+              <a:shade val="50000"/>
+            </a:schemeClr>
+          </a:lnRef>
+          <a:fillRef idx="1">
+            <a:schemeClr val="accent1"/>
+          </a:fillRef>
+          <a:effectRef idx="0">
+            <a:schemeClr val="accent1"/>
+          </a:effectRef>
+          <a:fontRef idx="minor">
+            <a:schemeClr val="lt1"/>
+          </a:fontRef>
+        </p:style>
+        <p:txBody>
+          <a:bodyPr rtlCol="0" anchor="ctr"/>
+          <a:lstStyle/>
+          <a:p>
+            <a:pPr algn="ctr"/>
+            <a:endParaRPr lang="en-US"/>
+          </a:p>
+        </p:txBody>
+      </p:sp>
+      <p:sp>
+        <p:nvSpPr>
+          <p:cNvPr id="12" name="Oval 11">
+            <a:extLst>
+              <a:ext uri="{FF2B5EF4-FFF2-40B4-BE49-F238E27FC236}">
+                <a16:creationId xmlns:a16="http://schemas.microsoft.com/office/drawing/2014/main" id="{1056F38F-7C4E-461D-8709-7D0024AE1F79}"/>
+              </a:ext>
+              <a:ext uri="{C183D7F6-B498-43B3-948B-1728B52AA6E4}">
+                <adec:decorative xmlns:adec="http://schemas.microsoft.com/office/drawing/2017/decorative" val="1"/>
+              </a:ext>
+            </a:extLst>
+          </p:cNvPr>
+          <p:cNvSpPr>
+            <a:spLocks noGrp="1" noRot="1" noChangeAspect="1" noMove="1" noResize="1" noEditPoints="1" noAdjustHandles="1" noChangeArrowheads="1" noChangeShapeType="1" noTextEdit="1"/>
+          </p:cNvSpPr>
+          <p:nvPr>
+            <p:extLst>
+              <p:ext uri="{386F3935-93C4-4BCD-93E2-E3B085C9AB24}">
+                <p16:designElem xmlns:p16="http://schemas.microsoft.com/office/powerpoint/2015/main" val="1"/>
+              </p:ext>
+            </p:extLst>
+          </p:nvPr>
+        </p:nvSpPr>
+        <p:spPr>
+          <a:xfrm>
+            <a:off x="879411" y="1029607"/>
+            <a:ext cx="4754948" cy="4754948"/>
+          </a:xfrm>
+          <a:prstGeom prst="ellipse">
+            <a:avLst/>
+          </a:prstGeom>
+          <a:solidFill>
+            <a:schemeClr val="accent6">
+              <a:alpha val="30000"/>
+            </a:schemeClr>
+          </a:solidFill>
+          <a:ln w="28575">
+            <a:solidFill>
+              <a:schemeClr val="bg1"/>
+            </a:solidFill>
+          </a:ln>
+        </p:spPr>
+        <p:style>
+          <a:lnRef idx="2">
+            <a:schemeClr val="accent1">
+              <a:shade val="50000"/>
+            </a:schemeClr>
+          </a:lnRef>
+          <a:fillRef idx="1">
+            <a:schemeClr val="accent1"/>
+          </a:fillRef>
+          <a:effectRef idx="0">
+            <a:schemeClr val="accent1"/>
+          </a:effectRef>
+          <a:fontRef idx="minor">
+            <a:schemeClr val="lt1"/>
+          </a:fontRef>
+        </p:style>
+        <p:txBody>
+          <a:bodyPr rtlCol="0" anchor="ctr"/>
+          <a:lstStyle/>
+          <a:p>
+            <a:pPr algn="ctr"/>
+            <a:endParaRPr lang="en-US"/>
+          </a:p>
+        </p:txBody>
+      </p:sp>
+      <p:sp>
+        <p:nvSpPr>
+          <p:cNvPr id="14" name="Oval 13">
+            <a:extLst>
+              <a:ext uri="{FF2B5EF4-FFF2-40B4-BE49-F238E27FC236}">
+                <a16:creationId xmlns:a16="http://schemas.microsoft.com/office/drawing/2014/main" id="{C7278469-3C3C-49CE-AEEE-E176A4900B78}"/>
+              </a:ext>
+              <a:ext uri="{C183D7F6-B498-43B3-948B-1728B52AA6E4}">
+                <adec:decorative xmlns:adec="http://schemas.microsoft.com/office/drawing/2017/decorative" val="1"/>
+              </a:ext>
+            </a:extLst>
+          </p:cNvPr>
+          <p:cNvSpPr>
+            <a:spLocks noGrp="1" noRot="1" noChangeAspect="1" noMove="1" noResize="1" noEditPoints="1" noAdjustHandles="1" noChangeArrowheads="1" noChangeShapeType="1" noTextEdit="1"/>
+          </p:cNvSpPr>
+          <p:nvPr>
+            <p:extLst>
+              <p:ext uri="{386F3935-93C4-4BCD-93E2-E3B085C9AB24}">
+                <p16:designElem xmlns:p16="http://schemas.microsoft.com/office/powerpoint/2015/main" val="1"/>
+              </p:ext>
+            </p:extLst>
+          </p:nvPr>
+        </p:nvSpPr>
+        <p:spPr>
+          <a:xfrm>
+            <a:off x="739960" y="934855"/>
+            <a:ext cx="4754948" cy="4754948"/>
+          </a:xfrm>
+          <a:prstGeom prst="ellipse">
+            <a:avLst/>
+          </a:prstGeom>
+          <a:solidFill>
+            <a:schemeClr val="tx1"/>
+          </a:solidFill>
+          <a:ln w="28575">
+            <a:solidFill>
+              <a:schemeClr val="bg1"/>
+            </a:solidFill>
+          </a:ln>
+        </p:spPr>
+        <p:style>
+          <a:lnRef idx="2">
+            <a:schemeClr val="accent1">
+              <a:shade val="50000"/>
+            </a:schemeClr>
+          </a:lnRef>
+          <a:fillRef idx="1">
+            <a:schemeClr val="accent1"/>
+          </a:fillRef>
+          <a:effectRef idx="0">
+            <a:schemeClr val="accent1"/>
+          </a:effectRef>
+          <a:fontRef idx="minor">
+            <a:schemeClr val="lt1"/>
+          </a:fontRef>
+        </p:style>
+        <p:txBody>
+          <a:bodyPr rtlCol="0" anchor="ctr"/>
+          <a:lstStyle/>
+          <a:p>
+            <a:pPr algn="ctr"/>
+            <a:endParaRPr lang="en-US"/>
+          </a:p>
+        </p:txBody>
+      </p:sp>
+      <p:sp>
+        <p:nvSpPr>
+          <p:cNvPr id="2" name="Title 1">
+            <a:extLst>
+              <a:ext uri="{FF2B5EF4-FFF2-40B4-BE49-F238E27FC236}">
+                <a16:creationId xmlns:a16="http://schemas.microsoft.com/office/drawing/2014/main" id="{2D2A6F50-66D4-43FB-935C-2FF4844F32A6}"/>
+              </a:ext>
+            </a:extLst>
+          </p:cNvPr>
+          <p:cNvSpPr>
+            <a:spLocks noGrp="1"/>
+          </p:cNvSpPr>
+          <p:nvPr>
+            <p:ph type="title"/>
+          </p:nvPr>
+        </p:nvSpPr>
+        <p:spPr>
+          <a:xfrm>
+            <a:off x="1102368" y="1877492"/>
+            <a:ext cx="4030132" cy="3215373"/>
+          </a:xfrm>
+        </p:spPr>
+        <p:txBody>
+          <a:bodyPr>
+            <a:normAutofit/>
+          </a:bodyPr>
+          <a:lstStyle/>
+          <a:p>
+            <a:pPr algn="ctr"/>
+            <a:r>
+              <a:rPr lang="en-US" dirty="0">
+                <a:solidFill>
+                  <a:schemeClr val="bg1"/>
+                </a:solidFill>
+              </a:rPr>
+              <a:t>Structure</a:t>
+            </a:r>
+          </a:p>
+        </p:txBody>
+      </p:sp>
+      <p:grpSp>
+        <p:nvGrpSpPr>
+          <p:cNvPr id="16" name="Group 15">
+            <a:extLst>
+              <a:ext uri="{FF2B5EF4-FFF2-40B4-BE49-F238E27FC236}">
+                <a16:creationId xmlns:a16="http://schemas.microsoft.com/office/drawing/2014/main" id="{93DC754C-7E09-422D-A8BB-AF632E90DFA2}"/>
+              </a:ext>
+              <a:ext uri="{C183D7F6-B498-43B3-948B-1728B52AA6E4}">
+                <adec:decorative xmlns:adec="http://schemas.microsoft.com/office/drawing/2017/decorative" val="1"/>
+              </a:ext>
+            </a:extLst>
+          </p:cNvPr>
+          <p:cNvGrpSpPr>
+            <a:grpSpLocks noGrp="1" noUngrp="1" noRot="1" noChangeAspect="1" noMove="1" noResize="1"/>
+          </p:cNvGrpSpPr>
+          <p:nvPr>
+            <p:extLst>
+              <p:ext uri="{386F3935-93C4-4BCD-93E2-E3B085C9AB24}">
+                <p16:designElem xmlns:p16="http://schemas.microsoft.com/office/powerpoint/2015/main" val="1"/>
+              </p:ext>
+            </p:extLst>
+          </p:nvPr>
+        </p:nvGrpSpPr>
+        <p:grpSpPr>
+          <a:xfrm>
+            <a:off x="0" y="377893"/>
+            <a:ext cx="1861854" cy="717514"/>
+            <a:chOff x="0" y="377893"/>
+            <a:chExt cx="1861854" cy="717514"/>
+          </a:xfrm>
+          <a:solidFill>
+            <a:schemeClr val="bg1"/>
+          </a:solidFill>
+        </p:grpSpPr>
+        <p:sp>
+          <p:nvSpPr>
+            <p:cNvPr id="17" name="Freeform: Shape 16">
+              <a:extLst>
+                <a:ext uri="{FF2B5EF4-FFF2-40B4-BE49-F238E27FC236}">
+                  <a16:creationId xmlns:a16="http://schemas.microsoft.com/office/drawing/2014/main" id="{C5A741B9-65EC-4C5B-9FE0-4A18575771A6}"/>
+                </a:ext>
+                <a:ext uri="{C183D7F6-B498-43B3-948B-1728B52AA6E4}">
+                  <adec:decorative xmlns:adec="http://schemas.microsoft.com/office/drawing/2017/decorative" val="1"/>
+                </a:ext>
+              </a:extLst>
+            </p:cNvPr>
+            <p:cNvSpPr/>
+            <p:nvPr>
+              <p:extLst>
+                <p:ext uri="{386F3935-93C4-4BCD-93E2-E3B085C9AB24}">
+                  <p16:designElem xmlns:p16="http://schemas.microsoft.com/office/powerpoint/2015/main" val="1"/>
+                </p:ext>
+              </p:extLst>
+            </p:nvPr>
+          </p:nvSpPr>
+          <p:spPr>
+            <a:xfrm>
+              <a:off x="0" y="377893"/>
+              <a:ext cx="1861854" cy="277779"/>
+            </a:xfrm>
+            <a:custGeom>
+              <a:avLst/>
+              <a:gdLst>
+                <a:gd name="connsiteX0" fmla="*/ 180458 w 1861854"/>
+                <a:gd name="connsiteY0" fmla="*/ 0 h 277779"/>
+                <a:gd name="connsiteX1" fmla="*/ 419222 w 1861854"/>
+                <a:gd name="connsiteY1" fmla="*/ 238761 h 277779"/>
+                <a:gd name="connsiteX2" fmla="*/ 657984 w 1861854"/>
+                <a:gd name="connsiteY2" fmla="*/ 0 h 277779"/>
+                <a:gd name="connsiteX3" fmla="*/ 896745 w 1861854"/>
+                <a:gd name="connsiteY3" fmla="*/ 238761 h 277779"/>
+                <a:gd name="connsiteX4" fmla="*/ 1135754 w 1861854"/>
+                <a:gd name="connsiteY4" fmla="*/ 0 h 277779"/>
+                <a:gd name="connsiteX5" fmla="*/ 1374516 w 1861854"/>
+                <a:gd name="connsiteY5" fmla="*/ 238761 h 277779"/>
+                <a:gd name="connsiteX6" fmla="*/ 1613277 w 1861854"/>
+                <a:gd name="connsiteY6" fmla="*/ 0 h 277779"/>
+                <a:gd name="connsiteX7" fmla="*/ 1861854 w 1861854"/>
+                <a:gd name="connsiteY7" fmla="*/ 248577 h 277779"/>
+                <a:gd name="connsiteX8" fmla="*/ 1842470 w 1861854"/>
+                <a:gd name="connsiteY8" fmla="*/ 267963 h 277779"/>
+                <a:gd name="connsiteX9" fmla="*/ 1613277 w 1861854"/>
+                <a:gd name="connsiteY9" fmla="*/ 39017 h 277779"/>
+                <a:gd name="connsiteX10" fmla="*/ 1374516 w 1861854"/>
+                <a:gd name="connsiteY10" fmla="*/ 277779 h 277779"/>
+                <a:gd name="connsiteX11" fmla="*/ 1135754 w 1861854"/>
+                <a:gd name="connsiteY11" fmla="*/ 39017 h 277779"/>
+                <a:gd name="connsiteX12" fmla="*/ 896745 w 1861854"/>
+                <a:gd name="connsiteY12" fmla="*/ 277779 h 277779"/>
+                <a:gd name="connsiteX13" fmla="*/ 657984 w 1861854"/>
+                <a:gd name="connsiteY13" fmla="*/ 39017 h 277779"/>
+                <a:gd name="connsiteX14" fmla="*/ 419222 w 1861854"/>
+                <a:gd name="connsiteY14" fmla="*/ 277779 h 277779"/>
+                <a:gd name="connsiteX15" fmla="*/ 180458 w 1861854"/>
+                <a:gd name="connsiteY15" fmla="*/ 39017 h 277779"/>
+                <a:gd name="connsiteX16" fmla="*/ 0 w 1861854"/>
+                <a:gd name="connsiteY16" fmla="*/ 219283 h 277779"/>
+                <a:gd name="connsiteX17" fmla="*/ 0 w 1861854"/>
+                <a:gd name="connsiteY17" fmla="*/ 180458 h 277779"/>
+              </a:gdLst>
+              <a:ahLst/>
+              <a:cxnLst>
+                <a:cxn ang="0">
+                  <a:pos x="connsiteX0" y="connsiteY0"/>
+                </a:cxn>
+                <a:cxn ang="0">
+                  <a:pos x="connsiteX1" y="connsiteY1"/>
+                </a:cxn>
+                <a:cxn ang="0">
+                  <a:pos x="connsiteX2" y="connsiteY2"/>
+                </a:cxn>
+                <a:cxn ang="0">
+                  <a:pos x="connsiteX3" y="connsiteY3"/>
+                </a:cxn>
+                <a:cxn ang="0">
+                  <a:pos x="connsiteX4" y="connsiteY4"/>
+                </a:cxn>
+                <a:cxn ang="0">
+                  <a:pos x="connsiteX5" y="connsiteY5"/>
+                </a:cxn>
+                <a:cxn ang="0">
+                  <a:pos x="connsiteX6" y="connsiteY6"/>
+                </a:cxn>
+                <a:cxn ang="0">
+                  <a:pos x="connsiteX7" y="connsiteY7"/>
+                </a:cxn>
+                <a:cxn ang="0">
+                  <a:pos x="connsiteX8" y="connsiteY8"/>
+                </a:cxn>
+                <a:cxn ang="0">
+                  <a:pos x="connsiteX9" y="connsiteY9"/>
+                </a:cxn>
+                <a:cxn ang="0">
+                  <a:pos x="connsiteX10" y="connsiteY10"/>
+                </a:cxn>
+                <a:cxn ang="0">
+                  <a:pos x="connsiteX11" y="connsiteY11"/>
+                </a:cxn>
+                <a:cxn ang="0">
+                  <a:pos x="connsiteX12" y="connsiteY12"/>
+                </a:cxn>
+                <a:cxn ang="0">
+                  <a:pos x="connsiteX13" y="connsiteY13"/>
+                </a:cxn>
+                <a:cxn ang="0">
+                  <a:pos x="connsiteX14" y="connsiteY14"/>
+                </a:cxn>
+                <a:cxn ang="0">
+                  <a:pos x="connsiteX15" y="connsiteY15"/>
+                </a:cxn>
+                <a:cxn ang="0">
+                  <a:pos x="connsiteX16" y="connsiteY16"/>
+                </a:cxn>
+                <a:cxn ang="0">
+                  <a:pos x="connsiteX17" y="connsiteY17"/>
+                </a:cxn>
+              </a:cxnLst>
+              <a:rect l="l" t="t" r="r" b="b"/>
+              <a:pathLst>
+                <a:path w="1861854" h="277779">
+                  <a:moveTo>
+                    <a:pt x="180458" y="0"/>
+                  </a:moveTo>
+                  <a:lnTo>
+                    <a:pt x="419222" y="238761"/>
+                  </a:lnTo>
+                  <a:lnTo>
+                    <a:pt x="657984" y="0"/>
+                  </a:lnTo>
+                  <a:lnTo>
+                    <a:pt x="896745" y="238761"/>
+                  </a:lnTo>
+                  <a:lnTo>
+                    <a:pt x="1135754" y="0"/>
+                  </a:lnTo>
+                  <a:lnTo>
+                    <a:pt x="1374516" y="238761"/>
+                  </a:lnTo>
+                  <a:lnTo>
+                    <a:pt x="1613277" y="0"/>
+                  </a:lnTo>
+                  <a:lnTo>
+                    <a:pt x="1861854" y="248577"/>
+                  </a:lnTo>
+                  <a:lnTo>
+                    <a:pt x="1842470" y="267963"/>
+                  </a:lnTo>
+                  <a:lnTo>
+                    <a:pt x="1613277" y="39017"/>
+                  </a:lnTo>
+                  <a:lnTo>
+                    <a:pt x="1374516" y="277779"/>
+                  </a:lnTo>
+                  <a:lnTo>
+                    <a:pt x="1135754" y="39017"/>
+                  </a:lnTo>
+                  <a:lnTo>
+                    <a:pt x="896745" y="277779"/>
+                  </a:lnTo>
+                  <a:lnTo>
+                    <a:pt x="657984" y="39017"/>
+                  </a:lnTo>
+                  <a:lnTo>
+                    <a:pt x="419222" y="277779"/>
+                  </a:lnTo>
+                  <a:lnTo>
+                    <a:pt x="180458" y="39017"/>
+                  </a:lnTo>
+                  <a:lnTo>
+                    <a:pt x="0" y="219283"/>
+                  </a:lnTo>
+                  <a:lnTo>
+                    <a:pt x="0" y="180458"/>
+                  </a:lnTo>
+                  <a:close/>
+                </a:path>
+              </a:pathLst>
+            </a:custGeom>
+            <a:grpFill/>
+            <a:ln w="9525" cap="flat">
+              <a:noFill/>
+              <a:prstDash val="solid"/>
+              <a:miter/>
+            </a:ln>
+          </p:spPr>
+          <p:txBody>
+            <a:bodyPr wrap="square" rtlCol="0" anchor="ctr">
+              <a:noAutofit/>
+            </a:bodyPr>
+            <a:lstStyle/>
+            <a:p>
+              <a:endParaRPr lang="en-US"/>
+            </a:p>
+          </p:txBody>
+        </p:sp>
+        <p:sp>
+          <p:nvSpPr>
+            <p:cNvPr id="18" name="Freeform: Shape 17">
+              <a:extLst>
+                <a:ext uri="{FF2B5EF4-FFF2-40B4-BE49-F238E27FC236}">
+                  <a16:creationId xmlns:a16="http://schemas.microsoft.com/office/drawing/2014/main" id="{C0BB4301-41FA-4453-956F-A11CC664B68B}"/>
+                </a:ext>
+                <a:ext uri="{C183D7F6-B498-43B3-948B-1728B52AA6E4}">
+                  <adec:decorative xmlns:adec="http://schemas.microsoft.com/office/drawing/2017/decorative" val="1"/>
+                </a:ext>
+              </a:extLst>
+            </p:cNvPr>
+            <p:cNvSpPr/>
+            <p:nvPr>
+              <p:extLst>
+                <p:ext uri="{386F3935-93C4-4BCD-93E2-E3B085C9AB24}">
+                  <p16:designElem xmlns:p16="http://schemas.microsoft.com/office/powerpoint/2015/main" val="1"/>
+                </p:ext>
+              </p:extLst>
+            </p:nvPr>
+          </p:nvSpPr>
+          <p:spPr>
+            <a:xfrm>
+              <a:off x="0" y="817628"/>
+              <a:ext cx="1861854" cy="277779"/>
+            </a:xfrm>
+            <a:custGeom>
+              <a:avLst/>
+              <a:gdLst>
+                <a:gd name="connsiteX0" fmla="*/ 180458 w 1861854"/>
+                <a:gd name="connsiteY0" fmla="*/ 0 h 277779"/>
+                <a:gd name="connsiteX1" fmla="*/ 419222 w 1861854"/>
+                <a:gd name="connsiteY1" fmla="*/ 238761 h 277779"/>
+                <a:gd name="connsiteX2" fmla="*/ 657984 w 1861854"/>
+                <a:gd name="connsiteY2" fmla="*/ 0 h 277779"/>
+                <a:gd name="connsiteX3" fmla="*/ 896745 w 1861854"/>
+                <a:gd name="connsiteY3" fmla="*/ 238761 h 277779"/>
+                <a:gd name="connsiteX4" fmla="*/ 1135754 w 1861854"/>
+                <a:gd name="connsiteY4" fmla="*/ 0 h 277779"/>
+                <a:gd name="connsiteX5" fmla="*/ 1374516 w 1861854"/>
+                <a:gd name="connsiteY5" fmla="*/ 238761 h 277779"/>
+                <a:gd name="connsiteX6" fmla="*/ 1613277 w 1861854"/>
+                <a:gd name="connsiteY6" fmla="*/ 0 h 277779"/>
+                <a:gd name="connsiteX7" fmla="*/ 1861854 w 1861854"/>
+                <a:gd name="connsiteY7" fmla="*/ 248577 h 277779"/>
+                <a:gd name="connsiteX8" fmla="*/ 1842470 w 1861854"/>
+                <a:gd name="connsiteY8" fmla="*/ 268208 h 277779"/>
+                <a:gd name="connsiteX9" fmla="*/ 1613277 w 1861854"/>
+                <a:gd name="connsiteY9" fmla="*/ 39017 h 277779"/>
+                <a:gd name="connsiteX10" fmla="*/ 1374516 w 1861854"/>
+                <a:gd name="connsiteY10" fmla="*/ 277779 h 277779"/>
+                <a:gd name="connsiteX11" fmla="*/ 1135754 w 1861854"/>
+                <a:gd name="connsiteY11" fmla="*/ 39017 h 277779"/>
+                <a:gd name="connsiteX12" fmla="*/ 896745 w 1861854"/>
+                <a:gd name="connsiteY12" fmla="*/ 277779 h 277779"/>
+                <a:gd name="connsiteX13" fmla="*/ 657984 w 1861854"/>
+                <a:gd name="connsiteY13" fmla="*/ 39017 h 277779"/>
+                <a:gd name="connsiteX14" fmla="*/ 419222 w 1861854"/>
+                <a:gd name="connsiteY14" fmla="*/ 277779 h 277779"/>
+                <a:gd name="connsiteX15" fmla="*/ 180458 w 1861854"/>
+                <a:gd name="connsiteY15" fmla="*/ 39017 h 277779"/>
+                <a:gd name="connsiteX16" fmla="*/ 0 w 1861854"/>
+                <a:gd name="connsiteY16" fmla="*/ 219475 h 277779"/>
+                <a:gd name="connsiteX17" fmla="*/ 0 w 1861854"/>
+                <a:gd name="connsiteY17" fmla="*/ 180458 h 277779"/>
+              </a:gdLst>
+              <a:ahLst/>
+              <a:cxnLst>
+                <a:cxn ang="0">
+                  <a:pos x="connsiteX0" y="connsiteY0"/>
+                </a:cxn>
+                <a:cxn ang="0">
+                  <a:pos x="connsiteX1" y="connsiteY1"/>
+                </a:cxn>
+                <a:cxn ang="0">
+                  <a:pos x="connsiteX2" y="connsiteY2"/>
+                </a:cxn>
+                <a:cxn ang="0">
+                  <a:pos x="connsiteX3" y="connsiteY3"/>
+                </a:cxn>
+                <a:cxn ang="0">
+                  <a:pos x="connsiteX4" y="connsiteY4"/>
+                </a:cxn>
+                <a:cxn ang="0">
+                  <a:pos x="connsiteX5" y="connsiteY5"/>
+                </a:cxn>
+                <a:cxn ang="0">
+                  <a:pos x="connsiteX6" y="connsiteY6"/>
+                </a:cxn>
+                <a:cxn ang="0">
+                  <a:pos x="connsiteX7" y="connsiteY7"/>
+                </a:cxn>
+                <a:cxn ang="0">
+                  <a:pos x="connsiteX8" y="connsiteY8"/>
+                </a:cxn>
+                <a:cxn ang="0">
+                  <a:pos x="connsiteX9" y="connsiteY9"/>
+                </a:cxn>
+                <a:cxn ang="0">
+                  <a:pos x="connsiteX10" y="connsiteY10"/>
+                </a:cxn>
+                <a:cxn ang="0">
+                  <a:pos x="connsiteX11" y="connsiteY11"/>
+                </a:cxn>
+                <a:cxn ang="0">
+                  <a:pos x="connsiteX12" y="connsiteY12"/>
+                </a:cxn>
+                <a:cxn ang="0">
+                  <a:pos x="connsiteX13" y="connsiteY13"/>
+                </a:cxn>
+                <a:cxn ang="0">
+                  <a:pos x="connsiteX14" y="connsiteY14"/>
+                </a:cxn>
+                <a:cxn ang="0">
+                  <a:pos x="connsiteX15" y="connsiteY15"/>
+                </a:cxn>
+                <a:cxn ang="0">
+                  <a:pos x="connsiteX16" y="connsiteY16"/>
+                </a:cxn>
+                <a:cxn ang="0">
+                  <a:pos x="connsiteX17" y="connsiteY17"/>
+                </a:cxn>
+              </a:cxnLst>
+              <a:rect l="l" t="t" r="r" b="b"/>
+              <a:pathLst>
+                <a:path w="1861854" h="277779">
+                  <a:moveTo>
+                    <a:pt x="180458" y="0"/>
+                  </a:moveTo>
+                  <a:lnTo>
+                    <a:pt x="419222" y="238761"/>
+                  </a:lnTo>
+                  <a:lnTo>
+                    <a:pt x="657984" y="0"/>
+                  </a:lnTo>
+                  <a:lnTo>
+                    <a:pt x="896745" y="238761"/>
+                  </a:lnTo>
+                  <a:lnTo>
+                    <a:pt x="1135754" y="0"/>
+                  </a:lnTo>
+                  <a:lnTo>
+                    <a:pt x="1374516" y="238761"/>
+                  </a:lnTo>
+                  <a:lnTo>
+                    <a:pt x="1613277" y="0"/>
+                  </a:lnTo>
+                  <a:lnTo>
+                    <a:pt x="1861854" y="248577"/>
+                  </a:lnTo>
+                  <a:lnTo>
+                    <a:pt x="1842470" y="268208"/>
+                  </a:lnTo>
+                  <a:lnTo>
+                    <a:pt x="1613277" y="39017"/>
+                  </a:lnTo>
+                  <a:lnTo>
+                    <a:pt x="1374516" y="277779"/>
+                  </a:lnTo>
+                  <a:lnTo>
+                    <a:pt x="1135754" y="39017"/>
+                  </a:lnTo>
+                  <a:lnTo>
+                    <a:pt x="896745" y="277779"/>
+                  </a:lnTo>
+                  <a:lnTo>
+                    <a:pt x="657984" y="39017"/>
+                  </a:lnTo>
+                  <a:lnTo>
+                    <a:pt x="419222" y="277779"/>
+                  </a:lnTo>
+                  <a:lnTo>
+                    <a:pt x="180458" y="39017"/>
+                  </a:lnTo>
+                  <a:lnTo>
+                    <a:pt x="0" y="219475"/>
+                  </a:lnTo>
+                  <a:lnTo>
+                    <a:pt x="0" y="180458"/>
+                  </a:lnTo>
+                  <a:close/>
+                </a:path>
+              </a:pathLst>
+            </a:custGeom>
+            <a:grpFill/>
+            <a:ln w="9525" cap="flat">
+              <a:noFill/>
+              <a:prstDash val="solid"/>
+              <a:miter/>
+            </a:ln>
+          </p:spPr>
+          <p:txBody>
+            <a:bodyPr wrap="square" rtlCol="0" anchor="ctr">
+              <a:noAutofit/>
+            </a:bodyPr>
+            <a:lstStyle/>
+            <a:p>
+              <a:endParaRPr lang="en-US" dirty="0"/>
+            </a:p>
+          </p:txBody>
+        </p:sp>
+      </p:grpSp>
+      <p:sp>
+        <p:nvSpPr>
+          <p:cNvPr id="20" name="Graphic 212">
+            <a:extLst>
+              <a:ext uri="{FF2B5EF4-FFF2-40B4-BE49-F238E27FC236}">
+                <a16:creationId xmlns:a16="http://schemas.microsoft.com/office/drawing/2014/main" id="{4C6598AB-1C17-4D54-951C-A082D94ACB7A}"/>
+              </a:ext>
+              <a:ext uri="{C183D7F6-B498-43B3-948B-1728B52AA6E4}">
+                <adec:decorative xmlns:adec="http://schemas.microsoft.com/office/drawing/2017/decorative" val="1"/>
+              </a:ext>
+            </a:extLst>
+          </p:cNvPr>
+          <p:cNvSpPr>
+            <a:spLocks noGrp="1" noRot="1" noChangeAspect="1" noMove="1" noResize="1" noEditPoints="1" noAdjustHandles="1" noChangeArrowheads="1" noChangeShapeType="1" noTextEdit="1"/>
+          </p:cNvSpPr>
+          <p:nvPr>
+            <p:extLst>
+              <p:ext uri="{386F3935-93C4-4BCD-93E2-E3B085C9AB24}">
+                <p16:designElem xmlns:p16="http://schemas.microsoft.com/office/powerpoint/2015/main" val="1"/>
+              </p:ext>
+            </p:extLst>
+          </p:nvPr>
+        </p:nvSpPr>
+        <p:spPr>
+          <a:xfrm>
+            <a:off x="4588524" y="457812"/>
+            <a:ext cx="914565" cy="914565"/>
+          </a:xfrm>
+          <a:custGeom>
+            <a:avLst/>
+            <a:gdLst>
+              <a:gd name="connsiteX0" fmla="*/ 403574 w 807148"/>
+              <a:gd name="connsiteY0" fmla="*/ 0 h 807148"/>
+              <a:gd name="connsiteX1" fmla="*/ 0 w 807148"/>
+              <a:gd name="connsiteY1" fmla="*/ 403574 h 807148"/>
+              <a:gd name="connsiteX2" fmla="*/ 403574 w 807148"/>
+              <a:gd name="connsiteY2" fmla="*/ 807149 h 807148"/>
+              <a:gd name="connsiteX3" fmla="*/ 807149 w 807148"/>
+              <a:gd name="connsiteY3" fmla="*/ 403574 h 807148"/>
+              <a:gd name="connsiteX4" fmla="*/ 403574 w 807148"/>
+              <a:gd name="connsiteY4" fmla="*/ 0 h 807148"/>
+              <a:gd name="connsiteX5" fmla="*/ 403574 w 807148"/>
+              <a:gd name="connsiteY5" fmla="*/ 667988 h 807148"/>
+              <a:gd name="connsiteX6" fmla="*/ 139160 w 807148"/>
+              <a:gd name="connsiteY6" fmla="*/ 403574 h 807148"/>
+              <a:gd name="connsiteX7" fmla="*/ 403574 w 807148"/>
+              <a:gd name="connsiteY7" fmla="*/ 139160 h 807148"/>
+              <a:gd name="connsiteX8" fmla="*/ 667988 w 807148"/>
+              <a:gd name="connsiteY8" fmla="*/ 403574 h 807148"/>
+              <a:gd name="connsiteX9" fmla="*/ 403574 w 807148"/>
+              <a:gd name="connsiteY9" fmla="*/ 667988 h 807148"/>
+            </a:gdLst>
+            <a:ahLst/>
+            <a:cxnLst>
+              <a:cxn ang="0">
+                <a:pos x="connsiteX0" y="connsiteY0"/>
+              </a:cxn>
+              <a:cxn ang="0">
+                <a:pos x="connsiteX1" y="connsiteY1"/>
+              </a:cxn>
+              <a:cxn ang="0">
+                <a:pos x="connsiteX2" y="connsiteY2"/>
+              </a:cxn>
+              <a:cxn ang="0">
+                <a:pos x="connsiteX3" y="connsiteY3"/>
+              </a:cxn>
+              <a:cxn ang="0">
+                <a:pos x="connsiteX4" y="connsiteY4"/>
+              </a:cxn>
+              <a:cxn ang="0">
+                <a:pos x="connsiteX5" y="connsiteY5"/>
+              </a:cxn>
+              <a:cxn ang="0">
+                <a:pos x="connsiteX6" y="connsiteY6"/>
+              </a:cxn>
+              <a:cxn ang="0">
+                <a:pos x="connsiteX7" y="connsiteY7"/>
+              </a:cxn>
+              <a:cxn ang="0">
+                <a:pos x="connsiteX8" y="connsiteY8"/>
+              </a:cxn>
+              <a:cxn ang="0">
+                <a:pos x="connsiteX9" y="connsiteY9"/>
+              </a:cxn>
+            </a:cxnLst>
+            <a:rect l="l" t="t" r="r" b="b"/>
+            <a:pathLst>
+              <a:path w="807148" h="807148">
+                <a:moveTo>
+                  <a:pt x="403574" y="0"/>
+                </a:moveTo>
+                <a:cubicBezTo>
+                  <a:pt x="180689" y="0"/>
+                  <a:pt x="0" y="180689"/>
+                  <a:pt x="0" y="403574"/>
+                </a:cubicBezTo>
+                <a:cubicBezTo>
+                  <a:pt x="0" y="626459"/>
+                  <a:pt x="180689" y="807149"/>
+                  <a:pt x="403574" y="807149"/>
+                </a:cubicBezTo>
+                <a:cubicBezTo>
+                  <a:pt x="626459" y="807149"/>
+                  <a:pt x="807149" y="626459"/>
+                  <a:pt x="807149" y="403574"/>
+                </a:cubicBezTo>
+                <a:cubicBezTo>
+                  <a:pt x="807149" y="180689"/>
+                  <a:pt x="626459" y="0"/>
+                  <a:pt x="403574" y="0"/>
+                </a:cubicBezTo>
+                <a:close/>
+                <a:moveTo>
+                  <a:pt x="403574" y="667988"/>
+                </a:moveTo>
+                <a:cubicBezTo>
+                  <a:pt x="257556" y="667988"/>
+                  <a:pt x="139160" y="549593"/>
+                  <a:pt x="139160" y="403574"/>
+                </a:cubicBezTo>
+                <a:cubicBezTo>
+                  <a:pt x="139160" y="257556"/>
+                  <a:pt x="257556" y="139160"/>
+                  <a:pt x="403574" y="139160"/>
+                </a:cubicBezTo>
+                <a:cubicBezTo>
+                  <a:pt x="549593" y="139160"/>
+                  <a:pt x="667988" y="257556"/>
+                  <a:pt x="667988" y="403574"/>
+                </a:cubicBezTo>
+                <a:cubicBezTo>
+                  <a:pt x="667988" y="549593"/>
+                  <a:pt x="549593" y="667988"/>
+                  <a:pt x="403574" y="667988"/>
+                </a:cubicBezTo>
+                <a:close/>
+              </a:path>
+            </a:pathLst>
+          </a:custGeom>
+          <a:solidFill>
+            <a:srgbClr val="FFFFFF"/>
+          </a:solidFill>
+          <a:ln w="28575">
+            <a:solidFill>
+              <a:schemeClr val="tx1"/>
+            </a:solidFill>
+          </a:ln>
+        </p:spPr>
+        <p:style>
+          <a:lnRef idx="2">
+            <a:schemeClr val="accent1">
+              <a:shade val="50000"/>
+            </a:schemeClr>
+          </a:lnRef>
+          <a:fillRef idx="1">
+            <a:schemeClr val="accent1"/>
+          </a:fillRef>
+          <a:effectRef idx="0">
+            <a:schemeClr val="accent1"/>
+          </a:effectRef>
+          <a:fontRef idx="minor">
+            <a:schemeClr val="lt1"/>
+          </a:fontRef>
+        </p:style>
+        <p:txBody>
+          <a:bodyPr rot="0" spcFirstLastPara="0" vertOverflow="overflow" horzOverflow="overflow" vert="horz" wrap="square" lIns="91440" tIns="45720" rIns="91440" bIns="45720" numCol="1" spcCol="0" rtlCol="0" fromWordArt="0" anchor="ctr" anchorCtr="0" forceAA="0" compatLnSpc="1">
+            <a:prstTxWarp prst="textNoShape">
+              <a:avLst/>
+            </a:prstTxWarp>
+            <a:noAutofit/>
+          </a:bodyPr>
+          <a:lstStyle/>
+          <a:p>
+            <a:pPr algn="ctr"/>
+            <a:endParaRPr lang="en-US">
+              <a:solidFill>
+                <a:schemeClr val="lt1"/>
+              </a:solidFill>
+            </a:endParaRPr>
+          </a:p>
+        </p:txBody>
+      </p:sp>
+      <p:sp>
+        <p:nvSpPr>
+          <p:cNvPr id="22" name="Graphic 212">
+            <a:extLst>
+              <a:ext uri="{FF2B5EF4-FFF2-40B4-BE49-F238E27FC236}">
+                <a16:creationId xmlns:a16="http://schemas.microsoft.com/office/drawing/2014/main" id="{C83B66D7-137D-4AC1-B172-53D60F08BEB5}"/>
+              </a:ext>
+              <a:ext uri="{C183D7F6-B498-43B3-948B-1728B52AA6E4}">
+                <adec:decorative xmlns:adec="http://schemas.microsoft.com/office/drawing/2017/decorative" val="1"/>
+              </a:ext>
+            </a:extLst>
+          </p:cNvPr>
+          <p:cNvSpPr>
+            <a:spLocks noGrp="1" noRot="1" noChangeAspect="1" noMove="1" noResize="1" noEditPoints="1" noAdjustHandles="1" noChangeArrowheads="1" noChangeShapeType="1" noTextEdit="1"/>
+          </p:cNvSpPr>
+          <p:nvPr>
+            <p:extLst>
+              <p:ext uri="{386F3935-93C4-4BCD-93E2-E3B085C9AB24}">
+                <p16:designElem xmlns:p16="http://schemas.microsoft.com/office/powerpoint/2015/main" val="1"/>
+              </p:ext>
+            </p:extLst>
+          </p:nvPr>
+        </p:nvSpPr>
+        <p:spPr>
+          <a:xfrm>
+            <a:off x="4588524" y="457812"/>
+            <a:ext cx="914565" cy="914565"/>
+          </a:xfrm>
+          <a:custGeom>
+            <a:avLst/>
+            <a:gdLst>
+              <a:gd name="connsiteX0" fmla="*/ 403574 w 807148"/>
+              <a:gd name="connsiteY0" fmla="*/ 0 h 807148"/>
+              <a:gd name="connsiteX1" fmla="*/ 0 w 807148"/>
+              <a:gd name="connsiteY1" fmla="*/ 403574 h 807148"/>
+              <a:gd name="connsiteX2" fmla="*/ 403574 w 807148"/>
+              <a:gd name="connsiteY2" fmla="*/ 807149 h 807148"/>
+              <a:gd name="connsiteX3" fmla="*/ 807149 w 807148"/>
+              <a:gd name="connsiteY3" fmla="*/ 403574 h 807148"/>
+              <a:gd name="connsiteX4" fmla="*/ 403574 w 807148"/>
+              <a:gd name="connsiteY4" fmla="*/ 0 h 807148"/>
+              <a:gd name="connsiteX5" fmla="*/ 403574 w 807148"/>
+              <a:gd name="connsiteY5" fmla="*/ 667988 h 807148"/>
+              <a:gd name="connsiteX6" fmla="*/ 139160 w 807148"/>
+              <a:gd name="connsiteY6" fmla="*/ 403574 h 807148"/>
+              <a:gd name="connsiteX7" fmla="*/ 403574 w 807148"/>
+              <a:gd name="connsiteY7" fmla="*/ 139160 h 807148"/>
+              <a:gd name="connsiteX8" fmla="*/ 667988 w 807148"/>
+              <a:gd name="connsiteY8" fmla="*/ 403574 h 807148"/>
+              <a:gd name="connsiteX9" fmla="*/ 403574 w 807148"/>
+              <a:gd name="connsiteY9" fmla="*/ 667988 h 807148"/>
+            </a:gdLst>
+            <a:ahLst/>
+            <a:cxnLst>
+              <a:cxn ang="0">
+                <a:pos x="connsiteX0" y="connsiteY0"/>
+              </a:cxn>
+              <a:cxn ang="0">
+                <a:pos x="connsiteX1" y="connsiteY1"/>
+              </a:cxn>
+              <a:cxn ang="0">
+                <a:pos x="connsiteX2" y="connsiteY2"/>
+              </a:cxn>
+              <a:cxn ang="0">
+                <a:pos x="connsiteX3" y="connsiteY3"/>
+              </a:cxn>
+              <a:cxn ang="0">
+                <a:pos x="connsiteX4" y="connsiteY4"/>
+              </a:cxn>
+              <a:cxn ang="0">
+                <a:pos x="connsiteX5" y="connsiteY5"/>
+              </a:cxn>
+              <a:cxn ang="0">
+                <a:pos x="connsiteX6" y="connsiteY6"/>
+              </a:cxn>
+              <a:cxn ang="0">
+                <a:pos x="connsiteX7" y="connsiteY7"/>
+              </a:cxn>
+              <a:cxn ang="0">
+                <a:pos x="connsiteX8" y="connsiteY8"/>
+              </a:cxn>
+              <a:cxn ang="0">
+                <a:pos x="connsiteX9" y="connsiteY9"/>
+              </a:cxn>
+            </a:cxnLst>
+            <a:rect l="l" t="t" r="r" b="b"/>
+            <a:pathLst>
+              <a:path w="807148" h="807148">
+                <a:moveTo>
+                  <a:pt x="403574" y="0"/>
+                </a:moveTo>
+                <a:cubicBezTo>
+                  <a:pt x="180689" y="0"/>
+                  <a:pt x="0" y="180689"/>
+                  <a:pt x="0" y="403574"/>
+                </a:cubicBezTo>
+                <a:cubicBezTo>
+                  <a:pt x="0" y="626459"/>
+                  <a:pt x="180689" y="807149"/>
+                  <a:pt x="403574" y="807149"/>
+                </a:cubicBezTo>
+                <a:cubicBezTo>
+                  <a:pt x="626459" y="807149"/>
+                  <a:pt x="807149" y="626459"/>
+                  <a:pt x="807149" y="403574"/>
+                </a:cubicBezTo>
+                <a:cubicBezTo>
+                  <a:pt x="807149" y="180689"/>
+                  <a:pt x="626459" y="0"/>
+                  <a:pt x="403574" y="0"/>
+                </a:cubicBezTo>
+                <a:close/>
+                <a:moveTo>
+                  <a:pt x="403574" y="667988"/>
+                </a:moveTo>
+                <a:cubicBezTo>
+                  <a:pt x="257556" y="667988"/>
+                  <a:pt x="139160" y="549593"/>
+                  <a:pt x="139160" y="403574"/>
+                </a:cubicBezTo>
+                <a:cubicBezTo>
+                  <a:pt x="139160" y="257556"/>
+                  <a:pt x="257556" y="139160"/>
+                  <a:pt x="403574" y="139160"/>
+                </a:cubicBezTo>
+                <a:cubicBezTo>
+                  <a:pt x="549593" y="139160"/>
+                  <a:pt x="667988" y="257556"/>
+                  <a:pt x="667988" y="403574"/>
+                </a:cubicBezTo>
+                <a:cubicBezTo>
+                  <a:pt x="667988" y="549593"/>
+                  <a:pt x="549593" y="667988"/>
+                  <a:pt x="403574" y="667988"/>
+                </a:cubicBezTo>
+                <a:close/>
+              </a:path>
+            </a:pathLst>
+          </a:custGeom>
+          <a:solidFill>
+            <a:schemeClr val="accent2">
+              <a:alpha val="30000"/>
+            </a:schemeClr>
+          </a:solidFill>
+          <a:ln w="28575">
+            <a:solidFill>
+              <a:schemeClr val="bg1"/>
+            </a:solidFill>
+          </a:ln>
+        </p:spPr>
+        <p:style>
+          <a:lnRef idx="2">
+            <a:schemeClr val="accent1">
+              <a:shade val="50000"/>
+            </a:schemeClr>
+          </a:lnRef>
+          <a:fillRef idx="1">
+            <a:schemeClr val="accent1"/>
+          </a:fillRef>
+          <a:effectRef idx="0">
+            <a:schemeClr val="accent1"/>
+          </a:effectRef>
+          <a:fontRef idx="minor">
+            <a:schemeClr val="lt1"/>
+          </a:fontRef>
+        </p:style>
+        <p:txBody>
+          <a:bodyPr rot="0" spcFirstLastPara="0" vertOverflow="overflow" horzOverflow="overflow" vert="horz" wrap="square" lIns="91440" tIns="45720" rIns="91440" bIns="45720" numCol="1" spcCol="0" rtlCol="0" fromWordArt="0" anchor="ctr" anchorCtr="0" forceAA="0" compatLnSpc="1">
+            <a:prstTxWarp prst="textNoShape">
+              <a:avLst/>
+            </a:prstTxWarp>
+            <a:noAutofit/>
+          </a:bodyPr>
+          <a:lstStyle/>
+          <a:p>
+            <a:pPr algn="ctr"/>
+            <a:endParaRPr lang="en-US">
+              <a:solidFill>
+                <a:schemeClr val="lt1"/>
+              </a:solidFill>
+            </a:endParaRPr>
+          </a:p>
+        </p:txBody>
+      </p:sp>
+      <p:sp>
+        <p:nvSpPr>
+          <p:cNvPr id="24" name="Oval 23">
+            <a:extLst>
+              <a:ext uri="{FF2B5EF4-FFF2-40B4-BE49-F238E27FC236}">
+                <a16:creationId xmlns:a16="http://schemas.microsoft.com/office/drawing/2014/main" id="{F6B92503-6984-4D15-8B98-8718709B785D}"/>
+              </a:ext>
+              <a:ext uri="{C183D7F6-B498-43B3-948B-1728B52AA6E4}">
+                <adec:decorative xmlns:adec="http://schemas.microsoft.com/office/drawing/2017/decorative" val="1"/>
+              </a:ext>
+            </a:extLst>
+          </p:cNvPr>
+          <p:cNvSpPr>
+            <a:spLocks noGrp="1" noRot="1" noChangeAspect="1" noMove="1" noResize="1" noEditPoints="1" noAdjustHandles="1" noChangeArrowheads="1" noChangeShapeType="1" noTextEdit="1"/>
+          </p:cNvSpPr>
+          <p:nvPr>
+            <p:extLst>
+              <p:ext uri="{386F3935-93C4-4BCD-93E2-E3B085C9AB24}">
+                <p16:designElem xmlns:p16="http://schemas.microsoft.com/office/powerpoint/2015/main" val="1"/>
+              </p:ext>
+            </p:extLst>
+          </p:nvPr>
+        </p:nvSpPr>
+        <p:spPr>
+          <a:xfrm>
+            <a:off x="642976" y="4946663"/>
+            <a:ext cx="319941" cy="319941"/>
+          </a:xfrm>
+          <a:prstGeom prst="ellipse">
+            <a:avLst/>
+          </a:prstGeom>
+          <a:solidFill>
+            <a:srgbClr val="FFFFFF"/>
+          </a:solidFill>
+          <a:ln w="28575">
+            <a:solidFill>
+              <a:schemeClr val="tx1"/>
+            </a:solidFill>
+          </a:ln>
+        </p:spPr>
+        <p:style>
+          <a:lnRef idx="2">
+            <a:schemeClr val="accent1">
+              <a:shade val="50000"/>
+            </a:schemeClr>
+          </a:lnRef>
+          <a:fillRef idx="1">
+            <a:schemeClr val="accent1"/>
+          </a:fillRef>
+          <a:effectRef idx="0">
+            <a:schemeClr val="accent1"/>
+          </a:effectRef>
+          <a:fontRef idx="minor">
+            <a:schemeClr val="lt1"/>
+          </a:fontRef>
+        </p:style>
+        <p:txBody>
+          <a:bodyPr rot="0" spcFirstLastPara="0" vertOverflow="overflow" horzOverflow="overflow" vert="horz" wrap="square" lIns="91440" tIns="45720" rIns="91440" bIns="45720" numCol="1" spcCol="0" rtlCol="0" fromWordArt="0" anchor="ctr" anchorCtr="0" forceAA="0" compatLnSpc="1">
+            <a:prstTxWarp prst="textNoShape">
+              <a:avLst/>
+            </a:prstTxWarp>
+            <a:noAutofit/>
+          </a:bodyPr>
+          <a:lstStyle/>
+          <a:p>
+            <a:pPr algn="ctr"/>
+            <a:endParaRPr lang="en-US"/>
+          </a:p>
+        </p:txBody>
+      </p:sp>
+      <p:sp>
+        <p:nvSpPr>
+          <p:cNvPr id="26" name="Oval 25">
+            <a:extLst>
+              <a:ext uri="{FF2B5EF4-FFF2-40B4-BE49-F238E27FC236}">
+                <a16:creationId xmlns:a16="http://schemas.microsoft.com/office/drawing/2014/main" id="{08DDF938-524E-4C18-A47D-C00627832366}"/>
+              </a:ext>
+              <a:ext uri="{C183D7F6-B498-43B3-948B-1728B52AA6E4}">
+                <adec:decorative xmlns:adec="http://schemas.microsoft.com/office/drawing/2017/decorative" val="1"/>
+              </a:ext>
+            </a:extLst>
+          </p:cNvPr>
+          <p:cNvSpPr>
+            <a:spLocks noGrp="1" noRot="1" noChangeAspect="1" noMove="1" noResize="1" noEditPoints="1" noAdjustHandles="1" noChangeArrowheads="1" noChangeShapeType="1" noTextEdit="1"/>
+          </p:cNvSpPr>
+          <p:nvPr>
+            <p:extLst>
+              <p:ext uri="{386F3935-93C4-4BCD-93E2-E3B085C9AB24}">
+                <p16:designElem xmlns:p16="http://schemas.microsoft.com/office/powerpoint/2015/main" val="1"/>
+              </p:ext>
+            </p:extLst>
+          </p:nvPr>
+        </p:nvSpPr>
+        <p:spPr>
+          <a:xfrm>
+            <a:off x="642976" y="4946663"/>
+            <a:ext cx="319941" cy="319941"/>
+          </a:xfrm>
+          <a:prstGeom prst="ellipse">
+            <a:avLst/>
+          </a:prstGeom>
+          <a:solidFill>
+            <a:schemeClr val="accent2">
+              <a:alpha val="30000"/>
+            </a:schemeClr>
+          </a:solidFill>
+          <a:ln w="28575">
+            <a:solidFill>
+              <a:schemeClr val="bg1"/>
+            </a:solidFill>
+          </a:ln>
+        </p:spPr>
+        <p:style>
+          <a:lnRef idx="2">
+            <a:schemeClr val="accent1">
+              <a:shade val="50000"/>
+            </a:schemeClr>
+          </a:lnRef>
+          <a:fillRef idx="1">
+            <a:schemeClr val="accent1"/>
+          </a:fillRef>
+          <a:effectRef idx="0">
+            <a:schemeClr val="accent1"/>
+          </a:effectRef>
+          <a:fontRef idx="minor">
+            <a:schemeClr val="lt1"/>
+          </a:fontRef>
+        </p:style>
+        <p:txBody>
+          <a:bodyPr rot="0" spcFirstLastPara="0" vertOverflow="overflow" horzOverflow="overflow" vert="horz" wrap="square" lIns="91440" tIns="45720" rIns="91440" bIns="45720" numCol="1" spcCol="0" rtlCol="0" fromWordArt="0" anchor="ctr" anchorCtr="0" forceAA="0" compatLnSpc="1">
+            <a:prstTxWarp prst="textNoShape">
+              <a:avLst/>
+            </a:prstTxWarp>
+            <a:noAutofit/>
+          </a:bodyPr>
+          <a:lstStyle/>
+          <a:p>
+            <a:pPr algn="ctr"/>
+            <a:endParaRPr lang="en-US"/>
+          </a:p>
+        </p:txBody>
+      </p:sp>
+      <p:grpSp>
+        <p:nvGrpSpPr>
+          <p:cNvPr id="28" name="Graphic 185">
+            <a:extLst>
+              <a:ext uri="{FF2B5EF4-FFF2-40B4-BE49-F238E27FC236}">
+                <a16:creationId xmlns:a16="http://schemas.microsoft.com/office/drawing/2014/main" id="{3773FAF5-C452-4455-9411-D6AF5EBD4CA9}"/>
+              </a:ext>
+              <a:ext uri="{C183D7F6-B498-43B3-948B-1728B52AA6E4}">
+                <adec:decorative xmlns:adec="http://schemas.microsoft.com/office/drawing/2017/decorative" val="1"/>
+              </a:ext>
+            </a:extLst>
+          </p:cNvPr>
+          <p:cNvGrpSpPr>
+            <a:grpSpLocks noGrp="1" noUngrp="1" noRot="1" noChangeAspect="1" noMove="1" noResize="1"/>
+          </p:cNvGrpSpPr>
+          <p:nvPr>
+            <p:extLst>
+              <p:ext uri="{386F3935-93C4-4BCD-93E2-E3B085C9AB24}">
+                <p16:designElem xmlns:p16="http://schemas.microsoft.com/office/powerpoint/2015/main" val="1"/>
+              </p:ext>
+            </p:extLst>
+          </p:nvPr>
+        </p:nvGrpSpPr>
+        <p:grpSpPr>
+          <a:xfrm>
+            <a:off x="9812239" y="6139464"/>
+            <a:ext cx="1054466" cy="469689"/>
+            <a:chOff x="9841624" y="4115729"/>
+            <a:chExt cx="602169" cy="268223"/>
+          </a:xfrm>
+          <a:solidFill>
+            <a:schemeClr val="bg1"/>
+          </a:solidFill>
+        </p:grpSpPr>
+        <p:sp>
+          <p:nvSpPr>
+            <p:cNvPr id="29" name="Freeform: Shape 28">
+              <a:extLst>
+                <a:ext uri="{FF2B5EF4-FFF2-40B4-BE49-F238E27FC236}">
+                  <a16:creationId xmlns:a16="http://schemas.microsoft.com/office/drawing/2014/main" id="{1ECA0D96-F63C-4F7B-BE16-0F3FE76D7D60}"/>
+                </a:ext>
+                <a:ext uri="{C183D7F6-B498-43B3-948B-1728B52AA6E4}">
+                  <adec:decorative xmlns:adec="http://schemas.microsoft.com/office/drawing/2017/decorative" val="1"/>
+                </a:ext>
+              </a:extLst>
+            </p:cNvPr>
+            <p:cNvSpPr/>
+            <p:nvPr>
+              <p:extLst>
+                <p:ext uri="{386F3935-93C4-4BCD-93E2-E3B085C9AB24}">
+                  <p16:designElem xmlns:p16="http://schemas.microsoft.com/office/powerpoint/2015/main" val="1"/>
+                </p:ext>
+              </p:extLst>
+            </p:nvPr>
+          </p:nvSpPr>
+          <p:spPr>
+            <a:xfrm>
+              <a:off x="9841624" y="4115729"/>
+              <a:ext cx="202882" cy="268223"/>
+            </a:xfrm>
+            <a:custGeom>
+              <a:avLst/>
+              <a:gdLst>
+                <a:gd name="connsiteX0" fmla="*/ 20765 w 202882"/>
+                <a:gd name="connsiteY0" fmla="*/ 268224 h 268223"/>
+                <a:gd name="connsiteX1" fmla="*/ 0 w 202882"/>
+                <a:gd name="connsiteY1" fmla="*/ 268224 h 268223"/>
+                <a:gd name="connsiteX2" fmla="*/ 182118 w 202882"/>
+                <a:gd name="connsiteY2" fmla="*/ 0 h 268223"/>
+                <a:gd name="connsiteX3" fmla="*/ 202883 w 202882"/>
+                <a:gd name="connsiteY3" fmla="*/ 0 h 268223"/>
+              </a:gdLst>
+              <a:ahLst/>
+              <a:cxnLst>
+                <a:cxn ang="0">
+                  <a:pos x="connsiteX0" y="connsiteY0"/>
+                </a:cxn>
+                <a:cxn ang="0">
+                  <a:pos x="connsiteX1" y="connsiteY1"/>
+                </a:cxn>
+                <a:cxn ang="0">
+                  <a:pos x="connsiteX2" y="connsiteY2"/>
+                </a:cxn>
+                <a:cxn ang="0">
+                  <a:pos x="connsiteX3" y="connsiteY3"/>
+                </a:cxn>
+              </a:cxnLst>
+              <a:rect l="l" t="t" r="r" b="b"/>
+              <a:pathLst>
+                <a:path w="202882" h="268223">
+                  <a:moveTo>
+                    <a:pt x="20765" y="268224"/>
+                  </a:moveTo>
+                  <a:lnTo>
+                    <a:pt x="0" y="268224"/>
+                  </a:lnTo>
+                  <a:lnTo>
+                    <a:pt x="182118" y="0"/>
+                  </a:lnTo>
+                  <a:lnTo>
+                    <a:pt x="202883" y="0"/>
+                  </a:lnTo>
+                  <a:close/>
+                </a:path>
+              </a:pathLst>
+            </a:custGeom>
+            <a:grpFill/>
+            <a:ln w="9525" cap="flat">
+              <a:noFill/>
+              <a:prstDash val="solid"/>
+              <a:miter/>
+            </a:ln>
+          </p:spPr>
+          <p:txBody>
+            <a:bodyPr rtlCol="0" anchor="ctr"/>
+            <a:lstStyle/>
+            <a:p>
+              <a:endParaRPr lang="en-US"/>
+            </a:p>
+          </p:txBody>
+        </p:sp>
+        <p:sp>
+          <p:nvSpPr>
+            <p:cNvPr id="30" name="Freeform: Shape 29">
+              <a:extLst>
+                <a:ext uri="{FF2B5EF4-FFF2-40B4-BE49-F238E27FC236}">
+                  <a16:creationId xmlns:a16="http://schemas.microsoft.com/office/drawing/2014/main" id="{74F83A81-0546-400A-918A-90C9C48B8147}"/>
+                </a:ext>
+                <a:ext uri="{C183D7F6-B498-43B3-948B-1728B52AA6E4}">
+                  <adec:decorative xmlns:adec="http://schemas.microsoft.com/office/drawing/2017/decorative" val="1"/>
+                </a:ext>
+              </a:extLst>
+            </p:cNvPr>
+            <p:cNvSpPr/>
+            <p:nvPr>
+              <p:extLst>
+                <p:ext uri="{386F3935-93C4-4BCD-93E2-E3B085C9AB24}">
+                  <p16:designElem xmlns:p16="http://schemas.microsoft.com/office/powerpoint/2015/main" val="1"/>
+                </p:ext>
+              </p:extLst>
+            </p:nvPr>
+          </p:nvSpPr>
+          <p:spPr>
+            <a:xfrm>
+              <a:off x="9941445" y="4115729"/>
+              <a:ext cx="202882" cy="268223"/>
+            </a:xfrm>
+            <a:custGeom>
+              <a:avLst/>
+              <a:gdLst>
+                <a:gd name="connsiteX0" fmla="*/ 20765 w 202882"/>
+                <a:gd name="connsiteY0" fmla="*/ 268224 h 268223"/>
+                <a:gd name="connsiteX1" fmla="*/ 0 w 202882"/>
+                <a:gd name="connsiteY1" fmla="*/ 268224 h 268223"/>
+                <a:gd name="connsiteX2" fmla="*/ 182118 w 202882"/>
+                <a:gd name="connsiteY2" fmla="*/ 0 h 268223"/>
+                <a:gd name="connsiteX3" fmla="*/ 202883 w 202882"/>
+                <a:gd name="connsiteY3" fmla="*/ 0 h 268223"/>
+              </a:gdLst>
+              <a:ahLst/>
+              <a:cxnLst>
+                <a:cxn ang="0">
+                  <a:pos x="connsiteX0" y="connsiteY0"/>
+                </a:cxn>
+                <a:cxn ang="0">
+                  <a:pos x="connsiteX1" y="connsiteY1"/>
+                </a:cxn>
+                <a:cxn ang="0">
+                  <a:pos x="connsiteX2" y="connsiteY2"/>
+                </a:cxn>
+                <a:cxn ang="0">
+                  <a:pos x="connsiteX3" y="connsiteY3"/>
+                </a:cxn>
+              </a:cxnLst>
+              <a:rect l="l" t="t" r="r" b="b"/>
+              <a:pathLst>
+                <a:path w="202882" h="268223">
+                  <a:moveTo>
+                    <a:pt x="20765" y="268224"/>
+                  </a:moveTo>
+                  <a:lnTo>
+                    <a:pt x="0" y="268224"/>
+                  </a:lnTo>
+                  <a:lnTo>
+                    <a:pt x="182118" y="0"/>
+                  </a:lnTo>
+                  <a:lnTo>
+                    <a:pt x="202883" y="0"/>
+                  </a:lnTo>
+                  <a:close/>
+                </a:path>
+              </a:pathLst>
+            </a:custGeom>
+            <a:grpFill/>
+            <a:ln w="9525" cap="flat">
+              <a:noFill/>
+              <a:prstDash val="solid"/>
+              <a:miter/>
+            </a:ln>
+          </p:spPr>
+          <p:txBody>
+            <a:bodyPr rtlCol="0" anchor="ctr"/>
+            <a:lstStyle/>
+            <a:p>
+              <a:endParaRPr lang="en-US"/>
+            </a:p>
+          </p:txBody>
+        </p:sp>
+        <p:sp>
+          <p:nvSpPr>
+            <p:cNvPr id="31" name="Freeform: Shape 30">
+              <a:extLst>
+                <a:ext uri="{FF2B5EF4-FFF2-40B4-BE49-F238E27FC236}">
+                  <a16:creationId xmlns:a16="http://schemas.microsoft.com/office/drawing/2014/main" id="{9741F692-A5B6-4215-86D9-B1FD4FF26AC7}"/>
+                </a:ext>
+                <a:ext uri="{C183D7F6-B498-43B3-948B-1728B52AA6E4}">
+                  <adec:decorative xmlns:adec="http://schemas.microsoft.com/office/drawing/2017/decorative" val="1"/>
+                </a:ext>
+              </a:extLst>
+            </p:cNvPr>
+            <p:cNvSpPr/>
+            <p:nvPr>
+              <p:extLst>
+                <p:ext uri="{386F3935-93C4-4BCD-93E2-E3B085C9AB24}">
+                  <p16:designElem xmlns:p16="http://schemas.microsoft.com/office/powerpoint/2015/main" val="1"/>
+                </p:ext>
+              </p:extLst>
+            </p:nvPr>
+          </p:nvSpPr>
+          <p:spPr>
+            <a:xfrm>
+              <a:off x="10041267" y="4115729"/>
+              <a:ext cx="202882" cy="268223"/>
+            </a:xfrm>
+            <a:custGeom>
+              <a:avLst/>
+              <a:gdLst>
+                <a:gd name="connsiteX0" fmla="*/ 20669 w 202882"/>
+                <a:gd name="connsiteY0" fmla="*/ 268224 h 268223"/>
+                <a:gd name="connsiteX1" fmla="*/ 0 w 202882"/>
+                <a:gd name="connsiteY1" fmla="*/ 268224 h 268223"/>
+                <a:gd name="connsiteX2" fmla="*/ 182118 w 202882"/>
+                <a:gd name="connsiteY2" fmla="*/ 0 h 268223"/>
+                <a:gd name="connsiteX3" fmla="*/ 202883 w 202882"/>
+                <a:gd name="connsiteY3" fmla="*/ 0 h 268223"/>
+              </a:gdLst>
+              <a:ahLst/>
+              <a:cxnLst>
+                <a:cxn ang="0">
+                  <a:pos x="connsiteX0" y="connsiteY0"/>
+                </a:cxn>
+                <a:cxn ang="0">
+                  <a:pos x="connsiteX1" y="connsiteY1"/>
+                </a:cxn>
+                <a:cxn ang="0">
+                  <a:pos x="connsiteX2" y="connsiteY2"/>
+                </a:cxn>
+                <a:cxn ang="0">
+                  <a:pos x="connsiteX3" y="connsiteY3"/>
+                </a:cxn>
+              </a:cxnLst>
+              <a:rect l="l" t="t" r="r" b="b"/>
+              <a:pathLst>
+                <a:path w="202882" h="268223">
+                  <a:moveTo>
+                    <a:pt x="20669" y="268224"/>
+                  </a:moveTo>
+                  <a:lnTo>
+                    <a:pt x="0" y="268224"/>
+                  </a:lnTo>
+                  <a:lnTo>
+                    <a:pt x="182118" y="0"/>
+                  </a:lnTo>
+                  <a:lnTo>
+                    <a:pt x="202883" y="0"/>
+                  </a:lnTo>
+                  <a:close/>
+                </a:path>
+              </a:pathLst>
+            </a:custGeom>
+            <a:grpFill/>
+            <a:ln w="9525" cap="flat">
+              <a:noFill/>
+              <a:prstDash val="solid"/>
+              <a:miter/>
+            </a:ln>
+          </p:spPr>
+          <p:txBody>
+            <a:bodyPr rtlCol="0" anchor="ctr"/>
+            <a:lstStyle/>
+            <a:p>
+              <a:endParaRPr lang="en-US"/>
+            </a:p>
+          </p:txBody>
+        </p:sp>
+        <p:sp>
+          <p:nvSpPr>
+            <p:cNvPr id="32" name="Freeform: Shape 31">
+              <a:extLst>
+                <a:ext uri="{FF2B5EF4-FFF2-40B4-BE49-F238E27FC236}">
+                  <a16:creationId xmlns:a16="http://schemas.microsoft.com/office/drawing/2014/main" id="{CC0876CB-9C60-4580-8FED-CD64EC76645E}"/>
+                </a:ext>
+                <a:ext uri="{C183D7F6-B498-43B3-948B-1728B52AA6E4}">
+                  <adec:decorative xmlns:adec="http://schemas.microsoft.com/office/drawing/2017/decorative" val="1"/>
+                </a:ext>
+              </a:extLst>
+            </p:cNvPr>
+            <p:cNvSpPr/>
+            <p:nvPr>
+              <p:extLst>
+                <p:ext uri="{386F3935-93C4-4BCD-93E2-E3B085C9AB24}">
+                  <p16:designElem xmlns:p16="http://schemas.microsoft.com/office/powerpoint/2015/main" val="1"/>
+                </p:ext>
+              </p:extLst>
+            </p:nvPr>
+          </p:nvSpPr>
+          <p:spPr>
+            <a:xfrm>
+              <a:off x="10141090" y="4115729"/>
+              <a:ext cx="202882" cy="268223"/>
+            </a:xfrm>
+            <a:custGeom>
+              <a:avLst/>
+              <a:gdLst>
+                <a:gd name="connsiteX0" fmla="*/ 20669 w 202882"/>
+                <a:gd name="connsiteY0" fmla="*/ 268224 h 268223"/>
+                <a:gd name="connsiteX1" fmla="*/ 0 w 202882"/>
+                <a:gd name="connsiteY1" fmla="*/ 268224 h 268223"/>
+                <a:gd name="connsiteX2" fmla="*/ 182118 w 202882"/>
+                <a:gd name="connsiteY2" fmla="*/ 0 h 268223"/>
+                <a:gd name="connsiteX3" fmla="*/ 202883 w 202882"/>
+                <a:gd name="connsiteY3" fmla="*/ 0 h 268223"/>
+              </a:gdLst>
+              <a:ahLst/>
+              <a:cxnLst>
+                <a:cxn ang="0">
+                  <a:pos x="connsiteX0" y="connsiteY0"/>
+                </a:cxn>
+                <a:cxn ang="0">
+                  <a:pos x="connsiteX1" y="connsiteY1"/>
+                </a:cxn>
+                <a:cxn ang="0">
+                  <a:pos x="connsiteX2" y="connsiteY2"/>
+                </a:cxn>
+                <a:cxn ang="0">
+                  <a:pos x="connsiteX3" y="connsiteY3"/>
+                </a:cxn>
+              </a:cxnLst>
+              <a:rect l="l" t="t" r="r" b="b"/>
+              <a:pathLst>
+                <a:path w="202882" h="268223">
+                  <a:moveTo>
+                    <a:pt x="20669" y="268224"/>
+                  </a:moveTo>
+                  <a:lnTo>
+                    <a:pt x="0" y="268224"/>
+                  </a:lnTo>
+                  <a:lnTo>
+                    <a:pt x="182118" y="0"/>
+                  </a:lnTo>
+                  <a:lnTo>
+                    <a:pt x="202883" y="0"/>
+                  </a:lnTo>
+                  <a:close/>
+                </a:path>
+              </a:pathLst>
+            </a:custGeom>
+            <a:grpFill/>
+            <a:ln w="9525" cap="flat">
+              <a:noFill/>
+              <a:prstDash val="solid"/>
+              <a:miter/>
+            </a:ln>
+          </p:spPr>
+          <p:txBody>
+            <a:bodyPr rtlCol="0" anchor="ctr"/>
+            <a:lstStyle/>
+            <a:p>
+              <a:endParaRPr lang="en-US"/>
+            </a:p>
+          </p:txBody>
+        </p:sp>
+        <p:sp>
+          <p:nvSpPr>
+            <p:cNvPr id="33" name="Freeform: Shape 32">
+              <a:extLst>
+                <a:ext uri="{FF2B5EF4-FFF2-40B4-BE49-F238E27FC236}">
+                  <a16:creationId xmlns:a16="http://schemas.microsoft.com/office/drawing/2014/main" id="{A879B3B7-48DB-4D3A-BB33-02766EAD3D91}"/>
+                </a:ext>
+                <a:ext uri="{C183D7F6-B498-43B3-948B-1728B52AA6E4}">
+                  <adec:decorative xmlns:adec="http://schemas.microsoft.com/office/drawing/2017/decorative" val="1"/>
+                </a:ext>
+              </a:extLst>
+            </p:cNvPr>
+            <p:cNvSpPr/>
+            <p:nvPr>
+              <p:extLst>
+                <p:ext uri="{386F3935-93C4-4BCD-93E2-E3B085C9AB24}">
+                  <p16:designElem xmlns:p16="http://schemas.microsoft.com/office/powerpoint/2015/main" val="1"/>
+                </p:ext>
+              </p:extLst>
+            </p:nvPr>
+          </p:nvSpPr>
+          <p:spPr>
+            <a:xfrm>
+              <a:off x="10240911" y="4115729"/>
+              <a:ext cx="202882" cy="268223"/>
+            </a:xfrm>
+            <a:custGeom>
+              <a:avLst/>
+              <a:gdLst>
+                <a:gd name="connsiteX0" fmla="*/ 20669 w 202882"/>
+                <a:gd name="connsiteY0" fmla="*/ 268224 h 268223"/>
+                <a:gd name="connsiteX1" fmla="*/ 0 w 202882"/>
+                <a:gd name="connsiteY1" fmla="*/ 268224 h 268223"/>
+                <a:gd name="connsiteX2" fmla="*/ 182118 w 202882"/>
+                <a:gd name="connsiteY2" fmla="*/ 0 h 268223"/>
+                <a:gd name="connsiteX3" fmla="*/ 202883 w 202882"/>
+                <a:gd name="connsiteY3" fmla="*/ 0 h 268223"/>
+              </a:gdLst>
+              <a:ahLst/>
+              <a:cxnLst>
+                <a:cxn ang="0">
+                  <a:pos x="connsiteX0" y="connsiteY0"/>
+                </a:cxn>
+                <a:cxn ang="0">
+                  <a:pos x="connsiteX1" y="connsiteY1"/>
+                </a:cxn>
+                <a:cxn ang="0">
+                  <a:pos x="connsiteX2" y="connsiteY2"/>
+                </a:cxn>
+                <a:cxn ang="0">
+                  <a:pos x="connsiteX3" y="connsiteY3"/>
+                </a:cxn>
+              </a:cxnLst>
+              <a:rect l="l" t="t" r="r" b="b"/>
+              <a:pathLst>
+                <a:path w="202882" h="268223">
+                  <a:moveTo>
+                    <a:pt x="20669" y="268224"/>
+                  </a:moveTo>
+                  <a:lnTo>
+                    <a:pt x="0" y="268224"/>
+                  </a:lnTo>
+                  <a:lnTo>
+                    <a:pt x="182118" y="0"/>
+                  </a:lnTo>
+                  <a:lnTo>
+                    <a:pt x="202883" y="0"/>
+                  </a:lnTo>
+                  <a:close/>
+                </a:path>
+              </a:pathLst>
+            </a:custGeom>
+            <a:grpFill/>
+            <a:ln w="9525" cap="flat">
+              <a:noFill/>
+              <a:prstDash val="solid"/>
+              <a:miter/>
+            </a:ln>
+          </p:spPr>
+          <p:txBody>
+            <a:bodyPr rtlCol="0" anchor="ctr"/>
+            <a:lstStyle/>
+            <a:p>
+              <a:endParaRPr lang="en-US"/>
+            </a:p>
+          </p:txBody>
+        </p:sp>
+      </p:grpSp>
+      <p:pic>
+        <p:nvPicPr>
+          <p:cNvPr id="6" name="Content Placeholder 5" descr="Diagram&#10;&#10;Description automatically generated">
+            <a:extLst>
+              <a:ext uri="{FF2B5EF4-FFF2-40B4-BE49-F238E27FC236}">
+                <a16:creationId xmlns:a16="http://schemas.microsoft.com/office/drawing/2014/main" id="{828AD098-85AE-4A43-B57C-98409B6F4B77}"/>
+              </a:ext>
+            </a:extLst>
+          </p:cNvPr>
+          <p:cNvPicPr>
+            <a:picLocks noGrp="1" noChangeAspect="1"/>
+          </p:cNvPicPr>
+          <p:nvPr>
+            <p:ph idx="1"/>
+          </p:nvPr>
+        </p:nvPicPr>
+        <p:blipFill>
+          <a:blip r:embed="rId2">
+            <a:extLst>
+              <a:ext uri="{28A0092B-C50C-407E-A947-70E740481C1C}">
+                <a14:useLocalDpi xmlns:a14="http://schemas.microsoft.com/office/drawing/2010/main" val="0"/>
+              </a:ext>
+            </a:extLst>
+          </a:blip>
+          <a:stretch>
+            <a:fillRect/>
+          </a:stretch>
+        </p:blipFill>
+        <p:spPr>
+          <a:xfrm>
+            <a:off x="6475680" y="1384915"/>
+            <a:ext cx="4391025" cy="4200525"/>
+          </a:xfrm>
+        </p:spPr>
+      </p:pic>
+    </p:spTree>
+    <p:extLst>
+      <p:ext uri="{BB962C8B-B14F-4D97-AF65-F5344CB8AC3E}">
+        <p14:creationId xmlns:p14="http://schemas.microsoft.com/office/powerpoint/2010/main" val="1240034354"/>
+      </p:ext>
+    </p:extLst>
+  </p:cSld>
+  <p:clrMapOvr>
+    <a:masterClrMapping/>
+  </p:clrMapOvr>
+</p:sld>
+</file>
+
+<file path=ppt/slides/slide8.xml><?xml version="1.0" encoding="utf-8"?>
+<p:sld xmlns:a="http://schemas.openxmlformats.org/drawingml/2006/main" xmlns:r="http://schemas.openxmlformats.org/officeDocument/2006/relationships" xmlns:p="http://schemas.openxmlformats.org/presentationml/2006/main">
+  <p:cSld>
+    <p:bg>
+      <p:bgPr>
+        <a:solidFill>
+          <a:schemeClr val="bg1"/>
+        </a:solidFill>
+        <a:effectLst/>
+      </p:bgPr>
+    </p:bg>
+    <p:spTree>
+      <p:nvGrpSpPr>
+        <p:cNvPr id="1" name=""/>
+        <p:cNvGrpSpPr/>
+        <p:nvPr/>
+      </p:nvGrpSpPr>
+      <p:grpSpPr>
+        <a:xfrm>
+          <a:off x="0" y="0"/>
+          <a:ext cx="0" cy="0"/>
+          <a:chOff x="0" y="0"/>
+          <a:chExt cx="0" cy="0"/>
+        </a:xfrm>
+      </p:grpSpPr>
+      <p:sp>
+        <p:nvSpPr>
+          <p:cNvPr id="2" name="Title 1">
+            <a:extLst>
+              <a:ext uri="{FF2B5EF4-FFF2-40B4-BE49-F238E27FC236}">
+                <a16:creationId xmlns:a16="http://schemas.microsoft.com/office/drawing/2014/main" id="{2D2A6F50-66D4-43FB-935C-2FF4844F32A6}"/>
+              </a:ext>
+            </a:extLst>
+          </p:cNvPr>
+          <p:cNvSpPr>
+            <a:spLocks noGrp="1"/>
+          </p:cNvSpPr>
+          <p:nvPr>
+            <p:ph type="title"/>
+          </p:nvPr>
+        </p:nvSpPr>
+        <p:spPr>
+          <a:xfrm>
+            <a:off x="640080" y="5576887"/>
+            <a:ext cx="10911840" cy="640081"/>
+          </a:xfrm>
+        </p:spPr>
+        <p:txBody>
+          <a:bodyPr vert="horz" lIns="91440" tIns="45720" rIns="91440" bIns="45720" rtlCol="0" anchor="ctr">
+            <a:normAutofit/>
+          </a:bodyPr>
+          <a:lstStyle/>
+          <a:p>
+            <a:pPr algn="ctr"/>
+            <a:r>
+              <a:rPr lang="en-US" sz="3200" dirty="0"/>
+              <a:t>PDF Writing Objects</a:t>
+            </a:r>
+          </a:p>
+        </p:txBody>
+      </p:sp>
+      <p:pic>
+        <p:nvPicPr>
+          <p:cNvPr id="6" name="Content Placeholder 5">
+            <a:extLst>
+              <a:ext uri="{FF2B5EF4-FFF2-40B4-BE49-F238E27FC236}">
+                <a16:creationId xmlns:a16="http://schemas.microsoft.com/office/drawing/2014/main" id="{E34581FB-5343-4B6C-A82C-ED6CA839CC5D}"/>
+              </a:ext>
+            </a:extLst>
+          </p:cNvPr>
+          <p:cNvPicPr>
+            <a:picLocks noGrp="1" noChangeAspect="1"/>
+          </p:cNvPicPr>
+          <p:nvPr>
+            <p:ph idx="1"/>
+          </p:nvPr>
+        </p:nvPicPr>
+        <p:blipFill rotWithShape="1">
+          <a:blip r:embed="rId2"/>
+          <a:srcRect t="2366" r="1" b="11565"/>
+          <a:stretch/>
+        </p:blipFill>
+        <p:spPr>
+          <a:xfrm>
+            <a:off x="640080" y="640080"/>
+            <a:ext cx="10911840" cy="4836795"/>
+          </a:xfrm>
+          <a:prstGeom prst="rect">
+            <a:avLst/>
+          </a:prstGeom>
+          <a:ln w="19050">
+            <a:solidFill>
+              <a:schemeClr val="tx1"/>
+            </a:solidFill>
+            <a:miter lim="800000"/>
+          </a:ln>
+        </p:spPr>
+      </p:pic>
+    </p:spTree>
+    <p:extLst>
+      <p:ext uri="{BB962C8B-B14F-4D97-AF65-F5344CB8AC3E}">
+        <p14:creationId xmlns:p14="http://schemas.microsoft.com/office/powerpoint/2010/main" val="1207045379"/>
+      </p:ext>
+    </p:extLst>
+  </p:cSld>
+  <p:clrMapOvr>
+    <a:overrideClrMapping bg1="dk1" tx1="lt1" bg2="dk2" tx2="lt2" accent1="accent1" accent2="accent2" accent3="accent3" accent4="accent4" accent5="accent5" accent6="accent6" hlink="hlink" folHlink="folHlink"/>
+  </p:clrMapOvr>
+</p:sld>
+</file>
+
+<file path=ppt/slides/slide9.xml><?xml version="1.0" encoding="utf-8"?>
+<p:sld xmlns:a="http://schemas.openxmlformats.org/drawingml/2006/main" xmlns:r="http://schemas.openxmlformats.org/officeDocument/2006/relationships" xmlns:p="http://schemas.openxmlformats.org/presentationml/2006/main">
+  <p:cSld>
+    <p:bg>
+      <p:bgPr>
+        <a:solidFill>
+          <a:schemeClr val="bg1"/>
+        </a:solidFill>
+        <a:effectLst/>
+      </p:bgPr>
+    </p:bg>
+    <p:spTree>
+      <p:nvGrpSpPr>
+        <p:cNvPr id="1" name=""/>
+        <p:cNvGrpSpPr/>
+        <p:nvPr/>
+      </p:nvGrpSpPr>
+      <p:grpSpPr>
+        <a:xfrm>
+          <a:off x="0" y="0"/>
+          <a:ext cx="0" cy="0"/>
+          <a:chOff x="0" y="0"/>
+          <a:chExt cx="0" cy="0"/>
+        </a:xfrm>
+      </p:grpSpPr>
+      <p:sp>
+        <p:nvSpPr>
+          <p:cNvPr id="8" name="Rectangle 7">
+            <a:extLst>
+              <a:ext uri="{FF2B5EF4-FFF2-40B4-BE49-F238E27FC236}">
+                <a16:creationId xmlns:a16="http://schemas.microsoft.com/office/drawing/2014/main" id="{5A0118C5-4F8D-4CF4-BADD-53FEACC6C42A}"/>
+              </a:ext>
+              <a:ext uri="{C183D7F6-B498-43B3-948B-1728B52AA6E4}">
+                <adec:decorative xmlns:adec="http://schemas.microsoft.com/office/drawing/2017/decorative" val="1"/>
+              </a:ext>
+            </a:extLst>
+          </p:cNvPr>
+          <p:cNvSpPr>
+            <a:spLocks noGrp="1" noRot="1" noChangeAspect="1" noMove="1" noResize="1" noEditPoints="1" noAdjustHandles="1" noChangeArrowheads="1" noChangeShapeType="1" noTextEdit="1"/>
+          </p:cNvSpPr>
+          <p:nvPr>
+            <p:extLst>
+              <p:ext uri="{386F3935-93C4-4BCD-93E2-E3B085C9AB24}">
+                <p16:designElem xmlns:p16="http://schemas.microsoft.com/office/powerpoint/2015/main" val="1"/>
+              </p:ext>
+            </p:extLst>
+          </p:nvPr>
+        </p:nvSpPr>
+        <p:spPr>
+          <a:xfrm>
+            <a:off x="0" y="0"/>
+            <a:ext cx="12192000" cy="6858000"/>
+          </a:xfrm>
+          <a:prstGeom prst="rect">
+            <a:avLst/>
+          </a:prstGeom>
+          <a:solidFill>
+            <a:schemeClr val="tx1"/>
+          </a:solidFill>
+          <a:ln>
+            <a:noFill/>
+          </a:ln>
+        </p:spPr>
+        <p:style>
+          <a:lnRef idx="2">
+            <a:schemeClr val="accent1">
+              <a:shade val="50000"/>
+            </a:schemeClr>
+          </a:lnRef>
+          <a:fillRef idx="1">
+            <a:schemeClr val="accent1"/>
+          </a:fillRef>
+          <a:effectRef idx="0">
+            <a:schemeClr val="accent1"/>
+          </a:effectRef>
+          <a:fontRef idx="minor">
+            <a:schemeClr val="lt1"/>
+          </a:fontRef>
+        </p:style>
+        <p:txBody>
+          <a:bodyPr rtlCol="0" anchor="ctr"/>
+          <a:lstStyle/>
+          <a:p>
+            <a:pPr algn="ctr"/>
+            <a:endParaRPr lang="en-US" dirty="0"/>
+          </a:p>
+        </p:txBody>
+      </p:sp>
+      <p:sp>
+        <p:nvSpPr>
+          <p:cNvPr id="10" name="Oval 9">
+            <a:extLst>
+              <a:ext uri="{FF2B5EF4-FFF2-40B4-BE49-F238E27FC236}">
+                <a16:creationId xmlns:a16="http://schemas.microsoft.com/office/drawing/2014/main" id="{4E0A5C5C-2A95-428E-9F6A-0D29EBD57C9F}"/>
+              </a:ext>
+              <a:ext uri="{C183D7F6-B498-43B3-948B-1728B52AA6E4}">
+                <adec:decorative xmlns:adec="http://schemas.microsoft.com/office/drawing/2017/decorative" val="1"/>
+              </a:ext>
+            </a:extLst>
+          </p:cNvPr>
+          <p:cNvSpPr>
+            <a:spLocks noGrp="1" noRot="1" noChangeAspect="1" noMove="1" noResize="1" noEditPoints="1" noAdjustHandles="1" noChangeArrowheads="1" noChangeShapeType="1" noTextEdit="1"/>
+          </p:cNvSpPr>
+          <p:nvPr>
+            <p:extLst>
+              <p:ext uri="{386F3935-93C4-4BCD-93E2-E3B085C9AB24}">
+                <p16:designElem xmlns:p16="http://schemas.microsoft.com/office/powerpoint/2015/main" val="1"/>
+              </p:ext>
+            </p:extLst>
+          </p:nvPr>
+        </p:nvSpPr>
+        <p:spPr>
+          <a:xfrm>
+            <a:off x="888395" y="1040837"/>
+            <a:ext cx="4754948" cy="4754948"/>
+          </a:xfrm>
+          <a:prstGeom prst="ellipse">
+            <a:avLst/>
+          </a:prstGeom>
+          <a:solidFill>
+            <a:srgbClr val="FFFFFF"/>
+          </a:solidFill>
+          <a:ln w="28575">
+            <a:noFill/>
+          </a:ln>
+        </p:spPr>
+        <p:style>
+          <a:lnRef idx="2">
+            <a:schemeClr val="accent1">
+              <a:shade val="50000"/>
+            </a:schemeClr>
+          </a:lnRef>
+          <a:fillRef idx="1">
+            <a:schemeClr val="accent1"/>
+          </a:fillRef>
+          <a:effectRef idx="0">
+            <a:schemeClr val="accent1"/>
+          </a:effectRef>
+          <a:fontRef idx="minor">
+            <a:schemeClr val="lt1"/>
+          </a:fontRef>
+        </p:style>
+        <p:txBody>
+          <a:bodyPr rtlCol="0" anchor="ctr"/>
+          <a:lstStyle/>
+          <a:p>
+            <a:pPr algn="ctr"/>
+            <a:endParaRPr lang="en-US"/>
+          </a:p>
+        </p:txBody>
+      </p:sp>
+      <p:sp>
+        <p:nvSpPr>
+          <p:cNvPr id="12" name="Oval 11">
+            <a:extLst>
+              <a:ext uri="{FF2B5EF4-FFF2-40B4-BE49-F238E27FC236}">
+                <a16:creationId xmlns:a16="http://schemas.microsoft.com/office/drawing/2014/main" id="{1056F38F-7C4E-461D-8709-7D0024AE1F79}"/>
+              </a:ext>
+              <a:ext uri="{C183D7F6-B498-43B3-948B-1728B52AA6E4}">
+                <adec:decorative xmlns:adec="http://schemas.microsoft.com/office/drawing/2017/decorative" val="1"/>
+              </a:ext>
+            </a:extLst>
+          </p:cNvPr>
+          <p:cNvSpPr>
+            <a:spLocks noGrp="1" noRot="1" noChangeAspect="1" noMove="1" noResize="1" noEditPoints="1" noAdjustHandles="1" noChangeArrowheads="1" noChangeShapeType="1" noTextEdit="1"/>
+          </p:cNvSpPr>
+          <p:nvPr>
+            <p:extLst>
+              <p:ext uri="{386F3935-93C4-4BCD-93E2-E3B085C9AB24}">
+                <p16:designElem xmlns:p16="http://schemas.microsoft.com/office/powerpoint/2015/main" val="1"/>
+              </p:ext>
+            </p:extLst>
+          </p:nvPr>
+        </p:nvSpPr>
+        <p:spPr>
+          <a:xfrm>
+            <a:off x="879411" y="1029607"/>
+            <a:ext cx="4754948" cy="4754948"/>
+          </a:xfrm>
+          <a:prstGeom prst="ellipse">
+            <a:avLst/>
+          </a:prstGeom>
+          <a:solidFill>
+            <a:schemeClr val="accent6">
+              <a:alpha val="30000"/>
+            </a:schemeClr>
+          </a:solidFill>
+          <a:ln w="28575">
+            <a:solidFill>
+              <a:schemeClr val="bg1"/>
+            </a:solidFill>
+          </a:ln>
+        </p:spPr>
+        <p:style>
+          <a:lnRef idx="2">
+            <a:schemeClr val="accent1">
+              <a:shade val="50000"/>
+            </a:schemeClr>
+          </a:lnRef>
+          <a:fillRef idx="1">
+            <a:schemeClr val="accent1"/>
+          </a:fillRef>
+          <a:effectRef idx="0">
+            <a:schemeClr val="accent1"/>
+          </a:effectRef>
+          <a:fontRef idx="minor">
+            <a:schemeClr val="lt1"/>
+          </a:fontRef>
+        </p:style>
+        <p:txBody>
+          <a:bodyPr rtlCol="0" anchor="ctr"/>
+          <a:lstStyle/>
+          <a:p>
+            <a:pPr algn="ctr"/>
+            <a:endParaRPr lang="en-US"/>
+          </a:p>
+        </p:txBody>
+      </p:sp>
+      <p:sp>
+        <p:nvSpPr>
+          <p:cNvPr id="14" name="Oval 13">
+            <a:extLst>
+              <a:ext uri="{FF2B5EF4-FFF2-40B4-BE49-F238E27FC236}">
+                <a16:creationId xmlns:a16="http://schemas.microsoft.com/office/drawing/2014/main" id="{C7278469-3C3C-49CE-AEEE-E176A4900B78}"/>
+              </a:ext>
+              <a:ext uri="{C183D7F6-B498-43B3-948B-1728B52AA6E4}">
+                <adec:decorative xmlns:adec="http://schemas.microsoft.com/office/drawing/2017/decorative" val="1"/>
+              </a:ext>
+            </a:extLst>
+          </p:cNvPr>
+          <p:cNvSpPr>
+            <a:spLocks noGrp="1" noRot="1" noChangeAspect="1" noMove="1" noResize="1" noEditPoints="1" noAdjustHandles="1" noChangeArrowheads="1" noChangeShapeType="1" noTextEdit="1"/>
+          </p:cNvSpPr>
+          <p:nvPr>
+            <p:extLst>
+              <p:ext uri="{386F3935-93C4-4BCD-93E2-E3B085C9AB24}">
+                <p16:designElem xmlns:p16="http://schemas.microsoft.com/office/powerpoint/2015/main" val="1"/>
+              </p:ext>
+            </p:extLst>
+          </p:nvPr>
+        </p:nvSpPr>
+        <p:spPr>
+          <a:xfrm>
+            <a:off x="739960" y="934855"/>
+            <a:ext cx="4754948" cy="4754948"/>
+          </a:xfrm>
+          <a:prstGeom prst="ellipse">
+            <a:avLst/>
+          </a:prstGeom>
+          <a:solidFill>
+            <a:schemeClr val="tx1"/>
+          </a:solidFill>
+          <a:ln w="28575">
+            <a:solidFill>
+              <a:schemeClr val="bg1"/>
+            </a:solidFill>
+          </a:ln>
+        </p:spPr>
+        <p:style>
+          <a:lnRef idx="2">
+            <a:schemeClr val="accent1">
+              <a:shade val="50000"/>
+            </a:schemeClr>
+          </a:lnRef>
+          <a:fillRef idx="1">
+            <a:schemeClr val="accent1"/>
+          </a:fillRef>
+          <a:effectRef idx="0">
+            <a:schemeClr val="accent1"/>
+          </a:effectRef>
+          <a:fontRef idx="minor">
+            <a:schemeClr val="lt1"/>
+          </a:fontRef>
+        </p:style>
+        <p:txBody>
+          <a:bodyPr rtlCol="0" anchor="ctr"/>
+          <a:lstStyle/>
+          <a:p>
+            <a:pPr algn="ctr"/>
+            <a:endParaRPr lang="en-US"/>
+          </a:p>
+        </p:txBody>
+      </p:sp>
+      <p:sp>
+        <p:nvSpPr>
+          <p:cNvPr id="2" name="Title 1">
+            <a:extLst>
+              <a:ext uri="{FF2B5EF4-FFF2-40B4-BE49-F238E27FC236}">
+                <a16:creationId xmlns:a16="http://schemas.microsoft.com/office/drawing/2014/main" id="{2D2A6F50-66D4-43FB-935C-2FF4844F32A6}"/>
+              </a:ext>
+            </a:extLst>
+          </p:cNvPr>
+          <p:cNvSpPr>
+            <a:spLocks noGrp="1"/>
+          </p:cNvSpPr>
+          <p:nvPr>
+            <p:ph type="title"/>
+          </p:nvPr>
+        </p:nvSpPr>
+        <p:spPr>
+          <a:xfrm>
+            <a:off x="1102368" y="1877492"/>
+            <a:ext cx="4030132" cy="3215373"/>
+          </a:xfrm>
+        </p:spPr>
+        <p:txBody>
+          <a:bodyPr>
+            <a:normAutofit/>
+          </a:bodyPr>
+          <a:lstStyle/>
+          <a:p>
+            <a:pPr algn="ctr"/>
+            <a:r>
+              <a:rPr lang="en-US" dirty="0">
+                <a:solidFill>
+                  <a:schemeClr val="bg1"/>
+                </a:solidFill>
+              </a:rPr>
+              <a:t>Demo</a:t>
+            </a:r>
+          </a:p>
+        </p:txBody>
+      </p:sp>
+      <p:grpSp>
+        <p:nvGrpSpPr>
+          <p:cNvPr id="16" name="Group 15">
+            <a:extLst>
+              <a:ext uri="{FF2B5EF4-FFF2-40B4-BE49-F238E27FC236}">
+                <a16:creationId xmlns:a16="http://schemas.microsoft.com/office/drawing/2014/main" id="{93DC754C-7E09-422D-A8BB-AF632E90DFA2}"/>
+              </a:ext>
+              <a:ext uri="{C183D7F6-B498-43B3-948B-1728B52AA6E4}">
+                <adec:decorative xmlns:adec="http://schemas.microsoft.com/office/drawing/2017/decorative" val="1"/>
+              </a:ext>
+            </a:extLst>
+          </p:cNvPr>
+          <p:cNvGrpSpPr>
+            <a:grpSpLocks noGrp="1" noUngrp="1" noRot="1" noChangeAspect="1" noMove="1" noResize="1"/>
+          </p:cNvGrpSpPr>
+          <p:nvPr>
+            <p:extLst>
+              <p:ext uri="{386F3935-93C4-4BCD-93E2-E3B085C9AB24}">
+                <p16:designElem xmlns:p16="http://schemas.microsoft.com/office/powerpoint/2015/main" val="1"/>
+              </p:ext>
+            </p:extLst>
+          </p:nvPr>
+        </p:nvGrpSpPr>
+        <p:grpSpPr>
+          <a:xfrm>
+            <a:off x="0" y="377893"/>
+            <a:ext cx="1861854" cy="717514"/>
+            <a:chOff x="0" y="377893"/>
+            <a:chExt cx="1861854" cy="717514"/>
+          </a:xfrm>
+          <a:solidFill>
+            <a:schemeClr val="bg1"/>
+          </a:solidFill>
+        </p:grpSpPr>
+        <p:sp>
+          <p:nvSpPr>
+            <p:cNvPr id="17" name="Freeform: Shape 16">
+              <a:extLst>
+                <a:ext uri="{FF2B5EF4-FFF2-40B4-BE49-F238E27FC236}">
+                  <a16:creationId xmlns:a16="http://schemas.microsoft.com/office/drawing/2014/main" id="{C5A741B9-65EC-4C5B-9FE0-4A18575771A6}"/>
+                </a:ext>
+                <a:ext uri="{C183D7F6-B498-43B3-948B-1728B52AA6E4}">
+                  <adec:decorative xmlns:adec="http://schemas.microsoft.com/office/drawing/2017/decorative" val="1"/>
+                </a:ext>
+              </a:extLst>
+            </p:cNvPr>
+            <p:cNvSpPr/>
+            <p:nvPr>
+              <p:extLst>
+                <p:ext uri="{386F3935-93C4-4BCD-93E2-E3B085C9AB24}">
+                  <p16:designElem xmlns:p16="http://schemas.microsoft.com/office/powerpoint/2015/main" val="1"/>
+                </p:ext>
+              </p:extLst>
+            </p:nvPr>
+          </p:nvSpPr>
+          <p:spPr>
+            <a:xfrm>
+              <a:off x="0" y="377893"/>
+              <a:ext cx="1861854" cy="277779"/>
+            </a:xfrm>
+            <a:custGeom>
+              <a:avLst/>
+              <a:gdLst>
+                <a:gd name="connsiteX0" fmla="*/ 180458 w 1861854"/>
+                <a:gd name="connsiteY0" fmla="*/ 0 h 277779"/>
+                <a:gd name="connsiteX1" fmla="*/ 419222 w 1861854"/>
+                <a:gd name="connsiteY1" fmla="*/ 238761 h 277779"/>
+                <a:gd name="connsiteX2" fmla="*/ 657984 w 1861854"/>
+                <a:gd name="connsiteY2" fmla="*/ 0 h 277779"/>
+                <a:gd name="connsiteX3" fmla="*/ 896745 w 1861854"/>
+                <a:gd name="connsiteY3" fmla="*/ 238761 h 277779"/>
+                <a:gd name="connsiteX4" fmla="*/ 1135754 w 1861854"/>
+                <a:gd name="connsiteY4" fmla="*/ 0 h 277779"/>
+                <a:gd name="connsiteX5" fmla="*/ 1374516 w 1861854"/>
+                <a:gd name="connsiteY5" fmla="*/ 238761 h 277779"/>
+                <a:gd name="connsiteX6" fmla="*/ 1613277 w 1861854"/>
+                <a:gd name="connsiteY6" fmla="*/ 0 h 277779"/>
+                <a:gd name="connsiteX7" fmla="*/ 1861854 w 1861854"/>
+                <a:gd name="connsiteY7" fmla="*/ 248577 h 277779"/>
+                <a:gd name="connsiteX8" fmla="*/ 1842470 w 1861854"/>
+                <a:gd name="connsiteY8" fmla="*/ 267963 h 277779"/>
+                <a:gd name="connsiteX9" fmla="*/ 1613277 w 1861854"/>
+                <a:gd name="connsiteY9" fmla="*/ 39017 h 277779"/>
+                <a:gd name="connsiteX10" fmla="*/ 1374516 w 1861854"/>
+                <a:gd name="connsiteY10" fmla="*/ 277779 h 277779"/>
+                <a:gd name="connsiteX11" fmla="*/ 1135754 w 1861854"/>
+                <a:gd name="connsiteY11" fmla="*/ 39017 h 277779"/>
+                <a:gd name="connsiteX12" fmla="*/ 896745 w 1861854"/>
+                <a:gd name="connsiteY12" fmla="*/ 277779 h 277779"/>
+                <a:gd name="connsiteX13" fmla="*/ 657984 w 1861854"/>
+                <a:gd name="connsiteY13" fmla="*/ 39017 h 277779"/>
+                <a:gd name="connsiteX14" fmla="*/ 419222 w 1861854"/>
+                <a:gd name="connsiteY14" fmla="*/ 277779 h 277779"/>
+                <a:gd name="connsiteX15" fmla="*/ 180458 w 1861854"/>
+                <a:gd name="connsiteY15" fmla="*/ 39017 h 277779"/>
+                <a:gd name="connsiteX16" fmla="*/ 0 w 1861854"/>
+                <a:gd name="connsiteY16" fmla="*/ 219283 h 277779"/>
+                <a:gd name="connsiteX17" fmla="*/ 0 w 1861854"/>
+                <a:gd name="connsiteY17" fmla="*/ 180458 h 277779"/>
+              </a:gdLst>
+              <a:ahLst/>
+              <a:cxnLst>
+                <a:cxn ang="0">
+                  <a:pos x="connsiteX0" y="connsiteY0"/>
+                </a:cxn>
+                <a:cxn ang="0">
+                  <a:pos x="connsiteX1" y="connsiteY1"/>
+                </a:cxn>
+                <a:cxn ang="0">
+                  <a:pos x="connsiteX2" y="connsiteY2"/>
+                </a:cxn>
+                <a:cxn ang="0">
+                  <a:pos x="connsiteX3" y="connsiteY3"/>
+                </a:cxn>
+                <a:cxn ang="0">
+                  <a:pos x="connsiteX4" y="connsiteY4"/>
+                </a:cxn>
+                <a:cxn ang="0">
+                  <a:pos x="connsiteX5" y="connsiteY5"/>
+                </a:cxn>
+                <a:cxn ang="0">
+                  <a:pos x="connsiteX6" y="connsiteY6"/>
+                </a:cxn>
+                <a:cxn ang="0">
+                  <a:pos x="connsiteX7" y="connsiteY7"/>
+                </a:cxn>
+                <a:cxn ang="0">
+                  <a:pos x="connsiteX8" y="connsiteY8"/>
+                </a:cxn>
+                <a:cxn ang="0">
+                  <a:pos x="connsiteX9" y="connsiteY9"/>
+                </a:cxn>
+                <a:cxn ang="0">
+                  <a:pos x="connsiteX10" y="connsiteY10"/>
+                </a:cxn>
+                <a:cxn ang="0">
+                  <a:pos x="connsiteX11" y="connsiteY11"/>
+                </a:cxn>
+                <a:cxn ang="0">
+                  <a:pos x="connsiteX12" y="connsiteY12"/>
+                </a:cxn>
+                <a:cxn ang="0">
+                  <a:pos x="connsiteX13" y="connsiteY13"/>
+                </a:cxn>
+                <a:cxn ang="0">
+                  <a:pos x="connsiteX14" y="connsiteY14"/>
+                </a:cxn>
+                <a:cxn ang="0">
+                  <a:pos x="connsiteX15" y="connsiteY15"/>
+                </a:cxn>
+                <a:cxn ang="0">
+                  <a:pos x="connsiteX16" y="connsiteY16"/>
+                </a:cxn>
+                <a:cxn ang="0">
+                  <a:pos x="connsiteX17" y="connsiteY17"/>
+                </a:cxn>
+              </a:cxnLst>
+              <a:rect l="l" t="t" r="r" b="b"/>
+              <a:pathLst>
+                <a:path w="1861854" h="277779">
+                  <a:moveTo>
+                    <a:pt x="180458" y="0"/>
+                  </a:moveTo>
+                  <a:lnTo>
+                    <a:pt x="419222" y="238761"/>
+                  </a:lnTo>
+                  <a:lnTo>
+                    <a:pt x="657984" y="0"/>
+                  </a:lnTo>
+                  <a:lnTo>
+                    <a:pt x="896745" y="238761"/>
+                  </a:lnTo>
+                  <a:lnTo>
+                    <a:pt x="1135754" y="0"/>
+                  </a:lnTo>
+                  <a:lnTo>
+                    <a:pt x="1374516" y="238761"/>
+                  </a:lnTo>
+                  <a:lnTo>
+                    <a:pt x="1613277" y="0"/>
+                  </a:lnTo>
+                  <a:lnTo>
+                    <a:pt x="1861854" y="248577"/>
+                  </a:lnTo>
+                  <a:lnTo>
+                    <a:pt x="1842470" y="267963"/>
+                  </a:lnTo>
+                  <a:lnTo>
+                    <a:pt x="1613277" y="39017"/>
+                  </a:lnTo>
+                  <a:lnTo>
+                    <a:pt x="1374516" y="277779"/>
+                  </a:lnTo>
+                  <a:lnTo>
+                    <a:pt x="1135754" y="39017"/>
+                  </a:lnTo>
+                  <a:lnTo>
+                    <a:pt x="896745" y="277779"/>
+                  </a:lnTo>
+                  <a:lnTo>
+                    <a:pt x="657984" y="39017"/>
+                  </a:lnTo>
+                  <a:lnTo>
+                    <a:pt x="419222" y="277779"/>
+                  </a:lnTo>
+                  <a:lnTo>
+                    <a:pt x="180458" y="39017"/>
+                  </a:lnTo>
+                  <a:lnTo>
+                    <a:pt x="0" y="219283"/>
+                  </a:lnTo>
+                  <a:lnTo>
+                    <a:pt x="0" y="180458"/>
+                  </a:lnTo>
+                  <a:close/>
+                </a:path>
+              </a:pathLst>
+            </a:custGeom>
+            <a:grpFill/>
+            <a:ln w="9525" cap="flat">
+              <a:noFill/>
+              <a:prstDash val="solid"/>
+              <a:miter/>
+            </a:ln>
+          </p:spPr>
+          <p:txBody>
+            <a:bodyPr wrap="square" rtlCol="0" anchor="ctr">
+              <a:noAutofit/>
+            </a:bodyPr>
+            <a:lstStyle/>
+            <a:p>
+              <a:endParaRPr lang="en-US"/>
+            </a:p>
+          </p:txBody>
+        </p:sp>
+        <p:sp>
+          <p:nvSpPr>
+            <p:cNvPr id="18" name="Freeform: Shape 17">
+              <a:extLst>
+                <a:ext uri="{FF2B5EF4-FFF2-40B4-BE49-F238E27FC236}">
+                  <a16:creationId xmlns:a16="http://schemas.microsoft.com/office/drawing/2014/main" id="{C0BB4301-41FA-4453-956F-A11CC664B68B}"/>
+                </a:ext>
+                <a:ext uri="{C183D7F6-B498-43B3-948B-1728B52AA6E4}">
+                  <adec:decorative xmlns:adec="http://schemas.microsoft.com/office/drawing/2017/decorative" val="1"/>
+                </a:ext>
+              </a:extLst>
+            </p:cNvPr>
+            <p:cNvSpPr/>
+            <p:nvPr>
+              <p:extLst>
+                <p:ext uri="{386F3935-93C4-4BCD-93E2-E3B085C9AB24}">
+                  <p16:designElem xmlns:p16="http://schemas.microsoft.com/office/powerpoint/2015/main" val="1"/>
+                </p:ext>
+              </p:extLst>
+            </p:nvPr>
+          </p:nvSpPr>
+          <p:spPr>
+            <a:xfrm>
+              <a:off x="0" y="817628"/>
+              <a:ext cx="1861854" cy="277779"/>
+            </a:xfrm>
+            <a:custGeom>
+              <a:avLst/>
+              <a:gdLst>
+                <a:gd name="connsiteX0" fmla="*/ 180458 w 1861854"/>
+                <a:gd name="connsiteY0" fmla="*/ 0 h 277779"/>
+                <a:gd name="connsiteX1" fmla="*/ 419222 w 1861854"/>
+                <a:gd name="connsiteY1" fmla="*/ 238761 h 277779"/>
+                <a:gd name="connsiteX2" fmla="*/ 657984 w 1861854"/>
+                <a:gd name="connsiteY2" fmla="*/ 0 h 277779"/>
+                <a:gd name="connsiteX3" fmla="*/ 896745 w 1861854"/>
+                <a:gd name="connsiteY3" fmla="*/ 238761 h 277779"/>
+                <a:gd name="connsiteX4" fmla="*/ 1135754 w 1861854"/>
+                <a:gd name="connsiteY4" fmla="*/ 0 h 277779"/>
+                <a:gd name="connsiteX5" fmla="*/ 1374516 w 1861854"/>
+                <a:gd name="connsiteY5" fmla="*/ 238761 h 277779"/>
+                <a:gd name="connsiteX6" fmla="*/ 1613277 w 1861854"/>
+                <a:gd name="connsiteY6" fmla="*/ 0 h 277779"/>
+                <a:gd name="connsiteX7" fmla="*/ 1861854 w 1861854"/>
+                <a:gd name="connsiteY7" fmla="*/ 248577 h 277779"/>
+                <a:gd name="connsiteX8" fmla="*/ 1842470 w 1861854"/>
+                <a:gd name="connsiteY8" fmla="*/ 268208 h 277779"/>
+                <a:gd name="connsiteX9" fmla="*/ 1613277 w 1861854"/>
+                <a:gd name="connsiteY9" fmla="*/ 39017 h 277779"/>
+                <a:gd name="connsiteX10" fmla="*/ 1374516 w 1861854"/>
+                <a:gd name="connsiteY10" fmla="*/ 277779 h 277779"/>
+                <a:gd name="connsiteX11" fmla="*/ 1135754 w 1861854"/>
+                <a:gd name="connsiteY11" fmla="*/ 39017 h 277779"/>
+                <a:gd name="connsiteX12" fmla="*/ 896745 w 1861854"/>
+                <a:gd name="connsiteY12" fmla="*/ 277779 h 277779"/>
+                <a:gd name="connsiteX13" fmla="*/ 657984 w 1861854"/>
+                <a:gd name="connsiteY13" fmla="*/ 39017 h 277779"/>
+                <a:gd name="connsiteX14" fmla="*/ 419222 w 1861854"/>
+                <a:gd name="connsiteY14" fmla="*/ 277779 h 277779"/>
+                <a:gd name="connsiteX15" fmla="*/ 180458 w 1861854"/>
+                <a:gd name="connsiteY15" fmla="*/ 39017 h 277779"/>
+                <a:gd name="connsiteX16" fmla="*/ 0 w 1861854"/>
+                <a:gd name="connsiteY16" fmla="*/ 219475 h 277779"/>
+                <a:gd name="connsiteX17" fmla="*/ 0 w 1861854"/>
+                <a:gd name="connsiteY17" fmla="*/ 180458 h 277779"/>
+              </a:gdLst>
+              <a:ahLst/>
+              <a:cxnLst>
+                <a:cxn ang="0">
+                  <a:pos x="connsiteX0" y="connsiteY0"/>
+                </a:cxn>
+                <a:cxn ang="0">
+                  <a:pos x="connsiteX1" y="connsiteY1"/>
+                </a:cxn>
+                <a:cxn ang="0">
+                  <a:pos x="connsiteX2" y="connsiteY2"/>
+                </a:cxn>
+                <a:cxn ang="0">
+                  <a:pos x="connsiteX3" y="connsiteY3"/>
+                </a:cxn>
+                <a:cxn ang="0">
+                  <a:pos x="connsiteX4" y="connsiteY4"/>
+                </a:cxn>
+                <a:cxn ang="0">
+                  <a:pos x="connsiteX5" y="connsiteY5"/>
+                </a:cxn>
+                <a:cxn ang="0">
+                  <a:pos x="connsiteX6" y="connsiteY6"/>
+                </a:cxn>
+                <a:cxn ang="0">
+                  <a:pos x="connsiteX7" y="connsiteY7"/>
+                </a:cxn>
+                <a:cxn ang="0">
+                  <a:pos x="connsiteX8" y="connsiteY8"/>
+                </a:cxn>
+                <a:cxn ang="0">
+                  <a:pos x="connsiteX9" y="connsiteY9"/>
+                </a:cxn>
+                <a:cxn ang="0">
+                  <a:pos x="connsiteX10" y="connsiteY10"/>
+                </a:cxn>
+                <a:cxn ang="0">
+                  <a:pos x="connsiteX11" y="connsiteY11"/>
+                </a:cxn>
+                <a:cxn ang="0">
+                  <a:pos x="connsiteX12" y="connsiteY12"/>
+                </a:cxn>
+                <a:cxn ang="0">
+                  <a:pos x="connsiteX13" y="connsiteY13"/>
+                </a:cxn>
+                <a:cxn ang="0">
+                  <a:pos x="connsiteX14" y="connsiteY14"/>
+                </a:cxn>
+                <a:cxn ang="0">
+                  <a:pos x="connsiteX15" y="connsiteY15"/>
+                </a:cxn>
+                <a:cxn ang="0">
+                  <a:pos x="connsiteX16" y="connsiteY16"/>
+                </a:cxn>
+                <a:cxn ang="0">
+                  <a:pos x="connsiteX17" y="connsiteY17"/>
+                </a:cxn>
+              </a:cxnLst>
+              <a:rect l="l" t="t" r="r" b="b"/>
+              <a:pathLst>
+                <a:path w="1861854" h="277779">
+                  <a:moveTo>
+                    <a:pt x="180458" y="0"/>
+                  </a:moveTo>
+                  <a:lnTo>
+                    <a:pt x="419222" y="238761"/>
+                  </a:lnTo>
+                  <a:lnTo>
+                    <a:pt x="657984" y="0"/>
+                  </a:lnTo>
+                  <a:lnTo>
+                    <a:pt x="896745" y="238761"/>
+                  </a:lnTo>
+                  <a:lnTo>
+                    <a:pt x="1135754" y="0"/>
+                  </a:lnTo>
+                  <a:lnTo>
+                    <a:pt x="1374516" y="238761"/>
+                  </a:lnTo>
+                  <a:lnTo>
+                    <a:pt x="1613277" y="0"/>
+                  </a:lnTo>
+                  <a:lnTo>
+                    <a:pt x="1861854" y="248577"/>
+                  </a:lnTo>
+                  <a:lnTo>
+                    <a:pt x="1842470" y="268208"/>
+                  </a:lnTo>
+                  <a:lnTo>
+                    <a:pt x="1613277" y="39017"/>
+                  </a:lnTo>
+                  <a:lnTo>
+                    <a:pt x="1374516" y="277779"/>
+                  </a:lnTo>
+                  <a:lnTo>
+                    <a:pt x="1135754" y="39017"/>
+                  </a:lnTo>
+                  <a:lnTo>
+                    <a:pt x="896745" y="277779"/>
+                  </a:lnTo>
+                  <a:lnTo>
+                    <a:pt x="657984" y="39017"/>
+                  </a:lnTo>
+                  <a:lnTo>
+                    <a:pt x="419222" y="277779"/>
+                  </a:lnTo>
+                  <a:lnTo>
+                    <a:pt x="180458" y="39017"/>
+                  </a:lnTo>
+                  <a:lnTo>
+                    <a:pt x="0" y="219475"/>
+                  </a:lnTo>
+                  <a:lnTo>
+                    <a:pt x="0" y="180458"/>
+                  </a:lnTo>
+                  <a:close/>
+                </a:path>
+              </a:pathLst>
+            </a:custGeom>
+            <a:grpFill/>
+            <a:ln w="9525" cap="flat">
+              <a:noFill/>
+              <a:prstDash val="solid"/>
+              <a:miter/>
+            </a:ln>
+          </p:spPr>
+          <p:txBody>
+            <a:bodyPr wrap="square" rtlCol="0" anchor="ctr">
+              <a:noAutofit/>
+            </a:bodyPr>
+            <a:lstStyle/>
+            <a:p>
+              <a:endParaRPr lang="en-US" dirty="0"/>
+            </a:p>
+          </p:txBody>
+        </p:sp>
+      </p:grpSp>
+      <p:sp>
+        <p:nvSpPr>
+          <p:cNvPr id="20" name="Graphic 212">
+            <a:extLst>
+              <a:ext uri="{FF2B5EF4-FFF2-40B4-BE49-F238E27FC236}">
+                <a16:creationId xmlns:a16="http://schemas.microsoft.com/office/drawing/2014/main" id="{4C6598AB-1C17-4D54-951C-A082D94ACB7A}"/>
+              </a:ext>
+              <a:ext uri="{C183D7F6-B498-43B3-948B-1728B52AA6E4}">
+                <adec:decorative xmlns:adec="http://schemas.microsoft.com/office/drawing/2017/decorative" val="1"/>
+              </a:ext>
+            </a:extLst>
+          </p:cNvPr>
+          <p:cNvSpPr>
+            <a:spLocks noGrp="1" noRot="1" noChangeAspect="1" noMove="1" noResize="1" noEditPoints="1" noAdjustHandles="1" noChangeArrowheads="1" noChangeShapeType="1" noTextEdit="1"/>
+          </p:cNvSpPr>
+          <p:nvPr>
+            <p:extLst>
+              <p:ext uri="{386F3935-93C4-4BCD-93E2-E3B085C9AB24}">
+                <p16:designElem xmlns:p16="http://schemas.microsoft.com/office/powerpoint/2015/main" val="1"/>
+              </p:ext>
+            </p:extLst>
+          </p:nvPr>
+        </p:nvSpPr>
+        <p:spPr>
+          <a:xfrm>
+            <a:off x="4588524" y="457812"/>
+            <a:ext cx="914565" cy="914565"/>
+          </a:xfrm>
+          <a:custGeom>
+            <a:avLst/>
+            <a:gdLst>
+              <a:gd name="connsiteX0" fmla="*/ 403574 w 807148"/>
+              <a:gd name="connsiteY0" fmla="*/ 0 h 807148"/>
+              <a:gd name="connsiteX1" fmla="*/ 0 w 807148"/>
+              <a:gd name="connsiteY1" fmla="*/ 403574 h 807148"/>
+              <a:gd name="connsiteX2" fmla="*/ 403574 w 807148"/>
+              <a:gd name="connsiteY2" fmla="*/ 807149 h 807148"/>
+              <a:gd name="connsiteX3" fmla="*/ 807149 w 807148"/>
+              <a:gd name="connsiteY3" fmla="*/ 403574 h 807148"/>
+              <a:gd name="connsiteX4" fmla="*/ 403574 w 807148"/>
+              <a:gd name="connsiteY4" fmla="*/ 0 h 807148"/>
+              <a:gd name="connsiteX5" fmla="*/ 403574 w 807148"/>
+              <a:gd name="connsiteY5" fmla="*/ 667988 h 807148"/>
+              <a:gd name="connsiteX6" fmla="*/ 139160 w 807148"/>
+              <a:gd name="connsiteY6" fmla="*/ 403574 h 807148"/>
+              <a:gd name="connsiteX7" fmla="*/ 403574 w 807148"/>
+              <a:gd name="connsiteY7" fmla="*/ 139160 h 807148"/>
+              <a:gd name="connsiteX8" fmla="*/ 667988 w 807148"/>
+              <a:gd name="connsiteY8" fmla="*/ 403574 h 807148"/>
+              <a:gd name="connsiteX9" fmla="*/ 403574 w 807148"/>
+              <a:gd name="connsiteY9" fmla="*/ 667988 h 807148"/>
+            </a:gdLst>
+            <a:ahLst/>
+            <a:cxnLst>
+              <a:cxn ang="0">
+                <a:pos x="connsiteX0" y="connsiteY0"/>
+              </a:cxn>
+              <a:cxn ang="0">
+                <a:pos x="connsiteX1" y="connsiteY1"/>
+              </a:cxn>
+              <a:cxn ang="0">
+                <a:pos x="connsiteX2" y="connsiteY2"/>
+              </a:cxn>
+              <a:cxn ang="0">
+                <a:pos x="connsiteX3" y="connsiteY3"/>
+              </a:cxn>
+              <a:cxn ang="0">
+                <a:pos x="connsiteX4" y="connsiteY4"/>
+              </a:cxn>
+              <a:cxn ang="0">
+                <a:pos x="connsiteX5" y="connsiteY5"/>
+              </a:cxn>
+              <a:cxn ang="0">
+                <a:pos x="connsiteX6" y="connsiteY6"/>
+              </a:cxn>
+              <a:cxn ang="0">
+                <a:pos x="connsiteX7" y="connsiteY7"/>
+              </a:cxn>
+              <a:cxn ang="0">
+                <a:pos x="connsiteX8" y="connsiteY8"/>
+              </a:cxn>
+              <a:cxn ang="0">
+                <a:pos x="connsiteX9" y="connsiteY9"/>
+              </a:cxn>
+            </a:cxnLst>
+            <a:rect l="l" t="t" r="r" b="b"/>
+            <a:pathLst>
+              <a:path w="807148" h="807148">
+                <a:moveTo>
+                  <a:pt x="403574" y="0"/>
+                </a:moveTo>
+                <a:cubicBezTo>
+                  <a:pt x="180689" y="0"/>
+                  <a:pt x="0" y="180689"/>
+                  <a:pt x="0" y="403574"/>
+                </a:cubicBezTo>
+                <a:cubicBezTo>
+                  <a:pt x="0" y="626459"/>
+                  <a:pt x="180689" y="807149"/>
+                  <a:pt x="403574" y="807149"/>
+                </a:cubicBezTo>
+                <a:cubicBezTo>
+                  <a:pt x="626459" y="807149"/>
+                  <a:pt x="807149" y="626459"/>
+                  <a:pt x="807149" y="403574"/>
+                </a:cubicBezTo>
+                <a:cubicBezTo>
+                  <a:pt x="807149" y="180689"/>
+                  <a:pt x="626459" y="0"/>
+                  <a:pt x="403574" y="0"/>
+                </a:cubicBezTo>
+                <a:close/>
+                <a:moveTo>
+                  <a:pt x="403574" y="667988"/>
+                </a:moveTo>
+                <a:cubicBezTo>
+                  <a:pt x="257556" y="667988"/>
+                  <a:pt x="139160" y="549593"/>
+                  <a:pt x="139160" y="403574"/>
+                </a:cubicBezTo>
+                <a:cubicBezTo>
+                  <a:pt x="139160" y="257556"/>
+                  <a:pt x="257556" y="139160"/>
+                  <a:pt x="403574" y="139160"/>
+                </a:cubicBezTo>
+                <a:cubicBezTo>
+                  <a:pt x="549593" y="139160"/>
+                  <a:pt x="667988" y="257556"/>
+                  <a:pt x="667988" y="403574"/>
+                </a:cubicBezTo>
+                <a:cubicBezTo>
+                  <a:pt x="667988" y="549593"/>
+                  <a:pt x="549593" y="667988"/>
+                  <a:pt x="403574" y="667988"/>
+                </a:cubicBezTo>
+                <a:close/>
+              </a:path>
+            </a:pathLst>
+          </a:custGeom>
+          <a:solidFill>
+            <a:srgbClr val="FFFFFF"/>
+          </a:solidFill>
+          <a:ln w="28575">
+            <a:solidFill>
+              <a:schemeClr val="tx1"/>
+            </a:solidFill>
+          </a:ln>
+        </p:spPr>
+        <p:style>
+          <a:lnRef idx="2">
+            <a:schemeClr val="accent1">
+              <a:shade val="50000"/>
+            </a:schemeClr>
+          </a:lnRef>
+          <a:fillRef idx="1">
+            <a:schemeClr val="accent1"/>
+          </a:fillRef>
+          <a:effectRef idx="0">
+            <a:schemeClr val="accent1"/>
+          </a:effectRef>
+          <a:fontRef idx="minor">
+            <a:schemeClr val="lt1"/>
+          </a:fontRef>
+        </p:style>
+        <p:txBody>
+          <a:bodyPr rot="0" spcFirstLastPara="0" vertOverflow="overflow" horzOverflow="overflow" vert="horz" wrap="square" lIns="91440" tIns="45720" rIns="91440" bIns="45720" numCol="1" spcCol="0" rtlCol="0" fromWordArt="0" anchor="ctr" anchorCtr="0" forceAA="0" compatLnSpc="1">
+            <a:prstTxWarp prst="textNoShape">
+              <a:avLst/>
+            </a:prstTxWarp>
+            <a:noAutofit/>
+          </a:bodyPr>
+          <a:lstStyle/>
+          <a:p>
+            <a:pPr algn="ctr"/>
+            <a:endParaRPr lang="en-US">
+              <a:solidFill>
+                <a:schemeClr val="lt1"/>
+              </a:solidFill>
+            </a:endParaRPr>
+          </a:p>
+        </p:txBody>
+      </p:sp>
+      <p:sp>
+        <p:nvSpPr>
+          <p:cNvPr id="22" name="Graphic 212">
+            <a:extLst>
+              <a:ext uri="{FF2B5EF4-FFF2-40B4-BE49-F238E27FC236}">
+                <a16:creationId xmlns:a16="http://schemas.microsoft.com/office/drawing/2014/main" id="{C83B66D7-137D-4AC1-B172-53D60F08BEB5}"/>
+              </a:ext>
+              <a:ext uri="{C183D7F6-B498-43B3-948B-1728B52AA6E4}">
+                <adec:decorative xmlns:adec="http://schemas.microsoft.com/office/drawing/2017/decorative" val="1"/>
+              </a:ext>
+            </a:extLst>
+          </p:cNvPr>
+          <p:cNvSpPr>
+            <a:spLocks noGrp="1" noRot="1" noChangeAspect="1" noMove="1" noResize="1" noEditPoints="1" noAdjustHandles="1" noChangeArrowheads="1" noChangeShapeType="1" noTextEdit="1"/>
+          </p:cNvSpPr>
+          <p:nvPr>
+            <p:extLst>
+              <p:ext uri="{386F3935-93C4-4BCD-93E2-E3B085C9AB24}">
+                <p16:designElem xmlns:p16="http://schemas.microsoft.com/office/powerpoint/2015/main" val="1"/>
+              </p:ext>
+            </p:extLst>
+          </p:nvPr>
+        </p:nvSpPr>
+        <p:spPr>
+          <a:xfrm>
+            <a:off x="4588524" y="457812"/>
+            <a:ext cx="914565" cy="914565"/>
+          </a:xfrm>
+          <a:custGeom>
+            <a:avLst/>
+            <a:gdLst>
+              <a:gd name="connsiteX0" fmla="*/ 403574 w 807148"/>
+              <a:gd name="connsiteY0" fmla="*/ 0 h 807148"/>
+              <a:gd name="connsiteX1" fmla="*/ 0 w 807148"/>
+              <a:gd name="connsiteY1" fmla="*/ 403574 h 807148"/>
+              <a:gd name="connsiteX2" fmla="*/ 403574 w 807148"/>
+              <a:gd name="connsiteY2" fmla="*/ 807149 h 807148"/>
+              <a:gd name="connsiteX3" fmla="*/ 807149 w 807148"/>
+              <a:gd name="connsiteY3" fmla="*/ 403574 h 807148"/>
+              <a:gd name="connsiteX4" fmla="*/ 403574 w 807148"/>
+              <a:gd name="connsiteY4" fmla="*/ 0 h 807148"/>
+              <a:gd name="connsiteX5" fmla="*/ 403574 w 807148"/>
+              <a:gd name="connsiteY5" fmla="*/ 667988 h 807148"/>
+              <a:gd name="connsiteX6" fmla="*/ 139160 w 807148"/>
+              <a:gd name="connsiteY6" fmla="*/ 403574 h 807148"/>
+              <a:gd name="connsiteX7" fmla="*/ 403574 w 807148"/>
+              <a:gd name="connsiteY7" fmla="*/ 139160 h 807148"/>
+              <a:gd name="connsiteX8" fmla="*/ 667988 w 807148"/>
+              <a:gd name="connsiteY8" fmla="*/ 403574 h 807148"/>
+              <a:gd name="connsiteX9" fmla="*/ 403574 w 807148"/>
+              <a:gd name="connsiteY9" fmla="*/ 667988 h 807148"/>
+            </a:gdLst>
+            <a:ahLst/>
+            <a:cxnLst>
+              <a:cxn ang="0">
+                <a:pos x="connsiteX0" y="connsiteY0"/>
+              </a:cxn>
+              <a:cxn ang="0">
+                <a:pos x="connsiteX1" y="connsiteY1"/>
+              </a:cxn>
+              <a:cxn ang="0">
+                <a:pos x="connsiteX2" y="connsiteY2"/>
+              </a:cxn>
+              <a:cxn ang="0">
+                <a:pos x="connsiteX3" y="connsiteY3"/>
+              </a:cxn>
+              <a:cxn ang="0">
+                <a:pos x="connsiteX4" y="connsiteY4"/>
+              </a:cxn>
+              <a:cxn ang="0">
+                <a:pos x="connsiteX5" y="connsiteY5"/>
+              </a:cxn>
+              <a:cxn ang="0">
+                <a:pos x="connsiteX6" y="connsiteY6"/>
+              </a:cxn>
+              <a:cxn ang="0">
+                <a:pos x="connsiteX7" y="connsiteY7"/>
+              </a:cxn>
+              <a:cxn ang="0">
+                <a:pos x="connsiteX8" y="connsiteY8"/>
+              </a:cxn>
+              <a:cxn ang="0">
+                <a:pos x="connsiteX9" y="connsiteY9"/>
+              </a:cxn>
+            </a:cxnLst>
+            <a:rect l="l" t="t" r="r" b="b"/>
+            <a:pathLst>
+              <a:path w="807148" h="807148">
+                <a:moveTo>
+                  <a:pt x="403574" y="0"/>
+                </a:moveTo>
+                <a:cubicBezTo>
+                  <a:pt x="180689" y="0"/>
+                  <a:pt x="0" y="180689"/>
+                  <a:pt x="0" y="403574"/>
+                </a:cubicBezTo>
+                <a:cubicBezTo>
+                  <a:pt x="0" y="626459"/>
+                  <a:pt x="180689" y="807149"/>
+                  <a:pt x="403574" y="807149"/>
+                </a:cubicBezTo>
+                <a:cubicBezTo>
+                  <a:pt x="626459" y="807149"/>
+                  <a:pt x="807149" y="626459"/>
+                  <a:pt x="807149" y="403574"/>
+                </a:cubicBezTo>
+                <a:cubicBezTo>
+                  <a:pt x="807149" y="180689"/>
+                  <a:pt x="626459" y="0"/>
+                  <a:pt x="403574" y="0"/>
+                </a:cubicBezTo>
+                <a:close/>
+                <a:moveTo>
+                  <a:pt x="403574" y="667988"/>
+                </a:moveTo>
+                <a:cubicBezTo>
+                  <a:pt x="257556" y="667988"/>
+                  <a:pt x="139160" y="549593"/>
+                  <a:pt x="139160" y="403574"/>
+                </a:cubicBezTo>
+                <a:cubicBezTo>
+                  <a:pt x="139160" y="257556"/>
+                  <a:pt x="257556" y="139160"/>
+                  <a:pt x="403574" y="139160"/>
+                </a:cubicBezTo>
+                <a:cubicBezTo>
+                  <a:pt x="549593" y="139160"/>
+                  <a:pt x="667988" y="257556"/>
+                  <a:pt x="667988" y="403574"/>
+                </a:cubicBezTo>
+                <a:cubicBezTo>
+                  <a:pt x="667988" y="549593"/>
+                  <a:pt x="549593" y="667988"/>
+                  <a:pt x="403574" y="667988"/>
+                </a:cubicBezTo>
+                <a:close/>
+              </a:path>
+            </a:pathLst>
+          </a:custGeom>
+          <a:solidFill>
+            <a:schemeClr val="accent2">
+              <a:alpha val="30000"/>
+            </a:schemeClr>
+          </a:solidFill>
+          <a:ln w="28575">
+            <a:solidFill>
+              <a:schemeClr val="bg1"/>
+            </a:solidFill>
+          </a:ln>
+        </p:spPr>
+        <p:style>
+          <a:lnRef idx="2">
+            <a:schemeClr val="accent1">
+              <a:shade val="50000"/>
+            </a:schemeClr>
+          </a:lnRef>
+          <a:fillRef idx="1">
+            <a:schemeClr val="accent1"/>
+          </a:fillRef>
+          <a:effectRef idx="0">
+            <a:schemeClr val="accent1"/>
+          </a:effectRef>
+          <a:fontRef idx="minor">
+            <a:schemeClr val="lt1"/>
+          </a:fontRef>
+        </p:style>
+        <p:txBody>
+          <a:bodyPr rot="0" spcFirstLastPara="0" vertOverflow="overflow" horzOverflow="overflow" vert="horz" wrap="square" lIns="91440" tIns="45720" rIns="91440" bIns="45720" numCol="1" spcCol="0" rtlCol="0" fromWordArt="0" anchor="ctr" anchorCtr="0" forceAA="0" compatLnSpc="1">
+            <a:prstTxWarp prst="textNoShape">
+              <a:avLst/>
+            </a:prstTxWarp>
+            <a:noAutofit/>
+          </a:bodyPr>
+          <a:lstStyle/>
+          <a:p>
+            <a:pPr algn="ctr"/>
+            <a:endParaRPr lang="en-US">
+              <a:solidFill>
+                <a:schemeClr val="lt1"/>
+              </a:solidFill>
+            </a:endParaRPr>
+          </a:p>
+        </p:txBody>
+      </p:sp>
+      <p:sp>
+        <p:nvSpPr>
+          <p:cNvPr id="24" name="Oval 23">
+            <a:extLst>
+              <a:ext uri="{FF2B5EF4-FFF2-40B4-BE49-F238E27FC236}">
+                <a16:creationId xmlns:a16="http://schemas.microsoft.com/office/drawing/2014/main" id="{F6B92503-6984-4D15-8B98-8718709B785D}"/>
+              </a:ext>
+              <a:ext uri="{C183D7F6-B498-43B3-948B-1728B52AA6E4}">
+                <adec:decorative xmlns:adec="http://schemas.microsoft.com/office/drawing/2017/decorative" val="1"/>
+              </a:ext>
+            </a:extLst>
+          </p:cNvPr>
+          <p:cNvSpPr>
+            <a:spLocks noGrp="1" noRot="1" noChangeAspect="1" noMove="1" noResize="1" noEditPoints="1" noAdjustHandles="1" noChangeArrowheads="1" noChangeShapeType="1" noTextEdit="1"/>
+          </p:cNvSpPr>
+          <p:nvPr>
+            <p:extLst>
+              <p:ext uri="{386F3935-93C4-4BCD-93E2-E3B085C9AB24}">
+                <p16:designElem xmlns:p16="http://schemas.microsoft.com/office/powerpoint/2015/main" val="1"/>
+              </p:ext>
+            </p:extLst>
+          </p:nvPr>
+        </p:nvSpPr>
+        <p:spPr>
+          <a:xfrm>
+            <a:off x="642976" y="4946663"/>
+            <a:ext cx="319941" cy="319941"/>
+          </a:xfrm>
+          <a:prstGeom prst="ellipse">
+            <a:avLst/>
+          </a:prstGeom>
+          <a:solidFill>
+            <a:srgbClr val="FFFFFF"/>
+          </a:solidFill>
+          <a:ln w="28575">
+            <a:solidFill>
+              <a:schemeClr val="tx1"/>
+            </a:solidFill>
+          </a:ln>
+        </p:spPr>
+        <p:style>
+          <a:lnRef idx="2">
+            <a:schemeClr val="accent1">
+              <a:shade val="50000"/>
+            </a:schemeClr>
+          </a:lnRef>
+          <a:fillRef idx="1">
+            <a:schemeClr val="accent1"/>
+          </a:fillRef>
+          <a:effectRef idx="0">
+            <a:schemeClr val="accent1"/>
+          </a:effectRef>
+          <a:fontRef idx="minor">
+            <a:schemeClr val="lt1"/>
+          </a:fontRef>
+        </p:style>
+        <p:txBody>
+          <a:bodyPr rot="0" spcFirstLastPara="0" vertOverflow="overflow" horzOverflow="overflow" vert="horz" wrap="square" lIns="91440" tIns="45720" rIns="91440" bIns="45720" numCol="1" spcCol="0" rtlCol="0" fromWordArt="0" anchor="ctr" anchorCtr="0" forceAA="0" compatLnSpc="1">
+            <a:prstTxWarp prst="textNoShape">
+              <a:avLst/>
+            </a:prstTxWarp>
+            <a:noAutofit/>
+          </a:bodyPr>
+          <a:lstStyle/>
+          <a:p>
+            <a:pPr algn="ctr"/>
+            <a:endParaRPr lang="en-US"/>
+          </a:p>
+        </p:txBody>
+      </p:sp>
+      <p:sp>
+        <p:nvSpPr>
+          <p:cNvPr id="26" name="Oval 25">
+            <a:extLst>
+              <a:ext uri="{FF2B5EF4-FFF2-40B4-BE49-F238E27FC236}">
+                <a16:creationId xmlns:a16="http://schemas.microsoft.com/office/drawing/2014/main" id="{08DDF938-524E-4C18-A47D-C00627832366}"/>
+              </a:ext>
+              <a:ext uri="{C183D7F6-B498-43B3-948B-1728B52AA6E4}">
+                <adec:decorative xmlns:adec="http://schemas.microsoft.com/office/drawing/2017/decorative" val="1"/>
+              </a:ext>
+            </a:extLst>
+          </p:cNvPr>
+          <p:cNvSpPr>
+            <a:spLocks noGrp="1" noRot="1" noChangeAspect="1" noMove="1" noResize="1" noEditPoints="1" noAdjustHandles="1" noChangeArrowheads="1" noChangeShapeType="1" noTextEdit="1"/>
+          </p:cNvSpPr>
+          <p:nvPr>
+            <p:extLst>
+              <p:ext uri="{386F3935-93C4-4BCD-93E2-E3B085C9AB24}">
+                <p16:designElem xmlns:p16="http://schemas.microsoft.com/office/powerpoint/2015/main" val="1"/>
+              </p:ext>
+            </p:extLst>
+          </p:nvPr>
+        </p:nvSpPr>
+        <p:spPr>
+          <a:xfrm>
+            <a:off x="642976" y="4946663"/>
+            <a:ext cx="319941" cy="319941"/>
+          </a:xfrm>
+          <a:prstGeom prst="ellipse">
+            <a:avLst/>
+          </a:prstGeom>
+          <a:solidFill>
+            <a:schemeClr val="accent2">
+              <a:alpha val="30000"/>
+            </a:schemeClr>
+          </a:solidFill>
+          <a:ln w="28575">
+            <a:solidFill>
+              <a:schemeClr val="bg1"/>
+            </a:solidFill>
+          </a:ln>
+        </p:spPr>
+        <p:style>
+          <a:lnRef idx="2">
+            <a:schemeClr val="accent1">
+              <a:shade val="50000"/>
+            </a:schemeClr>
+          </a:lnRef>
+          <a:fillRef idx="1">
+            <a:schemeClr val="accent1"/>
+          </a:fillRef>
+          <a:effectRef idx="0">
+            <a:schemeClr val="accent1"/>
+          </a:effectRef>
+          <a:fontRef idx="minor">
+            <a:schemeClr val="lt1"/>
+          </a:fontRef>
+        </p:style>
+        <p:txBody>
+          <a:bodyPr rot="0" spcFirstLastPara="0" vertOverflow="overflow" horzOverflow="overflow" vert="horz" wrap="square" lIns="91440" tIns="45720" rIns="91440" bIns="45720" numCol="1" spcCol="0" rtlCol="0" fromWordArt="0" anchor="ctr" anchorCtr="0" forceAA="0" compatLnSpc="1">
+            <a:prstTxWarp prst="textNoShape">
+              <a:avLst/>
+            </a:prstTxWarp>
+            <a:noAutofit/>
+          </a:bodyPr>
+          <a:lstStyle/>
+          <a:p>
+            <a:pPr algn="ctr"/>
+            <a:endParaRPr lang="en-US"/>
+          </a:p>
+        </p:txBody>
+      </p:sp>
+      <p:grpSp>
+        <p:nvGrpSpPr>
+          <p:cNvPr id="28" name="Graphic 185">
+            <a:extLst>
+              <a:ext uri="{FF2B5EF4-FFF2-40B4-BE49-F238E27FC236}">
+                <a16:creationId xmlns:a16="http://schemas.microsoft.com/office/drawing/2014/main" id="{3773FAF5-C452-4455-9411-D6AF5EBD4CA9}"/>
+              </a:ext>
+              <a:ext uri="{C183D7F6-B498-43B3-948B-1728B52AA6E4}">
+                <adec:decorative xmlns:adec="http://schemas.microsoft.com/office/drawing/2017/decorative" val="1"/>
+              </a:ext>
+            </a:extLst>
+          </p:cNvPr>
+          <p:cNvGrpSpPr>
+            <a:grpSpLocks noGrp="1" noUngrp="1" noRot="1" noChangeAspect="1" noMove="1" noResize="1"/>
+          </p:cNvGrpSpPr>
+          <p:nvPr>
+            <p:extLst>
+              <p:ext uri="{386F3935-93C4-4BCD-93E2-E3B085C9AB24}">
+                <p16:designElem xmlns:p16="http://schemas.microsoft.com/office/powerpoint/2015/main" val="1"/>
+              </p:ext>
+            </p:extLst>
+          </p:nvPr>
+        </p:nvGrpSpPr>
+        <p:grpSpPr>
+          <a:xfrm>
+            <a:off x="9812239" y="6139464"/>
+            <a:ext cx="1054466" cy="469689"/>
+            <a:chOff x="9841624" y="4115729"/>
+            <a:chExt cx="602169" cy="268223"/>
+          </a:xfrm>
+          <a:solidFill>
+            <a:schemeClr val="bg1"/>
+          </a:solidFill>
+        </p:grpSpPr>
+        <p:sp>
+          <p:nvSpPr>
+            <p:cNvPr id="29" name="Freeform: Shape 28">
+              <a:extLst>
+                <a:ext uri="{FF2B5EF4-FFF2-40B4-BE49-F238E27FC236}">
+                  <a16:creationId xmlns:a16="http://schemas.microsoft.com/office/drawing/2014/main" id="{1ECA0D96-F63C-4F7B-BE16-0F3FE76D7D60}"/>
+                </a:ext>
+                <a:ext uri="{C183D7F6-B498-43B3-948B-1728B52AA6E4}">
+                  <adec:decorative xmlns:adec="http://schemas.microsoft.com/office/drawing/2017/decorative" val="1"/>
+                </a:ext>
+              </a:extLst>
+            </p:cNvPr>
+            <p:cNvSpPr/>
+            <p:nvPr>
+              <p:extLst>
+                <p:ext uri="{386F3935-93C4-4BCD-93E2-E3B085C9AB24}">
+                  <p16:designElem xmlns:p16="http://schemas.microsoft.com/office/powerpoint/2015/main" val="1"/>
+                </p:ext>
+              </p:extLst>
+            </p:nvPr>
+          </p:nvSpPr>
+          <p:spPr>
+            <a:xfrm>
+              <a:off x="9841624" y="4115729"/>
+              <a:ext cx="202882" cy="268223"/>
+            </a:xfrm>
+            <a:custGeom>
+              <a:avLst/>
+              <a:gdLst>
+                <a:gd name="connsiteX0" fmla="*/ 20765 w 202882"/>
+                <a:gd name="connsiteY0" fmla="*/ 268224 h 268223"/>
+                <a:gd name="connsiteX1" fmla="*/ 0 w 202882"/>
+                <a:gd name="connsiteY1" fmla="*/ 268224 h 268223"/>
+                <a:gd name="connsiteX2" fmla="*/ 182118 w 202882"/>
+                <a:gd name="connsiteY2" fmla="*/ 0 h 268223"/>
+                <a:gd name="connsiteX3" fmla="*/ 202883 w 202882"/>
+                <a:gd name="connsiteY3" fmla="*/ 0 h 268223"/>
+              </a:gdLst>
+              <a:ahLst/>
+              <a:cxnLst>
+                <a:cxn ang="0">
+                  <a:pos x="connsiteX0" y="connsiteY0"/>
+                </a:cxn>
+                <a:cxn ang="0">
+                  <a:pos x="connsiteX1" y="connsiteY1"/>
+                </a:cxn>
+                <a:cxn ang="0">
+                  <a:pos x="connsiteX2" y="connsiteY2"/>
+                </a:cxn>
+                <a:cxn ang="0">
+                  <a:pos x="connsiteX3" y="connsiteY3"/>
+                </a:cxn>
+              </a:cxnLst>
+              <a:rect l="l" t="t" r="r" b="b"/>
+              <a:pathLst>
+                <a:path w="202882" h="268223">
+                  <a:moveTo>
+                    <a:pt x="20765" y="268224"/>
+                  </a:moveTo>
+                  <a:lnTo>
+                    <a:pt x="0" y="268224"/>
+                  </a:lnTo>
+                  <a:lnTo>
+                    <a:pt x="182118" y="0"/>
+                  </a:lnTo>
+                  <a:lnTo>
+                    <a:pt x="202883" y="0"/>
+                  </a:lnTo>
+                  <a:close/>
+                </a:path>
+              </a:pathLst>
+            </a:custGeom>
+            <a:grpFill/>
+            <a:ln w="9525" cap="flat">
+              <a:noFill/>
+              <a:prstDash val="solid"/>
+              <a:miter/>
+            </a:ln>
+          </p:spPr>
+          <p:txBody>
+            <a:bodyPr rtlCol="0" anchor="ctr"/>
+            <a:lstStyle/>
+            <a:p>
+              <a:endParaRPr lang="en-US"/>
+            </a:p>
+          </p:txBody>
+        </p:sp>
+        <p:sp>
+          <p:nvSpPr>
+            <p:cNvPr id="30" name="Freeform: Shape 29">
+              <a:extLst>
+                <a:ext uri="{FF2B5EF4-FFF2-40B4-BE49-F238E27FC236}">
+                  <a16:creationId xmlns:a16="http://schemas.microsoft.com/office/drawing/2014/main" id="{74F83A81-0546-400A-918A-90C9C48B8147}"/>
+                </a:ext>
+                <a:ext uri="{C183D7F6-B498-43B3-948B-1728B52AA6E4}">
+                  <adec:decorative xmlns:adec="http://schemas.microsoft.com/office/drawing/2017/decorative" val="1"/>
+                </a:ext>
+              </a:extLst>
+            </p:cNvPr>
+            <p:cNvSpPr/>
+            <p:nvPr>
+              <p:extLst>
+                <p:ext uri="{386F3935-93C4-4BCD-93E2-E3B085C9AB24}">
+                  <p16:designElem xmlns:p16="http://schemas.microsoft.com/office/powerpoint/2015/main" val="1"/>
+                </p:ext>
+              </p:extLst>
+            </p:nvPr>
+          </p:nvSpPr>
+          <p:spPr>
+            <a:xfrm>
+              <a:off x="9941445" y="4115729"/>
+              <a:ext cx="202882" cy="268223"/>
+            </a:xfrm>
+            <a:custGeom>
+              <a:avLst/>
+              <a:gdLst>
+                <a:gd name="connsiteX0" fmla="*/ 20765 w 202882"/>
+                <a:gd name="connsiteY0" fmla="*/ 268224 h 268223"/>
+                <a:gd name="connsiteX1" fmla="*/ 0 w 202882"/>
+                <a:gd name="connsiteY1" fmla="*/ 268224 h 268223"/>
+                <a:gd name="connsiteX2" fmla="*/ 182118 w 202882"/>
+                <a:gd name="connsiteY2" fmla="*/ 0 h 268223"/>
+                <a:gd name="connsiteX3" fmla="*/ 202883 w 202882"/>
+                <a:gd name="connsiteY3" fmla="*/ 0 h 268223"/>
+              </a:gdLst>
+              <a:ahLst/>
+              <a:cxnLst>
+                <a:cxn ang="0">
+                  <a:pos x="connsiteX0" y="connsiteY0"/>
+                </a:cxn>
+                <a:cxn ang="0">
+                  <a:pos x="connsiteX1" y="connsiteY1"/>
+                </a:cxn>
+                <a:cxn ang="0">
+                  <a:pos x="connsiteX2" y="connsiteY2"/>
+                </a:cxn>
+                <a:cxn ang="0">
+                  <a:pos x="connsiteX3" y="connsiteY3"/>
+                </a:cxn>
+              </a:cxnLst>
+              <a:rect l="l" t="t" r="r" b="b"/>
+              <a:pathLst>
+                <a:path w="202882" h="268223">
+                  <a:moveTo>
+                    <a:pt x="20765" y="268224"/>
+                  </a:moveTo>
+                  <a:lnTo>
+                    <a:pt x="0" y="268224"/>
+                  </a:lnTo>
+                  <a:lnTo>
+                    <a:pt x="182118" y="0"/>
+                  </a:lnTo>
+                  <a:lnTo>
+                    <a:pt x="202883" y="0"/>
+                  </a:lnTo>
+                  <a:close/>
+                </a:path>
+              </a:pathLst>
+            </a:custGeom>
+            <a:grpFill/>
+            <a:ln w="9525" cap="flat">
+              <a:noFill/>
+              <a:prstDash val="solid"/>
+              <a:miter/>
+            </a:ln>
+          </p:spPr>
+          <p:txBody>
+            <a:bodyPr rtlCol="0" anchor="ctr"/>
+            <a:lstStyle/>
+            <a:p>
+              <a:endParaRPr lang="en-US"/>
+            </a:p>
+          </p:txBody>
+        </p:sp>
+        <p:sp>
+          <p:nvSpPr>
+            <p:cNvPr id="31" name="Freeform: Shape 30">
+              <a:extLst>
+                <a:ext uri="{FF2B5EF4-FFF2-40B4-BE49-F238E27FC236}">
+                  <a16:creationId xmlns:a16="http://schemas.microsoft.com/office/drawing/2014/main" id="{9741F692-A5B6-4215-86D9-B1FD4FF26AC7}"/>
+                </a:ext>
+                <a:ext uri="{C183D7F6-B498-43B3-948B-1728B52AA6E4}">
+                  <adec:decorative xmlns:adec="http://schemas.microsoft.com/office/drawing/2017/decorative" val="1"/>
+                </a:ext>
+              </a:extLst>
+            </p:cNvPr>
+            <p:cNvSpPr/>
+            <p:nvPr>
+              <p:extLst>
+                <p:ext uri="{386F3935-93C4-4BCD-93E2-E3B085C9AB24}">
+                  <p16:designElem xmlns:p16="http://schemas.microsoft.com/office/powerpoint/2015/main" val="1"/>
+                </p:ext>
+              </p:extLst>
+            </p:nvPr>
+          </p:nvSpPr>
+          <p:spPr>
+            <a:xfrm>
+              <a:off x="10041267" y="4115729"/>
+              <a:ext cx="202882" cy="268223"/>
+            </a:xfrm>
+            <a:custGeom>
+              <a:avLst/>
+              <a:gdLst>
+                <a:gd name="connsiteX0" fmla="*/ 20669 w 202882"/>
+                <a:gd name="connsiteY0" fmla="*/ 268224 h 268223"/>
+                <a:gd name="connsiteX1" fmla="*/ 0 w 202882"/>
+                <a:gd name="connsiteY1" fmla="*/ 268224 h 268223"/>
+                <a:gd name="connsiteX2" fmla="*/ 182118 w 202882"/>
+                <a:gd name="connsiteY2" fmla="*/ 0 h 268223"/>
+                <a:gd name="connsiteX3" fmla="*/ 202883 w 202882"/>
+                <a:gd name="connsiteY3" fmla="*/ 0 h 268223"/>
+              </a:gdLst>
+              <a:ahLst/>
+              <a:cxnLst>
+                <a:cxn ang="0">
+                  <a:pos x="connsiteX0" y="connsiteY0"/>
+                </a:cxn>
+                <a:cxn ang="0">
+                  <a:pos x="connsiteX1" y="connsiteY1"/>
+                </a:cxn>
+                <a:cxn ang="0">
+                  <a:pos x="connsiteX2" y="connsiteY2"/>
+                </a:cxn>
+                <a:cxn ang="0">
+                  <a:pos x="connsiteX3" y="connsiteY3"/>
+                </a:cxn>
+              </a:cxnLst>
+              <a:rect l="l" t="t" r="r" b="b"/>
+              <a:pathLst>
+                <a:path w="202882" h="268223">
+                  <a:moveTo>
+                    <a:pt x="20669" y="268224"/>
+                  </a:moveTo>
+                  <a:lnTo>
+                    <a:pt x="0" y="268224"/>
+                  </a:lnTo>
+                  <a:lnTo>
+                    <a:pt x="182118" y="0"/>
+                  </a:lnTo>
+                  <a:lnTo>
+                    <a:pt x="202883" y="0"/>
+                  </a:lnTo>
+                  <a:close/>
+                </a:path>
+              </a:pathLst>
+            </a:custGeom>
+            <a:grpFill/>
+            <a:ln w="9525" cap="flat">
+              <a:noFill/>
+              <a:prstDash val="solid"/>
+              <a:miter/>
+            </a:ln>
+          </p:spPr>
+          <p:txBody>
+            <a:bodyPr rtlCol="0" anchor="ctr"/>
+            <a:lstStyle/>
+            <a:p>
+              <a:endParaRPr lang="en-US"/>
+            </a:p>
+          </p:txBody>
+        </p:sp>
+        <p:sp>
+          <p:nvSpPr>
+            <p:cNvPr id="32" name="Freeform: Shape 31">
+              <a:extLst>
+                <a:ext uri="{FF2B5EF4-FFF2-40B4-BE49-F238E27FC236}">
+                  <a16:creationId xmlns:a16="http://schemas.microsoft.com/office/drawing/2014/main" id="{CC0876CB-9C60-4580-8FED-CD64EC76645E}"/>
+                </a:ext>
+                <a:ext uri="{C183D7F6-B498-43B3-948B-1728B52AA6E4}">
+                  <adec:decorative xmlns:adec="http://schemas.microsoft.com/office/drawing/2017/decorative" val="1"/>
+                </a:ext>
+              </a:extLst>
+            </p:cNvPr>
+            <p:cNvSpPr/>
+            <p:nvPr>
+              <p:extLst>
+                <p:ext uri="{386F3935-93C4-4BCD-93E2-E3B085C9AB24}">
+                  <p16:designElem xmlns:p16="http://schemas.microsoft.com/office/powerpoint/2015/main" val="1"/>
+                </p:ext>
+              </p:extLst>
+            </p:nvPr>
+          </p:nvSpPr>
+          <p:spPr>
+            <a:xfrm>
+              <a:off x="10141090" y="4115729"/>
+              <a:ext cx="202882" cy="268223"/>
+            </a:xfrm>
+            <a:custGeom>
+              <a:avLst/>
+              <a:gdLst>
+                <a:gd name="connsiteX0" fmla="*/ 20669 w 202882"/>
+                <a:gd name="connsiteY0" fmla="*/ 268224 h 268223"/>
+                <a:gd name="connsiteX1" fmla="*/ 0 w 202882"/>
+                <a:gd name="connsiteY1" fmla="*/ 268224 h 268223"/>
+                <a:gd name="connsiteX2" fmla="*/ 182118 w 202882"/>
+                <a:gd name="connsiteY2" fmla="*/ 0 h 268223"/>
+                <a:gd name="connsiteX3" fmla="*/ 202883 w 202882"/>
+                <a:gd name="connsiteY3" fmla="*/ 0 h 268223"/>
+              </a:gdLst>
+              <a:ahLst/>
+              <a:cxnLst>
+                <a:cxn ang="0">
+                  <a:pos x="connsiteX0" y="connsiteY0"/>
+                </a:cxn>
+                <a:cxn ang="0">
+                  <a:pos x="connsiteX1" y="connsiteY1"/>
+                </a:cxn>
+                <a:cxn ang="0">
+                  <a:pos x="connsiteX2" y="connsiteY2"/>
+                </a:cxn>
+                <a:cxn ang="0">
+                  <a:pos x="connsiteX3" y="connsiteY3"/>
+                </a:cxn>
+              </a:cxnLst>
+              <a:rect l="l" t="t" r="r" b="b"/>
+              <a:pathLst>
+                <a:path w="202882" h="268223">
+                  <a:moveTo>
+                    <a:pt x="20669" y="268224"/>
+                  </a:moveTo>
+                  <a:lnTo>
+                    <a:pt x="0" y="268224"/>
+                  </a:lnTo>
+                  <a:lnTo>
+                    <a:pt x="182118" y="0"/>
+                  </a:lnTo>
+                  <a:lnTo>
+                    <a:pt x="202883" y="0"/>
+                  </a:lnTo>
+                  <a:close/>
+                </a:path>
+              </a:pathLst>
+            </a:custGeom>
+            <a:grpFill/>
+            <a:ln w="9525" cap="flat">
+              <a:noFill/>
+              <a:prstDash val="solid"/>
+              <a:miter/>
+            </a:ln>
+          </p:spPr>
+          <p:txBody>
+            <a:bodyPr rtlCol="0" anchor="ctr"/>
+            <a:lstStyle/>
+            <a:p>
+              <a:endParaRPr lang="en-US"/>
+            </a:p>
+          </p:txBody>
+        </p:sp>
+        <p:sp>
+          <p:nvSpPr>
+            <p:cNvPr id="33" name="Freeform: Shape 32">
+              <a:extLst>
+                <a:ext uri="{FF2B5EF4-FFF2-40B4-BE49-F238E27FC236}">
+                  <a16:creationId xmlns:a16="http://schemas.microsoft.com/office/drawing/2014/main" id="{A879B3B7-48DB-4D3A-BB33-02766EAD3D91}"/>
+                </a:ext>
+                <a:ext uri="{C183D7F6-B498-43B3-948B-1728B52AA6E4}">
+                  <adec:decorative xmlns:adec="http://schemas.microsoft.com/office/drawing/2017/decorative" val="1"/>
+                </a:ext>
+              </a:extLst>
+            </p:cNvPr>
+            <p:cNvSpPr/>
+            <p:nvPr>
+              <p:extLst>
+                <p:ext uri="{386F3935-93C4-4BCD-93E2-E3B085C9AB24}">
+                  <p16:designElem xmlns:p16="http://schemas.microsoft.com/office/powerpoint/2015/main" val="1"/>
+                </p:ext>
+              </p:extLst>
+            </p:nvPr>
+          </p:nvSpPr>
+          <p:spPr>
+            <a:xfrm>
+              <a:off x="10240911" y="4115729"/>
+              <a:ext cx="202882" cy="268223"/>
+            </a:xfrm>
+            <a:custGeom>
+              <a:avLst/>
+              <a:gdLst>
+                <a:gd name="connsiteX0" fmla="*/ 20669 w 202882"/>
+                <a:gd name="connsiteY0" fmla="*/ 268224 h 268223"/>
+                <a:gd name="connsiteX1" fmla="*/ 0 w 202882"/>
+                <a:gd name="connsiteY1" fmla="*/ 268224 h 268223"/>
+                <a:gd name="connsiteX2" fmla="*/ 182118 w 202882"/>
+                <a:gd name="connsiteY2" fmla="*/ 0 h 268223"/>
+                <a:gd name="connsiteX3" fmla="*/ 202883 w 202882"/>
+                <a:gd name="connsiteY3" fmla="*/ 0 h 268223"/>
+              </a:gdLst>
+              <a:ahLst/>
+              <a:cxnLst>
+                <a:cxn ang="0">
+                  <a:pos x="connsiteX0" y="connsiteY0"/>
+                </a:cxn>
+                <a:cxn ang="0">
+                  <a:pos x="connsiteX1" y="connsiteY1"/>
+                </a:cxn>
+                <a:cxn ang="0">
+                  <a:pos x="connsiteX2" y="connsiteY2"/>
+                </a:cxn>
+                <a:cxn ang="0">
+                  <a:pos x="connsiteX3" y="connsiteY3"/>
+                </a:cxn>
+              </a:cxnLst>
+              <a:rect l="l" t="t" r="r" b="b"/>
+              <a:pathLst>
+                <a:path w="202882" h="268223">
+                  <a:moveTo>
+                    <a:pt x="20669" y="268224"/>
+                  </a:moveTo>
+                  <a:lnTo>
+                    <a:pt x="0" y="268224"/>
+                  </a:lnTo>
+                  <a:lnTo>
+                    <a:pt x="182118" y="0"/>
+                  </a:lnTo>
+                  <a:lnTo>
+                    <a:pt x="202883" y="0"/>
+                  </a:lnTo>
+                  <a:close/>
+                </a:path>
+              </a:pathLst>
+            </a:custGeom>
+            <a:grpFill/>
+            <a:ln w="9525" cap="flat">
+              <a:noFill/>
+              <a:prstDash val="solid"/>
+              <a:miter/>
+            </a:ln>
+          </p:spPr>
+          <p:txBody>
+            <a:bodyPr rtlCol="0" anchor="ctr"/>
+            <a:lstStyle/>
+            <a:p>
+              <a:endParaRPr lang="en-US"/>
+            </a:p>
+          </p:txBody>
+        </p:sp>
+      </p:grpSp>
+      <p:sp>
+        <p:nvSpPr>
+          <p:cNvPr id="4" name="Content Placeholder 3">
+            <a:extLst>
+              <a:ext uri="{FF2B5EF4-FFF2-40B4-BE49-F238E27FC236}">
+                <a16:creationId xmlns:a16="http://schemas.microsoft.com/office/drawing/2014/main" id="{240E3A52-EBD4-415C-9ED0-C1FF167A7EEE}"/>
+              </a:ext>
+            </a:extLst>
+          </p:cNvPr>
+          <p:cNvSpPr>
+            <a:spLocks noGrp="1"/>
+          </p:cNvSpPr>
+          <p:nvPr>
+            <p:ph idx="1"/>
+          </p:nvPr>
+        </p:nvSpPr>
+        <p:spPr/>
+        <p:txBody>
+          <a:bodyPr/>
+          <a:lstStyle/>
+          <a:p>
+            <a:endParaRPr lang="en-US"/>
+          </a:p>
+        </p:txBody>
+      </p:sp>
+    </p:spTree>
+    <p:extLst>
+      <p:ext uri="{BB962C8B-B14F-4D97-AF65-F5344CB8AC3E}">
+        <p14:creationId xmlns:p14="http://schemas.microsoft.com/office/powerpoint/2010/main" val="591433566"/>
       </p:ext>
     </p:extLst>
   </p:cSld>

</xml_diff>